<commit_message>
Update 2 to index.html Taoz 2023 according to Aitan PC
</commit_message>
<xml_diff>
--- a/events/Taoz_2023/חידות_הגיון_לניווט_תעוז_2023_עצים.pptx
+++ b/events/Taoz_2023/חידות_הגיון_לניווט_תעוז_2023_עצים.pptx
@@ -15,7 +15,8 @@
     <p:sldId id="291" r:id="rId12"/>
     <p:sldId id="292" r:id="rId13"/>
     <p:sldId id="293" r:id="rId14"/>
-    <p:sldId id="297" r:id="rId15"/>
+    <p:sldId id="298" r:id="rId15"/>
+    <p:sldId id="297" r:id="rId16"/>
   </p:sldIdLst>
   <p:sldSz cx="9144000" cy="6858000" type="screen4x3"/>
   <p:notesSz cx="6858000" cy="9144000"/>
@@ -116,7 +117,7 @@
   </p:defaultTextStyle>
   <p:extLst>
     <p:ext uri="{EFAFB233-063F-42B5-8137-9DF3F51BA10A}">
-      <p15:sldGuideLst xmlns="" xmlns:p15="http://schemas.microsoft.com/office/powerpoint/2012/main">
+      <p15:sldGuideLst xmlns:p15="http://schemas.microsoft.com/office/powerpoint/2012/main" xmlns="">
         <p15:guide id="1" orient="horz" pos="2160">
           <p15:clr>
             <a:srgbClr val="A4A3A4"/>
@@ -3140,17 +3141,8 @@
             </a:pPr>
             <a:r>
               <a:rPr lang="he-IL" sz="5600" dirty="0" smtClean="0"/>
-              <a:t>אוכל, </a:t>
-            </a:r>
-            <a:r>
-              <a:rPr lang="he-IL" sz="5600" dirty="0" smtClean="0"/>
-              <a:t>שתייה </a:t>
-            </a:r>
-            <a:r>
-              <a:rPr lang="he-IL" sz="5600" dirty="0" smtClean="0"/>
-              <a:t>ולינה בדרום</a:t>
-            </a:r>
-            <a:endParaRPr lang="he-IL" sz="5600" dirty="0" smtClean="0"/>
+              <a:t>אוכל, שתייה ולינה בדרום</a:t>
+            </a:r>
           </a:p>
           <a:p>
             <a:pPr algn="ctr">
@@ -3190,19 +3182,7 @@
                 <a:latin typeface="David" pitchFamily="34" charset="-79"/>
                 <a:cs typeface="David" pitchFamily="34" charset="-79"/>
               </a:rPr>
-              <a:t>_ _ </a:t>
-            </a:r>
-            <a:r>
-              <a:rPr lang="he-IL" sz="8000" dirty="0" smtClean="0">
-                <a:solidFill>
-                  <a:schemeClr val="accent6">
-                    <a:lumMod val="75000"/>
-                  </a:schemeClr>
-                </a:solidFill>
-                <a:latin typeface="David" pitchFamily="34" charset="-79"/>
-                <a:cs typeface="David" pitchFamily="34" charset="-79"/>
-              </a:rPr>
-              <a:t>_ </a:t>
+              <a:t>_ _ _ </a:t>
             </a:r>
             <a:r>
               <a:rPr lang="he-IL" sz="8000" dirty="0">
@@ -3472,7 +3452,14 @@
                 <a:latin typeface="David" pitchFamily="34" charset="-79"/>
                 <a:cs typeface="David" pitchFamily="34" charset="-79"/>
               </a:rPr>
-              <a:t>, </a:t>
+              <a:t>, ש</a:t>
+            </a:r>
+            <a:r>
+              <a:rPr lang="he-IL" sz="2800" b="1" dirty="0" smtClean="0">
+                <a:latin typeface="David" pitchFamily="34" charset="-79"/>
+                <a:cs typeface="David" pitchFamily="34" charset="-79"/>
+              </a:rPr>
+              <a:t>תייה</a:t>
             </a:r>
             <a:r>
               <a:rPr lang="he-IL" sz="2800" b="1" dirty="0" smtClean="0">
@@ -3482,14 +3469,14 @@
                 <a:latin typeface="David" pitchFamily="34" charset="-79"/>
                 <a:cs typeface="David" pitchFamily="34" charset="-79"/>
               </a:rPr>
-              <a:t>ש</a:t>
-            </a:r>
-            <a:r>
-              <a:rPr lang="he-IL" sz="2800" b="1" dirty="0" smtClean="0">
-                <a:latin typeface="David" pitchFamily="34" charset="-79"/>
-                <a:cs typeface="David" pitchFamily="34" charset="-79"/>
-              </a:rPr>
-              <a:t>תייה</a:t>
+              <a:t> </a:t>
+            </a:r>
+            <a:r>
+              <a:rPr lang="he-IL" sz="2800" b="1" dirty="0" smtClean="0">
+                <a:latin typeface="David" pitchFamily="34" charset="-79"/>
+                <a:cs typeface="David" pitchFamily="34" charset="-79"/>
+              </a:rPr>
+              <a:t>ו</a:t>
             </a:r>
             <a:r>
               <a:rPr lang="he-IL" sz="2800" b="1" dirty="0" smtClean="0">
@@ -3499,6 +3486,23 @@
                 <a:latin typeface="David" pitchFamily="34" charset="-79"/>
                 <a:cs typeface="David" pitchFamily="34" charset="-79"/>
               </a:rPr>
+              <a:t>ל</a:t>
+            </a:r>
+            <a:r>
+              <a:rPr lang="he-IL" sz="2800" b="1" dirty="0" smtClean="0">
+                <a:latin typeface="David" pitchFamily="34" charset="-79"/>
+                <a:cs typeface="David" pitchFamily="34" charset="-79"/>
+              </a:rPr>
+              <a:t>ינה</a:t>
+            </a:r>
+            <a:r>
+              <a:rPr lang="he-IL" sz="2800" b="1" dirty="0" smtClean="0">
+                <a:solidFill>
+                  <a:srgbClr val="FF0000"/>
+                </a:solidFill>
+                <a:latin typeface="David" pitchFamily="34" charset="-79"/>
+                <a:cs typeface="David" pitchFamily="34" charset="-79"/>
+              </a:rPr>
               <a:t> </a:t>
             </a:r>
             <a:r>
@@ -3506,46 +3510,8 @@
                 <a:latin typeface="David" pitchFamily="34" charset="-79"/>
                 <a:cs typeface="David" pitchFamily="34" charset="-79"/>
               </a:rPr>
-              <a:t>ו</a:t>
-            </a:r>
-            <a:r>
-              <a:rPr lang="he-IL" sz="2800" b="1" dirty="0" smtClean="0">
-                <a:solidFill>
-                  <a:srgbClr val="FF0000"/>
-                </a:solidFill>
-                <a:latin typeface="David" pitchFamily="34" charset="-79"/>
-                <a:cs typeface="David" pitchFamily="34" charset="-79"/>
-              </a:rPr>
-              <a:t>ל</a:t>
-            </a:r>
-            <a:r>
-              <a:rPr lang="he-IL" sz="2800" b="1" dirty="0" smtClean="0">
-                <a:latin typeface="David" pitchFamily="34" charset="-79"/>
-                <a:cs typeface="David" pitchFamily="34" charset="-79"/>
-              </a:rPr>
-              <a:t>ינה</a:t>
-            </a:r>
-            <a:r>
-              <a:rPr lang="he-IL" sz="2800" b="1" dirty="0" smtClean="0">
-                <a:solidFill>
-                  <a:srgbClr val="FF0000"/>
-                </a:solidFill>
-                <a:latin typeface="David" pitchFamily="34" charset="-79"/>
-                <a:cs typeface="David" pitchFamily="34" charset="-79"/>
-              </a:rPr>
-              <a:t> </a:t>
-            </a:r>
-            <a:r>
-              <a:rPr lang="he-IL" sz="2800" b="1" dirty="0" smtClean="0">
-                <a:latin typeface="David" pitchFamily="34" charset="-79"/>
-                <a:cs typeface="David" pitchFamily="34" charset="-79"/>
-              </a:rPr>
               <a:t>בדרום</a:t>
             </a:r>
-            <a:endParaRPr lang="he-IL" sz="2800" b="1" dirty="0" smtClean="0">
-              <a:latin typeface="David" pitchFamily="34" charset="-79"/>
-              <a:cs typeface="David" pitchFamily="34" charset="-79"/>
-            </a:endParaRPr>
           </a:p>
           <a:p>
             <a:pPr algn="ctr"/>
@@ -3636,7 +3602,7 @@
         </p:spPr>
         <p:txBody>
           <a:bodyPr>
-            <a:normAutofit/>
+            <a:normAutofit fontScale="85000" lnSpcReduction="20000"/>
           </a:bodyPr>
           <a:lstStyle/>
           <a:p>
@@ -3645,7 +3611,11 @@
             </a:pPr>
             <a:r>
               <a:rPr lang="he-IL" sz="6600" dirty="0" smtClean="0"/>
-              <a:t>לומד בכוח</a:t>
+              <a:t>הלילך </a:t>
+            </a:r>
+            <a:r>
+              <a:rPr lang="he-IL" sz="6600" dirty="0" smtClean="0"/>
+              <a:t>שחור? לפי הסדר, העץ דווקא ורוד...</a:t>
             </a:r>
             <a:endParaRPr lang="he-IL" sz="6600" dirty="0" smtClean="0"/>
           </a:p>
@@ -3663,10 +3633,10 @@
                 <a:latin typeface="David" pitchFamily="34" charset="-79"/>
                 <a:cs typeface="David" pitchFamily="34" charset="-79"/>
               </a:rPr>
-              <a:t>( _ </a:t>
-            </a:r>
-            <a:r>
-              <a:rPr lang="he-IL" sz="8000" dirty="0" smtClean="0">
+              <a:t>(</a:t>
+            </a:r>
+            <a:r>
+              <a:rPr lang="en-US" sz="8000" dirty="0" smtClean="0">
                 <a:solidFill>
                   <a:schemeClr val="accent6">
                     <a:lumMod val="75000"/>
@@ -3675,8 +3645,125 @@
                 <a:latin typeface="David" pitchFamily="34" charset="-79"/>
                 <a:cs typeface="David" pitchFamily="34" charset="-79"/>
               </a:rPr>
-              <a:t>_ _ _ )</a:t>
-            </a:r>
+              <a:t> </a:t>
+            </a:r>
+            <a:r>
+              <a:rPr lang="he-IL" sz="8000" dirty="0" smtClean="0">
+                <a:solidFill>
+                  <a:schemeClr val="accent6">
+                    <a:lumMod val="75000"/>
+                  </a:schemeClr>
+                </a:solidFill>
+                <a:latin typeface="David" pitchFamily="34" charset="-79"/>
+                <a:cs typeface="David" pitchFamily="34" charset="-79"/>
+              </a:rPr>
+              <a:t>_ </a:t>
+            </a:r>
+            <a:r>
+              <a:rPr lang="he-IL" sz="8000" dirty="0" smtClean="0">
+                <a:solidFill>
+                  <a:schemeClr val="accent6">
+                    <a:lumMod val="75000"/>
+                  </a:schemeClr>
+                </a:solidFill>
+                <a:latin typeface="David" pitchFamily="34" charset="-79"/>
+                <a:cs typeface="David" pitchFamily="34" charset="-79"/>
+              </a:rPr>
+              <a:t>_ _ </a:t>
+            </a:r>
+            <a:r>
+              <a:rPr lang="he-IL" sz="8000" dirty="0" smtClean="0">
+                <a:solidFill>
+                  <a:schemeClr val="accent6">
+                    <a:lumMod val="75000"/>
+                  </a:schemeClr>
+                </a:solidFill>
+                <a:latin typeface="David" pitchFamily="34" charset="-79"/>
+                <a:cs typeface="David" pitchFamily="34" charset="-79"/>
+              </a:rPr>
+              <a:t>_</a:t>
+            </a:r>
+            <a:r>
+              <a:rPr lang="en-US" sz="8000" dirty="0" smtClean="0">
+                <a:solidFill>
+                  <a:schemeClr val="accent6">
+                    <a:lumMod val="75000"/>
+                  </a:schemeClr>
+                </a:solidFill>
+                <a:latin typeface="David" pitchFamily="34" charset="-79"/>
+                <a:cs typeface="David" pitchFamily="34" charset="-79"/>
+              </a:rPr>
+              <a:t> </a:t>
+            </a:r>
+            <a:r>
+              <a:rPr lang="he-IL" sz="8000" dirty="0" smtClean="0">
+                <a:solidFill>
+                  <a:schemeClr val="accent6">
+                    <a:lumMod val="75000"/>
+                  </a:schemeClr>
+                </a:solidFill>
+                <a:latin typeface="David" pitchFamily="34" charset="-79"/>
+                <a:cs typeface="David" pitchFamily="34" charset="-79"/>
+              </a:rPr>
+              <a:t> </a:t>
+            </a:r>
+            <a:r>
+              <a:rPr lang="he-IL" sz="8000" dirty="0" smtClean="0">
+                <a:solidFill>
+                  <a:schemeClr val="accent6">
+                    <a:lumMod val="75000"/>
+                  </a:schemeClr>
+                </a:solidFill>
+                <a:latin typeface="David" pitchFamily="34" charset="-79"/>
+                <a:cs typeface="David" pitchFamily="34" charset="-79"/>
+              </a:rPr>
+              <a:t>_ _ </a:t>
+            </a:r>
+            <a:r>
+              <a:rPr lang="he-IL" sz="8000" dirty="0" smtClean="0">
+                <a:solidFill>
+                  <a:schemeClr val="accent6">
+                    <a:lumMod val="75000"/>
+                  </a:schemeClr>
+                </a:solidFill>
+                <a:latin typeface="David" pitchFamily="34" charset="-79"/>
+                <a:cs typeface="David" pitchFamily="34" charset="-79"/>
+              </a:rPr>
+              <a:t>_ </a:t>
+            </a:r>
+            <a:r>
+              <a:rPr lang="he-IL" sz="8000" dirty="0" smtClean="0">
+                <a:solidFill>
+                  <a:schemeClr val="accent6">
+                    <a:lumMod val="75000"/>
+                  </a:schemeClr>
+                </a:solidFill>
+                <a:latin typeface="David" pitchFamily="34" charset="-79"/>
+                <a:cs typeface="David" pitchFamily="34" charset="-79"/>
+              </a:rPr>
+              <a:t>_ _ </a:t>
+            </a:r>
+            <a:r>
+              <a:rPr lang="he-IL" sz="8000" dirty="0" smtClean="0">
+                <a:solidFill>
+                  <a:schemeClr val="accent6">
+                    <a:lumMod val="75000"/>
+                  </a:schemeClr>
+                </a:solidFill>
+                <a:latin typeface="David" pitchFamily="34" charset="-79"/>
+                <a:cs typeface="David" pitchFamily="34" charset="-79"/>
+              </a:rPr>
+              <a:t>)</a:t>
+            </a:r>
+            <a:endParaRPr lang="he-IL" sz="8000" dirty="0" smtClean="0">
+              <a:solidFill>
+                <a:schemeClr val="accent6">
+                  <a:lumMod val="75000"/>
+                </a:schemeClr>
+              </a:solidFill>
+              <a:latin typeface="David" pitchFamily="34" charset="-79"/>
+              <a:cs typeface="David" pitchFamily="34" charset="-79"/>
+            </a:endParaRPr>
           </a:p>
           <a:p>
             <a:pPr>
@@ -3873,21 +3960,8 @@
                   <a:srgbClr val="0070C0"/>
                 </a:solidFill>
               </a:rPr>
-              <a:t>פתרון חידה </a:t>
-            </a:r>
-            <a:r>
-              <a:rPr lang="he-IL" sz="2400" dirty="0" smtClean="0">
-                <a:solidFill>
-                  <a:srgbClr val="0070C0"/>
-                </a:solidFill>
-              </a:rPr>
-              <a:t>8</a:t>
-            </a:r>
-            <a:endParaRPr lang="he-IL" sz="2400" dirty="0" smtClean="0">
-              <a:solidFill>
-                <a:srgbClr val="0070C0"/>
-              </a:solidFill>
-            </a:endParaRPr>
+              <a:t>פתרון חידה 8</a:t>
+            </a:r>
           </a:p>
           <a:p>
             <a:pPr algn="ctr"/>
@@ -3926,17 +4000,7 @@
                 <a:latin typeface="David" pitchFamily="34" charset="-79"/>
                 <a:cs typeface="David" pitchFamily="34" charset="-79"/>
               </a:rPr>
-              <a:t>יגרום </a:t>
-            </a:r>
-            <a:r>
-              <a:rPr lang="he-IL" sz="2800" b="1" dirty="0" smtClean="0">
-                <a:solidFill>
-                  <a:srgbClr val="FF0000"/>
-                </a:solidFill>
-                <a:latin typeface="David" pitchFamily="34" charset="-79"/>
-                <a:cs typeface="David" pitchFamily="34" charset="-79"/>
-              </a:rPr>
-              <a:t>לסטייה</a:t>
+              <a:t>יגרום לסטייה</a:t>
             </a:r>
           </a:p>
           <a:p>
@@ -4012,250 +4076,32 @@
           <a:lstStyle/>
           <a:p>
             <a:r>
-              <a:rPr lang="he-IL" dirty="0"/>
-              <a:t>כל החידות והפתרונות</a:t>
-            </a:r>
-          </a:p>
-        </p:txBody>
-      </p:sp>
-      <p:sp>
-        <p:nvSpPr>
-          <p:cNvPr id="3" name="Content Placeholder 2"/>
-          <p:cNvSpPr>
-            <a:spLocks noGrp="1"/>
-          </p:cNvSpPr>
-          <p:nvPr>
-            <p:ph idx="1"/>
-          </p:nvPr>
-        </p:nvSpPr>
-        <p:spPr/>
-        <p:txBody>
-          <a:bodyPr>
-            <a:normAutofit fontScale="85000" lnSpcReduction="20000"/>
-          </a:bodyPr>
-          <a:lstStyle/>
-          <a:p>
-            <a:pPr>
-              <a:buNone/>
-            </a:pPr>
-            <a:r>
-              <a:rPr lang="he-IL" dirty="0" smtClean="0"/>
-              <a:t>דוגמה: </a:t>
-            </a:r>
-            <a:r>
-              <a:rPr lang="he-IL" dirty="0" smtClean="0"/>
-              <a:t>אשל - אוכל, </a:t>
-            </a:r>
-            <a:r>
-              <a:rPr lang="he-IL" dirty="0" smtClean="0"/>
-              <a:t>שתייה </a:t>
-            </a:r>
-            <a:r>
-              <a:rPr lang="he-IL" dirty="0" smtClean="0"/>
-              <a:t>ולינה </a:t>
-            </a:r>
-            <a:r>
-              <a:rPr lang="he-IL" dirty="0" smtClean="0"/>
-              <a:t>בדרום</a:t>
-            </a:r>
-            <a:endParaRPr lang="he-IL" dirty="0" smtClean="0"/>
-          </a:p>
-          <a:p>
-            <a:pPr marL="514350" indent="-514350">
-              <a:buFont typeface="+mj-lt"/>
-              <a:buAutoNum type="arabicPeriod"/>
-            </a:pPr>
-            <a:r>
-              <a:rPr lang="he-IL" dirty="0" smtClean="0"/>
-              <a:t>שקד </a:t>
-            </a:r>
-            <a:r>
-              <a:rPr lang="he-IL" dirty="0" smtClean="0"/>
-              <a:t>- העץ שמשתחווה</a:t>
-            </a:r>
-          </a:p>
-          <a:p>
-            <a:pPr marL="514350" indent="-514350">
-              <a:buFont typeface="+mj-lt"/>
-              <a:buAutoNum type="arabicPeriod"/>
-            </a:pPr>
-            <a:r>
-              <a:rPr lang="he-IL" dirty="0" smtClean="0"/>
-              <a:t>ברוש - קנגורו ספרותי בבאר שבע</a:t>
-            </a:r>
-          </a:p>
-          <a:p>
-            <a:pPr marL="514350" indent="-514350">
-              <a:buAutoNum type="arabicPeriod"/>
-            </a:pPr>
-            <a:r>
-              <a:rPr lang="he-IL" dirty="0" smtClean="0"/>
-              <a:t>אדר - עץ החודש (לפעמים פעמיים ברצף...)</a:t>
-            </a:r>
-          </a:p>
-          <a:p>
-            <a:pPr marL="514350" indent="-514350">
-              <a:buAutoNum type="arabicPeriod"/>
-            </a:pPr>
-            <a:r>
-              <a:rPr lang="he-IL" dirty="0" smtClean="0"/>
-              <a:t>חרוב - בחור מבולבל ומתוק</a:t>
-            </a:r>
-          </a:p>
-          <a:p>
-            <a:pPr marL="514350" indent="-514350">
-              <a:buAutoNum type="arabicPeriod"/>
-            </a:pPr>
-            <a:r>
-              <a:rPr lang="he-IL" dirty="0" smtClean="0"/>
-              <a:t>אורן - הזוהר שלהן נפוץ ביערות קק"ל</a:t>
-            </a:r>
-          </a:p>
-          <a:p>
-            <a:pPr marL="514350" indent="-514350">
-              <a:buAutoNum type="arabicPeriod"/>
-            </a:pPr>
-            <a:r>
-              <a:rPr lang="he-IL" dirty="0" err="1" smtClean="0"/>
-              <a:t>אקליפטוס</a:t>
-            </a:r>
-            <a:r>
-              <a:rPr lang="he-IL" dirty="0" smtClean="0"/>
-              <a:t> - העץ הוא לא פיסטוק ולא בסדר</a:t>
-            </a:r>
-          </a:p>
-          <a:p>
-            <a:pPr marL="514350" indent="-514350">
-              <a:buAutoNum type="arabicPeriod"/>
-            </a:pPr>
-            <a:r>
-              <a:rPr lang="he-IL" dirty="0" smtClean="0"/>
-              <a:t>שקמה - מארז מאלוהים</a:t>
-            </a:r>
-          </a:p>
-          <a:p>
-            <a:pPr marL="514350" indent="-514350">
-              <a:buAutoNum type="arabicPeriod"/>
-            </a:pPr>
-            <a:r>
-              <a:rPr lang="he-IL" dirty="0" smtClean="0"/>
-              <a:t>שיטה - העץ שיגרום </a:t>
-            </a:r>
-            <a:r>
-              <a:rPr lang="he-IL" dirty="0" smtClean="0"/>
-              <a:t>לסטייה</a:t>
-            </a:r>
-          </a:p>
-          <a:p>
-            <a:pPr marL="514350" indent="-514350">
-              <a:buAutoNum type="arabicPeriod"/>
-            </a:pPr>
-            <a:r>
-              <a:rPr lang="he-IL" dirty="0" smtClean="0">
-                <a:solidFill>
-                  <a:srgbClr val="0070C0"/>
-                </a:solidFill>
-              </a:rPr>
-              <a:t>א</a:t>
-            </a:r>
-            <a:r>
-              <a:rPr lang="he-IL" dirty="0" smtClean="0">
-                <a:solidFill>
-                  <a:srgbClr val="FF0000"/>
-                </a:solidFill>
-              </a:rPr>
-              <a:t>ל</a:t>
-            </a:r>
-            <a:r>
-              <a:rPr lang="he-IL" dirty="0" smtClean="0">
-                <a:solidFill>
-                  <a:srgbClr val="0070C0"/>
-                </a:solidFill>
-              </a:rPr>
-              <a:t>ון</a:t>
-            </a:r>
-            <a:r>
-              <a:rPr lang="he-IL" dirty="0" smtClean="0"/>
-              <a:t> - </a:t>
-            </a:r>
-            <a:r>
-              <a:rPr lang="he-IL" dirty="0" smtClean="0">
-                <a:solidFill>
-                  <a:srgbClr val="FF0000"/>
-                </a:solidFill>
-              </a:rPr>
-              <a:t>לומד</a:t>
-            </a:r>
-            <a:r>
-              <a:rPr lang="he-IL" dirty="0" smtClean="0"/>
-              <a:t> ב</a:t>
-            </a:r>
-            <a:r>
-              <a:rPr lang="he-IL" dirty="0" smtClean="0">
-                <a:solidFill>
-                  <a:srgbClr val="0070C0"/>
-                </a:solidFill>
-              </a:rPr>
-              <a:t>כוח</a:t>
+              <a:rPr lang="he-IL" dirty="0">
+                <a:solidFill>
+                  <a:srgbClr val="0070C0"/>
+                </a:solidFill>
+                <a:latin typeface="David" pitchFamily="34" charset="-79"/>
+                <a:cs typeface="David" pitchFamily="34" charset="-79"/>
+              </a:rPr>
+              <a:t>תחנה </a:t>
+            </a:r>
+            <a:r>
+              <a:rPr lang="en-US" dirty="0" smtClean="0">
+                <a:solidFill>
+                  <a:srgbClr val="0070C0"/>
+                </a:solidFill>
+                <a:latin typeface="David" pitchFamily="34" charset="-79"/>
+                <a:cs typeface="David" pitchFamily="34" charset="-79"/>
+              </a:rPr>
+              <a:t>10</a:t>
             </a:r>
             <a:endParaRPr lang="he-IL" dirty="0">
               <a:solidFill>
                 <a:srgbClr val="0070C0"/>
               </a:solidFill>
+              <a:latin typeface="David" pitchFamily="34" charset="-79"/>
+              <a:cs typeface="David" pitchFamily="34" charset="-79"/>
             </a:endParaRPr>
-          </a:p>
-        </p:txBody>
-      </p:sp>
-    </p:spTree>
-  </p:cSld>
-  <p:clrMapOvr>
-    <a:masterClrMapping/>
-  </p:clrMapOvr>
-</p:sld>
-</file>
-
-<file path=ppt/slides/slide2.xml><?xml version="1.0" encoding="utf-8"?>
-<p:sld xmlns:a="http://schemas.openxmlformats.org/drawingml/2006/main" xmlns:r="http://schemas.openxmlformats.org/officeDocument/2006/relationships" xmlns:p="http://schemas.openxmlformats.org/presentationml/2006/main">
-  <p:cSld>
-    <p:spTree>
-      <p:nvGrpSpPr>
-        <p:cNvPr id="1" name=""/>
-        <p:cNvGrpSpPr/>
-        <p:nvPr/>
-      </p:nvGrpSpPr>
-      <p:grpSpPr>
-        <a:xfrm>
-          <a:off x="0" y="0"/>
-          <a:ext cx="0" cy="0"/>
-          <a:chOff x="0" y="0"/>
-          <a:chExt cx="0" cy="0"/>
-        </a:xfrm>
-      </p:grpSpPr>
-      <p:sp>
-        <p:nvSpPr>
-          <p:cNvPr id="2" name="Title 1"/>
-          <p:cNvSpPr>
-            <a:spLocks noGrp="1"/>
-          </p:cNvSpPr>
-          <p:nvPr>
-            <p:ph type="title"/>
-          </p:nvPr>
-        </p:nvSpPr>
-        <p:spPr/>
-        <p:txBody>
-          <a:bodyPr/>
-          <a:lstStyle/>
-          <a:p>
-            <a:r>
-              <a:rPr lang="he-IL" dirty="0">
-                <a:solidFill>
-                  <a:srgbClr val="0070C0"/>
-                </a:solidFill>
-                <a:latin typeface="David" pitchFamily="34" charset="-79"/>
-                <a:cs typeface="David" pitchFamily="34" charset="-79"/>
-              </a:rPr>
-              <a:t>תחנה 1</a:t>
-            </a:r>
           </a:p>
         </p:txBody>
       </p:sp>
@@ -4286,16 +4132,15 @@
             </a:pPr>
             <a:r>
               <a:rPr lang="he-IL" sz="6600" dirty="0" smtClean="0"/>
-              <a:t>העץ שמשתחווה</a:t>
-            </a:r>
-            <a:endParaRPr lang="he-IL" sz="6600" dirty="0"/>
+              <a:t>לומד בכוח</a:t>
+            </a:r>
           </a:p>
           <a:p>
             <a:pPr algn="ctr">
               <a:buNone/>
             </a:pPr>
             <a:r>
-              <a:rPr lang="he-IL" sz="8000" dirty="0">
+              <a:rPr lang="he-IL" sz="8000" dirty="0" smtClean="0">
                 <a:solidFill>
                   <a:schemeClr val="accent6">
                     <a:lumMod val="75000"/>
@@ -4304,43 +4149,7 @@
                 <a:latin typeface="David" pitchFamily="34" charset="-79"/>
                 <a:cs typeface="David" pitchFamily="34" charset="-79"/>
               </a:rPr>
-              <a:t>( </a:t>
-            </a:r>
-            <a:r>
-              <a:rPr lang="he-IL" sz="8000" dirty="0" smtClean="0">
-                <a:solidFill>
-                  <a:schemeClr val="accent6">
-                    <a:lumMod val="75000"/>
-                  </a:schemeClr>
-                </a:solidFill>
-                <a:latin typeface="David" pitchFamily="34" charset="-79"/>
-                <a:cs typeface="David" pitchFamily="34" charset="-79"/>
-              </a:rPr>
-              <a:t>_ </a:t>
-            </a:r>
-            <a:r>
-              <a:rPr lang="he-IL" sz="8000" dirty="0" smtClean="0">
-                <a:solidFill>
-                  <a:schemeClr val="accent6">
-                    <a:lumMod val="75000"/>
-                  </a:schemeClr>
-                </a:solidFill>
-                <a:latin typeface="David" pitchFamily="34" charset="-79"/>
-                <a:cs typeface="David" pitchFamily="34" charset="-79"/>
-              </a:rPr>
-              <a:t>_ _ </a:t>
-            </a:r>
-            <a:r>
-              <a:rPr lang="he-IL" sz="8000" dirty="0">
-                <a:solidFill>
-                  <a:schemeClr val="accent6">
-                    <a:lumMod val="75000"/>
-                  </a:schemeClr>
-                </a:solidFill>
-                <a:latin typeface="David" pitchFamily="34" charset="-79"/>
-                <a:cs typeface="David" pitchFamily="34" charset="-79"/>
-              </a:rPr>
-              <a:t>)</a:t>
+              <a:t>( _ _ _ _ )</a:t>
             </a:r>
           </a:p>
           <a:p>
@@ -4518,8 +4327,8 @@
         </p:nvSpPr>
         <p:spPr>
           <a:xfrm>
-            <a:off x="533400" y="4572000"/>
-            <a:ext cx="3810000" cy="1692771"/>
+            <a:off x="609600" y="4495800"/>
+            <a:ext cx="3581400" cy="2123658"/>
           </a:xfrm>
           <a:prstGeom prst="rect">
             <a:avLst/>
@@ -4533,23 +4342,36 @@
           <a:p>
             <a:pPr algn="ctr"/>
             <a:r>
-              <a:rPr lang="he-IL" sz="2400" dirty="0">
-                <a:solidFill>
-                  <a:srgbClr val="0070C0"/>
-                </a:solidFill>
-              </a:rPr>
-              <a:t>דוגמה ופתרון</a:t>
-            </a:r>
-          </a:p>
-          <a:p>
-            <a:pPr algn="ctr"/>
-            <a:endParaRPr lang="he-IL" sz="2400" dirty="0">
+              <a:rPr lang="he-IL" sz="2400" dirty="0" smtClean="0">
+                <a:solidFill>
+                  <a:srgbClr val="0070C0"/>
+                </a:solidFill>
+              </a:rPr>
+              <a:t>פתרון חידה </a:t>
+            </a:r>
+            <a:r>
+              <a:rPr lang="en-US" sz="2400" dirty="0" smtClean="0">
+                <a:solidFill>
+                  <a:srgbClr val="0070C0"/>
+                </a:solidFill>
+              </a:rPr>
+              <a:t>9</a:t>
+            </a:r>
+            <a:endParaRPr lang="he-IL" sz="2400" dirty="0" smtClean="0">
               <a:solidFill>
                 <a:srgbClr val="0070C0"/>
               </a:solidFill>
             </a:endParaRPr>
           </a:p>
           <a:p>
+            <a:pPr algn="ctr"/>
+            <a:endParaRPr lang="he-IL" sz="2400" dirty="0" smtClean="0">
+              <a:solidFill>
+                <a:srgbClr val="0070C0"/>
+              </a:solidFill>
+            </a:endParaRPr>
+          </a:p>
+          <a:p>
             <a:pPr algn="ctr">
               <a:buNone/>
             </a:pPr>
@@ -4561,14 +4383,181 @@
                 <a:latin typeface="David" pitchFamily="34" charset="-79"/>
                 <a:cs typeface="David" pitchFamily="34" charset="-79"/>
               </a:rPr>
-              <a:t>א</a:t>
-            </a:r>
-            <a:r>
-              <a:rPr lang="he-IL" sz="2800" b="1" dirty="0" smtClean="0">
-                <a:latin typeface="David" pitchFamily="34" charset="-79"/>
-                <a:cs typeface="David" pitchFamily="34" charset="-79"/>
-              </a:rPr>
-              <a:t>וכל</a:t>
+              <a:t>ה</a:t>
+            </a:r>
+            <a:r>
+              <a:rPr lang="he-IL" sz="2800" b="1" dirty="0" smtClean="0">
+                <a:latin typeface="David" pitchFamily="34" charset="-79"/>
+                <a:cs typeface="David" pitchFamily="34" charset="-79"/>
+              </a:rPr>
+              <a:t>ל</a:t>
+            </a:r>
+            <a:r>
+              <a:rPr lang="he-IL" sz="2800" b="1" dirty="0" smtClean="0">
+                <a:solidFill>
+                  <a:srgbClr val="0070C0"/>
+                </a:solidFill>
+                <a:latin typeface="David" pitchFamily="34" charset="-79"/>
+                <a:cs typeface="David" pitchFamily="34" charset="-79"/>
+              </a:rPr>
+              <a:t>י</a:t>
+            </a:r>
+            <a:r>
+              <a:rPr lang="he-IL" sz="2800" b="1" dirty="0" smtClean="0">
+                <a:latin typeface="David" pitchFamily="34" charset="-79"/>
+                <a:cs typeface="David" pitchFamily="34" charset="-79"/>
+              </a:rPr>
+              <a:t>ל</a:t>
+            </a:r>
+            <a:r>
+              <a:rPr lang="he-IL" sz="2800" b="1" dirty="0" smtClean="0">
+                <a:solidFill>
+                  <a:srgbClr val="FFC000"/>
+                </a:solidFill>
+                <a:latin typeface="David" pitchFamily="34" charset="-79"/>
+                <a:cs typeface="David" pitchFamily="34" charset="-79"/>
+              </a:rPr>
+              <a:t>ך</a:t>
+            </a:r>
+            <a:r>
+              <a:rPr lang="he-IL" sz="2800" b="1" dirty="0" smtClean="0">
+                <a:latin typeface="David" pitchFamily="34" charset="-79"/>
+                <a:cs typeface="David" pitchFamily="34" charset="-79"/>
+              </a:rPr>
+              <a:t> </a:t>
+            </a:r>
+            <a:r>
+              <a:rPr lang="he-IL" sz="2800" b="1" dirty="0" smtClean="0">
+                <a:solidFill>
+                  <a:srgbClr val="00B050"/>
+                </a:solidFill>
+                <a:latin typeface="David" pitchFamily="34" charset="-79"/>
+                <a:cs typeface="David" pitchFamily="34" charset="-79"/>
+              </a:rPr>
+              <a:t>ש</a:t>
+            </a:r>
+            <a:r>
+              <a:rPr lang="he-IL" sz="2800" b="1" dirty="0" smtClean="0">
+                <a:solidFill>
+                  <a:srgbClr val="00B0F0"/>
+                </a:solidFill>
+                <a:latin typeface="David" pitchFamily="34" charset="-79"/>
+                <a:cs typeface="David" pitchFamily="34" charset="-79"/>
+              </a:rPr>
+              <a:t>ח</a:t>
+            </a:r>
+            <a:r>
+              <a:rPr lang="he-IL" sz="2800" b="1" dirty="0" smtClean="0">
+                <a:solidFill>
+                  <a:srgbClr val="7030A0"/>
+                </a:solidFill>
+                <a:latin typeface="David" pitchFamily="34" charset="-79"/>
+                <a:cs typeface="David" pitchFamily="34" charset="-79"/>
+              </a:rPr>
+              <a:t>ו</a:t>
+            </a:r>
+            <a:r>
+              <a:rPr lang="he-IL" sz="2800" b="1" dirty="0" smtClean="0">
+                <a:solidFill>
+                  <a:schemeClr val="accent6">
+                    <a:lumMod val="75000"/>
+                  </a:schemeClr>
+                </a:solidFill>
+                <a:latin typeface="David" pitchFamily="34" charset="-79"/>
+                <a:cs typeface="David" pitchFamily="34" charset="-79"/>
+              </a:rPr>
+              <a:t>ר</a:t>
+            </a:r>
+            <a:r>
+              <a:rPr lang="he-IL" sz="2800" b="1" dirty="0" smtClean="0">
+                <a:latin typeface="David" pitchFamily="34" charset="-79"/>
+                <a:cs typeface="David" pitchFamily="34" charset="-79"/>
+              </a:rPr>
+              <a:t>? לפי הסדר, העץ דווקא ורוד</a:t>
+            </a:r>
+            <a:r>
+              <a:rPr lang="he-IL" sz="2800" b="1" dirty="0" smtClean="0">
+                <a:latin typeface="David" pitchFamily="34" charset="-79"/>
+                <a:cs typeface="David" pitchFamily="34" charset="-79"/>
+              </a:rPr>
+              <a:t>...</a:t>
+            </a:r>
+            <a:endParaRPr lang="en-US" sz="2800" b="1" dirty="0" smtClean="0">
+              <a:latin typeface="David" pitchFamily="34" charset="-79"/>
+              <a:cs typeface="David" pitchFamily="34" charset="-79"/>
+            </a:endParaRPr>
+          </a:p>
+          <a:p>
+            <a:pPr algn="ctr">
+              <a:buNone/>
+            </a:pPr>
+            <a:r>
+              <a:rPr lang="he-IL" sz="2800" b="1" dirty="0" smtClean="0">
+                <a:solidFill>
+                  <a:srgbClr val="FFC000"/>
+                </a:solidFill>
+                <a:latin typeface="David" pitchFamily="34" charset="-79"/>
+                <a:cs typeface="David" pitchFamily="34" charset="-79"/>
+              </a:rPr>
+              <a:t>כ</a:t>
+            </a:r>
+            <a:r>
+              <a:rPr lang="en-US" sz="2800" b="1" dirty="0" smtClean="0">
+                <a:solidFill>
+                  <a:srgbClr val="FFC000"/>
+                </a:solidFill>
+                <a:latin typeface="David" pitchFamily="34" charset="-79"/>
+                <a:cs typeface="David" pitchFamily="34" charset="-79"/>
+              </a:rPr>
+              <a:t> </a:t>
+            </a:r>
+            <a:r>
+              <a:rPr lang="he-IL" sz="2800" b="1" dirty="0" smtClean="0">
+                <a:latin typeface="David" pitchFamily="34" charset="-79"/>
+                <a:cs typeface="David" pitchFamily="34" charset="-79"/>
+              </a:rPr>
+              <a:t>ל</a:t>
+            </a:r>
+            <a:r>
+              <a:rPr lang="en-US" sz="2800" b="1" dirty="0" smtClean="0">
+                <a:latin typeface="David" pitchFamily="34" charset="-79"/>
+                <a:cs typeface="David" pitchFamily="34" charset="-79"/>
+              </a:rPr>
+              <a:t> </a:t>
+            </a:r>
+            <a:r>
+              <a:rPr lang="he-IL" sz="2800" b="1" dirty="0" smtClean="0">
+                <a:solidFill>
+                  <a:srgbClr val="0070C0"/>
+                </a:solidFill>
+                <a:latin typeface="David" pitchFamily="34" charset="-79"/>
+                <a:cs typeface="David" pitchFamily="34" charset="-79"/>
+              </a:rPr>
+              <a:t>י</a:t>
+            </a:r>
+            <a:r>
+              <a:rPr lang="en-US" sz="2800" b="1" dirty="0" smtClean="0">
+                <a:solidFill>
+                  <a:srgbClr val="0070C0"/>
+                </a:solidFill>
+                <a:latin typeface="David" pitchFamily="34" charset="-79"/>
+                <a:cs typeface="David" pitchFamily="34" charset="-79"/>
+              </a:rPr>
+              <a:t> </a:t>
+            </a:r>
+            <a:r>
+              <a:rPr lang="he-IL" sz="2800" b="1" dirty="0" smtClean="0">
+                <a:latin typeface="David" pitchFamily="34" charset="-79"/>
+                <a:cs typeface="David" pitchFamily="34" charset="-79"/>
+              </a:rPr>
+              <a:t>ל </a:t>
+            </a:r>
+            <a:r>
+              <a:rPr lang="en-US" sz="2800" b="1" dirty="0" smtClean="0">
+                <a:latin typeface="David" pitchFamily="34" charset="-79"/>
+                <a:cs typeface="David" pitchFamily="34" charset="-79"/>
+              </a:rPr>
+              <a:t> </a:t>
             </a:r>
             <a:r>
               <a:rPr lang="he-IL" sz="2800" b="1" dirty="0" smtClean="0">
@@ -4578,17 +4567,10 @@
                 <a:latin typeface="David" pitchFamily="34" charset="-79"/>
                 <a:cs typeface="David" pitchFamily="34" charset="-79"/>
               </a:rPr>
-              <a:t>, ש</a:t>
-            </a:r>
-            <a:r>
-              <a:rPr lang="he-IL" sz="2800" b="1" dirty="0" smtClean="0">
-                <a:latin typeface="David" pitchFamily="34" charset="-79"/>
-                <a:cs typeface="David" pitchFamily="34" charset="-79"/>
-              </a:rPr>
-              <a:t>תייה</a:t>
-            </a:r>
-            <a:r>
-              <a:rPr lang="he-IL" sz="2800" b="1" dirty="0" smtClean="0">
+              <a:t>ה</a:t>
+            </a:r>
+            <a:r>
+              <a:rPr lang="en-US" sz="2800" b="1" dirty="0" smtClean="0">
                 <a:solidFill>
                   <a:srgbClr val="FF0000"/>
                 </a:solidFill>
@@ -4599,32 +4581,38 @@
             </a:r>
             <a:r>
               <a:rPr lang="he-IL" sz="2800" b="1" dirty="0" smtClean="0">
+                <a:solidFill>
+                  <a:srgbClr val="00B0F0"/>
+                </a:solidFill>
+                <a:latin typeface="David" pitchFamily="34" charset="-79"/>
+                <a:cs typeface="David" pitchFamily="34" charset="-79"/>
+              </a:rPr>
+              <a:t>ח</a:t>
+            </a:r>
+            <a:r>
+              <a:rPr lang="en-US" sz="2800" b="1" dirty="0" smtClean="0">
+                <a:solidFill>
+                  <a:srgbClr val="00B0F0"/>
+                </a:solidFill>
+                <a:latin typeface="David" pitchFamily="34" charset="-79"/>
+                <a:cs typeface="David" pitchFamily="34" charset="-79"/>
+              </a:rPr>
+              <a:t> </a:t>
+            </a:r>
+            <a:r>
+              <a:rPr lang="he-IL" sz="2800" b="1" dirty="0" smtClean="0">
+                <a:solidFill>
+                  <a:srgbClr val="7030A0"/>
+                </a:solidFill>
                 <a:latin typeface="David" pitchFamily="34" charset="-79"/>
                 <a:cs typeface="David" pitchFamily="34" charset="-79"/>
               </a:rPr>
               <a:t>ו</a:t>
             </a:r>
             <a:r>
-              <a:rPr lang="he-IL" sz="2800" b="1" dirty="0" smtClean="0">
-                <a:solidFill>
-                  <a:srgbClr val="FF0000"/>
-                </a:solidFill>
-                <a:latin typeface="David" pitchFamily="34" charset="-79"/>
-                <a:cs typeface="David" pitchFamily="34" charset="-79"/>
-              </a:rPr>
-              <a:t>ל</a:t>
-            </a:r>
-            <a:r>
-              <a:rPr lang="he-IL" sz="2800" b="1" dirty="0" smtClean="0">
-                <a:latin typeface="David" pitchFamily="34" charset="-79"/>
-                <a:cs typeface="David" pitchFamily="34" charset="-79"/>
-              </a:rPr>
-              <a:t>ינה</a:t>
-            </a:r>
-            <a:r>
-              <a:rPr lang="he-IL" sz="2800" b="1" dirty="0" smtClean="0">
-                <a:solidFill>
-                  <a:srgbClr val="FF0000"/>
+              <a:rPr lang="en-US" sz="2800" b="1" dirty="0" smtClean="0">
+                <a:solidFill>
+                  <a:srgbClr val="7030A0"/>
                 </a:solidFill>
                 <a:latin typeface="David" pitchFamily="34" charset="-79"/>
                 <a:cs typeface="David" pitchFamily="34" charset="-79"/>
@@ -4633,25 +4621,41 @@
             </a:r>
             <a:r>
               <a:rPr lang="he-IL" sz="2800" b="1" dirty="0" smtClean="0">
-                <a:latin typeface="David" pitchFamily="34" charset="-79"/>
-                <a:cs typeface="David" pitchFamily="34" charset="-79"/>
-              </a:rPr>
-              <a:t>בדרום</a:t>
-            </a:r>
-          </a:p>
-          <a:p>
-            <a:pPr algn="ctr"/>
-            <a:r>
-              <a:rPr lang="he-IL" sz="2800" b="1" dirty="0" smtClean="0">
-                <a:solidFill>
-                  <a:srgbClr val="FF0000"/>
-                </a:solidFill>
-              </a:rPr>
-              <a:t>א ש ל</a:t>
+                <a:solidFill>
+                  <a:schemeClr val="accent6">
+                    <a:lumMod val="75000"/>
+                  </a:schemeClr>
+                </a:solidFill>
+                <a:latin typeface="David" pitchFamily="34" charset="-79"/>
+                <a:cs typeface="David" pitchFamily="34" charset="-79"/>
+              </a:rPr>
+              <a:t>ר</a:t>
+            </a:r>
+            <a:r>
+              <a:rPr lang="en-US" sz="2800" b="1" smtClean="0">
+                <a:solidFill>
+                  <a:schemeClr val="accent6">
+                    <a:lumMod val="75000"/>
+                  </a:schemeClr>
+                </a:solidFill>
+                <a:latin typeface="David" pitchFamily="34" charset="-79"/>
+                <a:cs typeface="David" pitchFamily="34" charset="-79"/>
+              </a:rPr>
+              <a:t> </a:t>
+            </a:r>
+            <a:r>
+              <a:rPr lang="he-IL" sz="2800" b="1" smtClean="0">
+                <a:solidFill>
+                  <a:srgbClr val="00B050"/>
+                </a:solidFill>
+                <a:latin typeface="David" pitchFamily="34" charset="-79"/>
+                <a:cs typeface="David" pitchFamily="34" charset="-79"/>
+              </a:rPr>
+              <a:t>ש</a:t>
             </a:r>
             <a:endParaRPr lang="he-IL" sz="2800" b="1" dirty="0">
               <a:solidFill>
-                <a:srgbClr val="0070C0"/>
+                <a:srgbClr val="00B050"/>
               </a:solidFill>
             </a:endParaRPr>
           </a:p>
@@ -4665,7 +4669,7 @@
 </p:sld>
 </file>
 
-<file path=ppt/slides/slide3.xml><?xml version="1.0" encoding="utf-8"?>
+<file path=ppt/slides/slide12.xml><?xml version="1.0" encoding="utf-8"?>
 <p:sld xmlns:a="http://schemas.openxmlformats.org/drawingml/2006/main" xmlns:r="http://schemas.openxmlformats.org/officeDocument/2006/relationships" xmlns:p="http://schemas.openxmlformats.org/presentationml/2006/main">
   <p:cSld>
     <p:spTree>
@@ -4698,6 +4702,231 @@
           <a:lstStyle/>
           <a:p>
             <a:r>
+              <a:rPr lang="he-IL" dirty="0"/>
+              <a:t>כל החידות והפתרונות</a:t>
+            </a:r>
+          </a:p>
+        </p:txBody>
+      </p:sp>
+      <p:sp>
+        <p:nvSpPr>
+          <p:cNvPr id="3" name="Content Placeholder 2"/>
+          <p:cNvSpPr>
+            <a:spLocks noGrp="1"/>
+          </p:cNvSpPr>
+          <p:nvPr>
+            <p:ph idx="1"/>
+          </p:nvPr>
+        </p:nvSpPr>
+        <p:spPr/>
+        <p:txBody>
+          <a:bodyPr>
+            <a:normAutofit fontScale="77500" lnSpcReduction="20000"/>
+          </a:bodyPr>
+          <a:lstStyle/>
+          <a:p>
+            <a:pPr>
+              <a:buNone/>
+            </a:pPr>
+            <a:r>
+              <a:rPr lang="he-IL" dirty="0" smtClean="0"/>
+              <a:t>דוגמה: אשל - אוכל, שתייה ולינה בדרום</a:t>
+            </a:r>
+          </a:p>
+          <a:p>
+            <a:pPr marL="514350" indent="-514350">
+              <a:buFont typeface="+mj-lt"/>
+              <a:buAutoNum type="arabicPeriod"/>
+            </a:pPr>
+            <a:r>
+              <a:rPr lang="he-IL" dirty="0" smtClean="0"/>
+              <a:t>שקד - העץ שמשתחווה</a:t>
+            </a:r>
+          </a:p>
+          <a:p>
+            <a:pPr marL="514350" indent="-514350">
+              <a:buFont typeface="+mj-lt"/>
+              <a:buAutoNum type="arabicPeriod"/>
+            </a:pPr>
+            <a:r>
+              <a:rPr lang="he-IL" dirty="0" smtClean="0"/>
+              <a:t>ברוש - קנגורו ספרותי בבאר שבע</a:t>
+            </a:r>
+          </a:p>
+          <a:p>
+            <a:pPr marL="514350" indent="-514350">
+              <a:buAutoNum type="arabicPeriod"/>
+            </a:pPr>
+            <a:r>
+              <a:rPr lang="he-IL" dirty="0" smtClean="0"/>
+              <a:t>אדר - עץ החודש (לפעמים פעמיים ברצף...)</a:t>
+            </a:r>
+          </a:p>
+          <a:p>
+            <a:pPr marL="514350" indent="-514350">
+              <a:buAutoNum type="arabicPeriod"/>
+            </a:pPr>
+            <a:r>
+              <a:rPr lang="he-IL" dirty="0" smtClean="0"/>
+              <a:t>חרוב - בחור מבולבל ומתוק</a:t>
+            </a:r>
+          </a:p>
+          <a:p>
+            <a:pPr marL="514350" indent="-514350">
+              <a:buAutoNum type="arabicPeriod"/>
+            </a:pPr>
+            <a:r>
+              <a:rPr lang="he-IL" dirty="0" smtClean="0"/>
+              <a:t>אורן - הזוהר שלהן נפוץ ביערות קק"ל</a:t>
+            </a:r>
+          </a:p>
+          <a:p>
+            <a:pPr marL="514350" indent="-514350">
+              <a:buAutoNum type="arabicPeriod"/>
+            </a:pPr>
+            <a:r>
+              <a:rPr lang="he-IL" dirty="0" err="1" smtClean="0"/>
+              <a:t>אקליפטוס</a:t>
+            </a:r>
+            <a:r>
+              <a:rPr lang="he-IL" dirty="0" smtClean="0"/>
+              <a:t> - העץ הוא לא פיסטוק ולא בסדר</a:t>
+            </a:r>
+          </a:p>
+          <a:p>
+            <a:pPr marL="514350" indent="-514350">
+              <a:buAutoNum type="arabicPeriod"/>
+            </a:pPr>
+            <a:r>
+              <a:rPr lang="he-IL" dirty="0" smtClean="0"/>
+              <a:t>שקמה - מארז מאלוהים</a:t>
+            </a:r>
+          </a:p>
+          <a:p>
+            <a:pPr marL="514350" indent="-514350">
+              <a:buAutoNum type="arabicPeriod"/>
+            </a:pPr>
+            <a:r>
+              <a:rPr lang="he-IL" dirty="0" smtClean="0"/>
+              <a:t>שיטה - העץ שיגרום </a:t>
+            </a:r>
+            <a:r>
+              <a:rPr lang="he-IL" dirty="0" smtClean="0"/>
+              <a:t>לסטייה</a:t>
+            </a:r>
+            <a:endParaRPr lang="en-US" dirty="0" smtClean="0"/>
+          </a:p>
+          <a:p>
+            <a:pPr marL="514350" indent="-514350">
+              <a:buAutoNum type="arabicPeriod"/>
+            </a:pPr>
+            <a:r>
+              <a:rPr lang="he-IL" dirty="0" smtClean="0"/>
+              <a:t>כליל החורש - הלילך שחור? לפי הסדר, העץ דווקא ורוד...</a:t>
+            </a:r>
+            <a:endParaRPr lang="he-IL" dirty="0" smtClean="0"/>
+          </a:p>
+          <a:p>
+            <a:pPr marL="514350" indent="-514350">
+              <a:buAutoNum type="arabicPeriod"/>
+            </a:pPr>
+            <a:r>
+              <a:rPr lang="he-IL" dirty="0" smtClean="0">
+                <a:solidFill>
+                  <a:srgbClr val="0070C0"/>
+                </a:solidFill>
+              </a:rPr>
+              <a:t>א</a:t>
+            </a:r>
+            <a:r>
+              <a:rPr lang="he-IL" dirty="0" smtClean="0">
+                <a:solidFill>
+                  <a:srgbClr val="FF0000"/>
+                </a:solidFill>
+              </a:rPr>
+              <a:t>ל</a:t>
+            </a:r>
+            <a:r>
+              <a:rPr lang="he-IL" dirty="0" smtClean="0">
+                <a:solidFill>
+                  <a:srgbClr val="0070C0"/>
+                </a:solidFill>
+              </a:rPr>
+              <a:t>ון</a:t>
+            </a:r>
+            <a:r>
+              <a:rPr lang="he-IL" dirty="0" smtClean="0"/>
+              <a:t> - </a:t>
+            </a:r>
+            <a:r>
+              <a:rPr lang="he-IL" dirty="0" smtClean="0">
+                <a:solidFill>
+                  <a:srgbClr val="FF0000"/>
+                </a:solidFill>
+              </a:rPr>
+              <a:t>לומד</a:t>
+            </a:r>
+            <a:r>
+              <a:rPr lang="he-IL" dirty="0" smtClean="0"/>
+              <a:t> ב</a:t>
+            </a:r>
+            <a:r>
+              <a:rPr lang="he-IL" dirty="0" smtClean="0">
+                <a:solidFill>
+                  <a:srgbClr val="0070C0"/>
+                </a:solidFill>
+              </a:rPr>
+              <a:t>כוח</a:t>
+            </a:r>
+            <a:endParaRPr lang="he-IL" dirty="0">
+              <a:solidFill>
+                <a:srgbClr val="0070C0"/>
+              </a:solidFill>
+            </a:endParaRPr>
+          </a:p>
+        </p:txBody>
+      </p:sp>
+    </p:spTree>
+  </p:cSld>
+  <p:clrMapOvr>
+    <a:masterClrMapping/>
+  </p:clrMapOvr>
+</p:sld>
+</file>
+
+<file path=ppt/slides/slide2.xml><?xml version="1.0" encoding="utf-8"?>
+<p:sld xmlns:a="http://schemas.openxmlformats.org/drawingml/2006/main" xmlns:r="http://schemas.openxmlformats.org/officeDocument/2006/relationships" xmlns:p="http://schemas.openxmlformats.org/presentationml/2006/main">
+  <p:cSld>
+    <p:spTree>
+      <p:nvGrpSpPr>
+        <p:cNvPr id="1" name=""/>
+        <p:cNvGrpSpPr/>
+        <p:nvPr/>
+      </p:nvGrpSpPr>
+      <p:grpSpPr>
+        <a:xfrm>
+          <a:off x="0" y="0"/>
+          <a:ext cx="0" cy="0"/>
+          <a:chOff x="0" y="0"/>
+          <a:chExt cx="0" cy="0"/>
+        </a:xfrm>
+      </p:grpSpPr>
+      <p:sp>
+        <p:nvSpPr>
+          <p:cNvPr id="2" name="Title 1"/>
+          <p:cNvSpPr>
+            <a:spLocks noGrp="1"/>
+          </p:cNvSpPr>
+          <p:nvPr>
+            <p:ph type="title"/>
+          </p:nvPr>
+        </p:nvSpPr>
+        <p:spPr/>
+        <p:txBody>
+          <a:bodyPr/>
+          <a:lstStyle/>
+          <a:p>
+            <a:r>
               <a:rPr lang="he-IL" dirty="0">
                 <a:solidFill>
                   <a:srgbClr val="0070C0"/>
@@ -4705,7 +4934,7 @@
                 <a:latin typeface="David" pitchFamily="34" charset="-79"/>
                 <a:cs typeface="David" pitchFamily="34" charset="-79"/>
               </a:rPr>
-              <a:t>תחנה 2</a:t>
+              <a:t>תחנה 1</a:t>
             </a:r>
           </a:p>
         </p:txBody>
@@ -4728,7 +4957,7 @@
         </p:spPr>
         <p:txBody>
           <a:bodyPr>
-            <a:normAutofit fontScale="92500"/>
+            <a:normAutofit/>
           </a:bodyPr>
           <a:lstStyle/>
           <a:p>
@@ -4737,16 +4966,16 @@
             </a:pPr>
             <a:r>
               <a:rPr lang="he-IL" sz="6600" dirty="0" smtClean="0"/>
-              <a:t>קנגורו ספרותי בבאר שבע</a:t>
-            </a:r>
-            <a:endParaRPr lang="he-IL" sz="6600" dirty="0" smtClean="0"/>
+              <a:t>העץ שמשתחווה</a:t>
+            </a:r>
+            <a:endParaRPr lang="he-IL" sz="6600" dirty="0"/>
           </a:p>
           <a:p>
             <a:pPr algn="ctr">
               <a:buNone/>
             </a:pPr>
             <a:r>
-              <a:rPr lang="he-IL" sz="8000" dirty="0" smtClean="0">
+              <a:rPr lang="he-IL" sz="8000" dirty="0">
                 <a:solidFill>
                   <a:schemeClr val="accent6">
                     <a:lumMod val="75000"/>
@@ -4755,7 +4984,7 @@
                 <a:latin typeface="David" pitchFamily="34" charset="-79"/>
                 <a:cs typeface="David" pitchFamily="34" charset="-79"/>
               </a:rPr>
-              <a:t>( _ </a:t>
+              <a:t>( </a:t>
             </a:r>
             <a:r>
               <a:rPr lang="he-IL" sz="8000" dirty="0" smtClean="0">
@@ -4767,19 +4996,7 @@
                 <a:latin typeface="David" pitchFamily="34" charset="-79"/>
                 <a:cs typeface="David" pitchFamily="34" charset="-79"/>
               </a:rPr>
-              <a:t>_ _ </a:t>
-            </a:r>
-            <a:r>
-              <a:rPr lang="he-IL" sz="8000" dirty="0" smtClean="0">
-                <a:solidFill>
-                  <a:schemeClr val="accent6">
-                    <a:lumMod val="75000"/>
-                  </a:schemeClr>
-                </a:solidFill>
-                <a:latin typeface="David" pitchFamily="34" charset="-79"/>
-                <a:cs typeface="David" pitchFamily="34" charset="-79"/>
-              </a:rPr>
-              <a:t>_ </a:t>
+              <a:t>_ _ _ </a:t>
             </a:r>
             <a:r>
               <a:rPr lang="he-IL" sz="8000" dirty="0">
@@ -4969,8 +5186,8 @@
         </p:nvSpPr>
         <p:spPr>
           <a:xfrm>
-            <a:off x="609600" y="4495800"/>
-            <a:ext cx="3352800" cy="1692771"/>
+            <a:off x="533400" y="4572000"/>
+            <a:ext cx="3810000" cy="1692771"/>
           </a:xfrm>
           <a:prstGeom prst="rect">
             <a:avLst/>
@@ -4989,7 +5206,7 @@
                   <a:srgbClr val="0070C0"/>
                 </a:solidFill>
               </a:rPr>
-              <a:t>פתרון חידה 1</a:t>
+              <a:t>דוגמה ופתרון</a:t>
             </a:r>
           </a:p>
           <a:p>
@@ -5001,59 +5218,104 @@
             </a:endParaRPr>
           </a:p>
           <a:p>
+            <a:pPr algn="ctr">
+              <a:buNone/>
+            </a:pPr>
+            <a:r>
+              <a:rPr lang="he-IL" sz="2800" b="1" dirty="0" smtClean="0">
+                <a:solidFill>
+                  <a:srgbClr val="FF0000"/>
+                </a:solidFill>
+                <a:latin typeface="David" pitchFamily="34" charset="-79"/>
+                <a:cs typeface="David" pitchFamily="34" charset="-79"/>
+              </a:rPr>
+              <a:t>א</a:t>
+            </a:r>
+            <a:r>
+              <a:rPr lang="he-IL" sz="2800" b="1" dirty="0" smtClean="0">
+                <a:latin typeface="David" pitchFamily="34" charset="-79"/>
+                <a:cs typeface="David" pitchFamily="34" charset="-79"/>
+              </a:rPr>
+              <a:t>וכל</a:t>
+            </a:r>
+            <a:r>
+              <a:rPr lang="he-IL" sz="2800" b="1" dirty="0" smtClean="0">
+                <a:solidFill>
+                  <a:srgbClr val="FF0000"/>
+                </a:solidFill>
+                <a:latin typeface="David" pitchFamily="34" charset="-79"/>
+                <a:cs typeface="David" pitchFamily="34" charset="-79"/>
+              </a:rPr>
+              <a:t>, ש</a:t>
+            </a:r>
+            <a:r>
+              <a:rPr lang="he-IL" sz="2800" b="1" dirty="0" smtClean="0">
+                <a:latin typeface="David" pitchFamily="34" charset="-79"/>
+                <a:cs typeface="David" pitchFamily="34" charset="-79"/>
+              </a:rPr>
+              <a:t>תייה</a:t>
+            </a:r>
+            <a:r>
+              <a:rPr lang="he-IL" sz="2800" b="1" dirty="0" smtClean="0">
+                <a:solidFill>
+                  <a:srgbClr val="FF0000"/>
+                </a:solidFill>
+                <a:latin typeface="David" pitchFamily="34" charset="-79"/>
+                <a:cs typeface="David" pitchFamily="34" charset="-79"/>
+              </a:rPr>
+              <a:t> </a:t>
+            </a:r>
+            <a:r>
+              <a:rPr lang="he-IL" sz="2800" b="1" dirty="0" smtClean="0">
+                <a:latin typeface="David" pitchFamily="34" charset="-79"/>
+                <a:cs typeface="David" pitchFamily="34" charset="-79"/>
+              </a:rPr>
+              <a:t>ו</a:t>
+            </a:r>
+            <a:r>
+              <a:rPr lang="he-IL" sz="2800" b="1" dirty="0" smtClean="0">
+                <a:solidFill>
+                  <a:srgbClr val="FF0000"/>
+                </a:solidFill>
+                <a:latin typeface="David" pitchFamily="34" charset="-79"/>
+                <a:cs typeface="David" pitchFamily="34" charset="-79"/>
+              </a:rPr>
+              <a:t>ל</a:t>
+            </a:r>
+            <a:r>
+              <a:rPr lang="he-IL" sz="2800" b="1" dirty="0" smtClean="0">
+                <a:latin typeface="David" pitchFamily="34" charset="-79"/>
+                <a:cs typeface="David" pitchFamily="34" charset="-79"/>
+              </a:rPr>
+              <a:t>ינה</a:t>
+            </a:r>
+            <a:r>
+              <a:rPr lang="he-IL" sz="2800" b="1" dirty="0" smtClean="0">
+                <a:solidFill>
+                  <a:srgbClr val="FF0000"/>
+                </a:solidFill>
+                <a:latin typeface="David" pitchFamily="34" charset="-79"/>
+                <a:cs typeface="David" pitchFamily="34" charset="-79"/>
+              </a:rPr>
+              <a:t> </a:t>
+            </a:r>
+            <a:r>
+              <a:rPr lang="he-IL" sz="2800" b="1" dirty="0" smtClean="0">
+                <a:latin typeface="David" pitchFamily="34" charset="-79"/>
+                <a:cs typeface="David" pitchFamily="34" charset="-79"/>
+              </a:rPr>
+              <a:t>בדרום</a:t>
+            </a:r>
+          </a:p>
+          <a:p>
             <a:pPr algn="ctr"/>
             <a:r>
               <a:rPr lang="he-IL" sz="2800" b="1" dirty="0" smtClean="0">
-                <a:latin typeface="David" pitchFamily="34" charset="-79"/>
-                <a:cs typeface="David" pitchFamily="34" charset="-79"/>
-              </a:rPr>
-              <a:t>העץ </a:t>
-            </a:r>
-            <a:r>
-              <a:rPr lang="he-IL" sz="2800" b="1" dirty="0" smtClean="0">
                 <a:solidFill>
                   <a:srgbClr val="FF0000"/>
                 </a:solidFill>
-                <a:latin typeface="David" pitchFamily="34" charset="-79"/>
-                <a:cs typeface="David" pitchFamily="34" charset="-79"/>
-              </a:rPr>
-              <a:t>ש</a:t>
-            </a:r>
-            <a:r>
-              <a:rPr lang="he-IL" sz="2800" b="1" dirty="0" smtClean="0">
-                <a:solidFill>
-                  <a:srgbClr val="0070C0"/>
-                </a:solidFill>
-                <a:latin typeface="David" pitchFamily="34" charset="-79"/>
-                <a:cs typeface="David" pitchFamily="34" charset="-79"/>
-              </a:rPr>
-              <a:t>משתחווה</a:t>
-            </a:r>
-            <a:endParaRPr lang="he-IL" sz="2800" b="1" dirty="0" smtClean="0">
-              <a:solidFill>
-                <a:srgbClr val="0070C0"/>
-              </a:solidFill>
-              <a:latin typeface="David" pitchFamily="34" charset="-79"/>
-              <a:cs typeface="David" pitchFamily="34" charset="-79"/>
-            </a:endParaRPr>
-          </a:p>
-          <a:p>
-            <a:pPr algn="ctr"/>
-            <a:r>
-              <a:rPr lang="he-IL" sz="2800" b="1" dirty="0" smtClean="0">
-                <a:solidFill>
-                  <a:srgbClr val="FF0000"/>
-                </a:solidFill>
-              </a:rPr>
-              <a:t>ש </a:t>
-            </a:r>
-            <a:r>
-              <a:rPr lang="he-IL" sz="2800" b="1" dirty="0" smtClean="0">
-                <a:solidFill>
-                  <a:srgbClr val="0070C0"/>
-                </a:solidFill>
-              </a:rPr>
-              <a:t>ק ד</a:t>
+              </a:rPr>
+              <a:t>א ש ל</a:t>
             </a:r>
             <a:endParaRPr lang="he-IL" sz="2800" b="1" dirty="0">
               <a:solidFill>
@@ -5071,7 +5333,7 @@
 </p:sld>
 </file>
 
-<file path=ppt/slides/slide4.xml><?xml version="1.0" encoding="utf-8"?>
+<file path=ppt/slides/slide3.xml><?xml version="1.0" encoding="utf-8"?>
 <p:sld xmlns:a="http://schemas.openxmlformats.org/drawingml/2006/main" xmlns:r="http://schemas.openxmlformats.org/officeDocument/2006/relationships" xmlns:p="http://schemas.openxmlformats.org/presentationml/2006/main">
   <p:cSld>
     <p:spTree>
@@ -5111,7 +5373,7 @@
                 <a:latin typeface="David" pitchFamily="34" charset="-79"/>
                 <a:cs typeface="David" pitchFamily="34" charset="-79"/>
               </a:rPr>
-              <a:t>תחנה 3</a:t>
+              <a:t>תחנה 2</a:t>
             </a:r>
           </a:p>
         </p:txBody>
@@ -5134,7 +5396,7 @@
         </p:spPr>
         <p:txBody>
           <a:bodyPr>
-            <a:normAutofit fontScale="85000" lnSpcReduction="20000"/>
+            <a:normAutofit fontScale="92500"/>
           </a:bodyPr>
           <a:lstStyle/>
           <a:p>
@@ -5143,20 +5405,15 @@
             </a:pPr>
             <a:r>
               <a:rPr lang="he-IL" sz="6600" dirty="0" smtClean="0"/>
-              <a:t>עץ החודש (לפעמים פעמיים ברצף</a:t>
-            </a:r>
-            <a:r>
-              <a:rPr lang="he-IL" sz="6600" dirty="0" smtClean="0"/>
-              <a:t>...)</a:t>
-            </a:r>
-            <a:endParaRPr lang="he-IL" sz="6600" dirty="0"/>
+              <a:t>קנגורו ספרותי בבאר שבע</a:t>
+            </a:r>
           </a:p>
           <a:p>
             <a:pPr algn="ctr">
               <a:buNone/>
             </a:pPr>
             <a:r>
-              <a:rPr lang="he-IL" sz="8000" dirty="0">
+              <a:rPr lang="he-IL" sz="8000" dirty="0" smtClean="0">
                 <a:solidFill>
                   <a:schemeClr val="accent6">
                     <a:lumMod val="75000"/>
@@ -5165,43 +5422,7 @@
                 <a:latin typeface="David" pitchFamily="34" charset="-79"/>
                 <a:cs typeface="David" pitchFamily="34" charset="-79"/>
               </a:rPr>
-              <a:t>( </a:t>
-            </a:r>
-            <a:r>
-              <a:rPr lang="he-IL" sz="8000" dirty="0" smtClean="0">
-                <a:solidFill>
-                  <a:schemeClr val="accent6">
-                    <a:lumMod val="75000"/>
-                  </a:schemeClr>
-                </a:solidFill>
-                <a:latin typeface="David" pitchFamily="34" charset="-79"/>
-                <a:cs typeface="David" pitchFamily="34" charset="-79"/>
-              </a:rPr>
-              <a:t>_ </a:t>
-            </a:r>
-            <a:r>
-              <a:rPr lang="he-IL" sz="8000" dirty="0">
-                <a:solidFill>
-                  <a:schemeClr val="accent6">
-                    <a:lumMod val="75000"/>
-                  </a:schemeClr>
-                </a:solidFill>
-                <a:latin typeface="David" pitchFamily="34" charset="-79"/>
-                <a:cs typeface="David" pitchFamily="34" charset="-79"/>
-              </a:rPr>
-              <a:t>_ </a:t>
-            </a:r>
-            <a:r>
-              <a:rPr lang="he-IL" sz="8000" dirty="0" smtClean="0">
-                <a:solidFill>
-                  <a:schemeClr val="accent6">
-                    <a:lumMod val="75000"/>
-                  </a:schemeClr>
-                </a:solidFill>
-                <a:latin typeface="David" pitchFamily="34" charset="-79"/>
-                <a:cs typeface="David" pitchFamily="34" charset="-79"/>
-              </a:rPr>
-              <a:t>_ </a:t>
+              <a:t>( _ _ _ _ </a:t>
             </a:r>
             <a:r>
               <a:rPr lang="he-IL" sz="8000" dirty="0">
@@ -5391,8 +5612,8 @@
         </p:nvSpPr>
         <p:spPr>
           <a:xfrm>
-            <a:off x="381000" y="4495800"/>
-            <a:ext cx="3810000" cy="1692771"/>
+            <a:off x="609600" y="4495800"/>
+            <a:ext cx="3352800" cy="1692771"/>
           </a:xfrm>
           <a:prstGeom prst="rect">
             <a:avLst/>
@@ -5411,7 +5632,7 @@
                   <a:srgbClr val="0070C0"/>
                 </a:solidFill>
               </a:rPr>
-              <a:t>פתרון חידה 2</a:t>
+              <a:t>פתרון חידה 1</a:t>
             </a:r>
           </a:p>
           <a:p>
@@ -5423,25 +5644,13 @@
             </a:endParaRPr>
           </a:p>
           <a:p>
-            <a:pPr algn="ctr">
-              <a:buNone/>
-            </a:pPr>
-            <a:r>
-              <a:rPr lang="he-IL" sz="2800" b="1" dirty="0" smtClean="0">
-                <a:solidFill>
-                  <a:srgbClr val="0070C0"/>
-                </a:solidFill>
-                <a:latin typeface="David" pitchFamily="34" charset="-79"/>
-                <a:cs typeface="David" pitchFamily="34" charset="-79"/>
-              </a:rPr>
-              <a:t>קנגורו ספרותי</a:t>
-            </a:r>
-            <a:r>
-              <a:rPr lang="he-IL" sz="2800" b="1" dirty="0" smtClean="0">
-                <a:latin typeface="David" pitchFamily="34" charset="-79"/>
-                <a:cs typeface="David" pitchFamily="34" charset="-79"/>
-              </a:rPr>
-              <a:t> ב</a:t>
+            <a:pPr algn="ctr"/>
+            <a:r>
+              <a:rPr lang="he-IL" sz="2800" b="1" dirty="0" smtClean="0">
+                <a:latin typeface="David" pitchFamily="34" charset="-79"/>
+                <a:cs typeface="David" pitchFamily="34" charset="-79"/>
+              </a:rPr>
+              <a:t>העץ </a:t>
             </a:r>
             <a:r>
               <a:rPr lang="he-IL" sz="2800" b="1" dirty="0" smtClean="0">
@@ -5451,59 +5660,41 @@
                 <a:latin typeface="David" pitchFamily="34" charset="-79"/>
                 <a:cs typeface="David" pitchFamily="34" charset="-79"/>
               </a:rPr>
-              <a:t>באר </a:t>
-            </a:r>
+              <a:t>ש</a:t>
+            </a:r>
+            <a:r>
+              <a:rPr lang="he-IL" sz="2800" b="1" dirty="0" smtClean="0">
+                <a:solidFill>
+                  <a:srgbClr val="0070C0"/>
+                </a:solidFill>
+                <a:latin typeface="David" pitchFamily="34" charset="-79"/>
+                <a:cs typeface="David" pitchFamily="34" charset="-79"/>
+              </a:rPr>
+              <a:t>משתחווה</a:t>
+            </a:r>
+          </a:p>
+          <a:p>
+            <a:pPr algn="ctr"/>
             <a:r>
               <a:rPr lang="he-IL" sz="2800" b="1" dirty="0" smtClean="0">
                 <a:solidFill>
                   <a:srgbClr val="FF0000"/>
                 </a:solidFill>
-                <a:latin typeface="David" pitchFamily="34" charset="-79"/>
-                <a:cs typeface="David" pitchFamily="34" charset="-79"/>
-              </a:rPr>
-              <a:t>שבע</a:t>
-            </a:r>
-          </a:p>
-          <a:p>
-            <a:pPr algn="ctr">
-              <a:buNone/>
-            </a:pPr>
-            <a:r>
-              <a:rPr lang="he-IL" sz="2800" b="1" dirty="0" smtClean="0">
-                <a:solidFill>
-                  <a:srgbClr val="FF0000"/>
-                </a:solidFill>
-                <a:latin typeface="David" pitchFamily="34" charset="-79"/>
-                <a:cs typeface="David" pitchFamily="34" charset="-79"/>
-              </a:rPr>
-              <a:t>ב </a:t>
-            </a:r>
-            <a:r>
-              <a:rPr lang="he-IL" sz="2800" b="1" dirty="0" smtClean="0">
-                <a:solidFill>
-                  <a:srgbClr val="0070C0"/>
-                </a:solidFill>
-                <a:latin typeface="David" pitchFamily="34" charset="-79"/>
-                <a:cs typeface="David" pitchFamily="34" charset="-79"/>
-              </a:rPr>
-              <a:t>ר ו</a:t>
-            </a:r>
-            <a:r>
-              <a:rPr lang="he-IL" sz="2800" b="1" dirty="0" smtClean="0">
-                <a:solidFill>
-                  <a:srgbClr val="FF0000"/>
-                </a:solidFill>
-                <a:latin typeface="David" pitchFamily="34" charset="-79"/>
-                <a:cs typeface="David" pitchFamily="34" charset="-79"/>
-              </a:rPr>
-              <a:t> ש</a:t>
-            </a:r>
-            <a:endParaRPr lang="he-IL" sz="2800" b="1" dirty="0" smtClean="0">
+              </a:rPr>
+              <a:t>ש </a:t>
+            </a:r>
+            <a:r>
+              <a:rPr lang="he-IL" sz="2800" b="1" dirty="0" smtClean="0">
+                <a:solidFill>
+                  <a:srgbClr val="0070C0"/>
+                </a:solidFill>
+              </a:rPr>
+              <a:t>ק ד</a:t>
+            </a:r>
+            <a:endParaRPr lang="he-IL" sz="2800" b="1" dirty="0">
               <a:solidFill>
-                <a:srgbClr val="FF0000"/>
+                <a:srgbClr val="0070C0"/>
               </a:solidFill>
-              <a:latin typeface="David" pitchFamily="34" charset="-79"/>
-              <a:cs typeface="David" pitchFamily="34" charset="-79"/>
             </a:endParaRPr>
           </a:p>
         </p:txBody>
@@ -5516,7 +5707,7 @@
 </p:sld>
 </file>
 
-<file path=ppt/slides/slide5.xml><?xml version="1.0" encoding="utf-8"?>
+<file path=ppt/slides/slide4.xml><?xml version="1.0" encoding="utf-8"?>
 <p:sld xmlns:a="http://schemas.openxmlformats.org/drawingml/2006/main" xmlns:r="http://schemas.openxmlformats.org/officeDocument/2006/relationships" xmlns:p="http://schemas.openxmlformats.org/presentationml/2006/main">
   <p:cSld>
     <p:spTree>
@@ -5556,7 +5747,7 @@
                 <a:latin typeface="David" pitchFamily="34" charset="-79"/>
                 <a:cs typeface="David" pitchFamily="34" charset="-79"/>
               </a:rPr>
-              <a:t>תחנה 4</a:t>
+              <a:t>תחנה 3</a:t>
             </a:r>
           </a:p>
         </p:txBody>
@@ -5579,7 +5770,7 @@
         </p:spPr>
         <p:txBody>
           <a:bodyPr>
-            <a:normAutofit/>
+            <a:normAutofit fontScale="85000" lnSpcReduction="20000"/>
           </a:bodyPr>
           <a:lstStyle/>
           <a:p>
@@ -5588,16 +5779,16 @@
             </a:pPr>
             <a:r>
               <a:rPr lang="he-IL" sz="6600" dirty="0" smtClean="0"/>
-              <a:t>בחור מבולבל ומתוק</a:t>
-            </a:r>
-            <a:endParaRPr lang="he-IL" sz="6600" dirty="0" smtClean="0"/>
+              <a:t>עץ החודש (לפעמים פעמיים ברצף...)</a:t>
+            </a:r>
+            <a:endParaRPr lang="he-IL" sz="6600" dirty="0"/>
           </a:p>
           <a:p>
             <a:pPr algn="ctr">
               <a:buNone/>
             </a:pPr>
             <a:r>
-              <a:rPr lang="he-IL" sz="8000" dirty="0" smtClean="0">
+              <a:rPr lang="he-IL" sz="8000" dirty="0">
                 <a:solidFill>
                   <a:schemeClr val="accent6">
                     <a:lumMod val="75000"/>
@@ -5606,7 +5797,43 @@
                 <a:latin typeface="David" pitchFamily="34" charset="-79"/>
                 <a:cs typeface="David" pitchFamily="34" charset="-79"/>
               </a:rPr>
-              <a:t>( _ _ _ _ </a:t>
+              <a:t>( </a:t>
+            </a:r>
+            <a:r>
+              <a:rPr lang="he-IL" sz="8000" dirty="0" smtClean="0">
+                <a:solidFill>
+                  <a:schemeClr val="accent6">
+                    <a:lumMod val="75000"/>
+                  </a:schemeClr>
+                </a:solidFill>
+                <a:latin typeface="David" pitchFamily="34" charset="-79"/>
+                <a:cs typeface="David" pitchFamily="34" charset="-79"/>
+              </a:rPr>
+              <a:t>_ </a:t>
+            </a:r>
+            <a:r>
+              <a:rPr lang="he-IL" sz="8000" dirty="0">
+                <a:solidFill>
+                  <a:schemeClr val="accent6">
+                    <a:lumMod val="75000"/>
+                  </a:schemeClr>
+                </a:solidFill>
+                <a:latin typeface="David" pitchFamily="34" charset="-79"/>
+                <a:cs typeface="David" pitchFamily="34" charset="-79"/>
+              </a:rPr>
+              <a:t>_ </a:t>
+            </a:r>
+            <a:r>
+              <a:rPr lang="he-IL" sz="8000" dirty="0" smtClean="0">
+                <a:solidFill>
+                  <a:schemeClr val="accent6">
+                    <a:lumMod val="75000"/>
+                  </a:schemeClr>
+                </a:solidFill>
+                <a:latin typeface="David" pitchFamily="34" charset="-79"/>
+                <a:cs typeface="David" pitchFamily="34" charset="-79"/>
+              </a:rPr>
+              <a:t>_ </a:t>
             </a:r>
             <a:r>
               <a:rPr lang="he-IL" sz="8000" dirty="0">
@@ -5796,8 +6023,8 @@
         </p:nvSpPr>
         <p:spPr>
           <a:xfrm>
-            <a:off x="457200" y="4495800"/>
-            <a:ext cx="3657600" cy="2123658"/>
+            <a:off x="381000" y="4495800"/>
+            <a:ext cx="3810000" cy="1692771"/>
           </a:xfrm>
           <a:prstGeom prst="rect">
             <a:avLst/>
@@ -5816,21 +6043,8 @@
                   <a:srgbClr val="0070C0"/>
                 </a:solidFill>
               </a:rPr>
-              <a:t>פתרון חידה </a:t>
-            </a:r>
-            <a:r>
-              <a:rPr lang="he-IL" sz="2400" dirty="0" smtClean="0">
-                <a:solidFill>
-                  <a:srgbClr val="0070C0"/>
-                </a:solidFill>
-              </a:rPr>
-              <a:t>3</a:t>
-            </a:r>
-            <a:endParaRPr lang="he-IL" sz="2400" dirty="0">
-              <a:solidFill>
-                <a:srgbClr val="0070C0"/>
-              </a:solidFill>
-            </a:endParaRPr>
+              <a:t>פתרון חידה 2</a:t>
+            </a:r>
           </a:p>
           <a:p>
             <a:pPr algn="ctr"/>
@@ -5845,28 +6059,32 @@
               <a:buNone/>
             </a:pPr>
             <a:r>
-              <a:rPr lang="he-IL" sz="2800" dirty="0" smtClean="0"/>
-              <a:t>עץ </a:t>
-            </a:r>
-            <a:r>
-              <a:rPr lang="he-IL" sz="2800" dirty="0" smtClean="0">
+              <a:rPr lang="he-IL" sz="2800" b="1" dirty="0" smtClean="0">
+                <a:solidFill>
+                  <a:srgbClr val="0070C0"/>
+                </a:solidFill>
+                <a:latin typeface="David" pitchFamily="34" charset="-79"/>
+                <a:cs typeface="David" pitchFamily="34" charset="-79"/>
+              </a:rPr>
+              <a:t>קנגורו ספרותי</a:t>
+            </a:r>
+            <a:r>
+              <a:rPr lang="he-IL" sz="2800" b="1" dirty="0" smtClean="0">
+                <a:latin typeface="David" pitchFamily="34" charset="-79"/>
+                <a:cs typeface="David" pitchFamily="34" charset="-79"/>
+              </a:rPr>
+              <a:t> ב</a:t>
+            </a:r>
+            <a:r>
+              <a:rPr lang="he-IL" sz="2800" b="1" dirty="0" smtClean="0">
                 <a:solidFill>
                   <a:srgbClr val="FF0000"/>
                 </a:solidFill>
-              </a:rPr>
-              <a:t>החודש</a:t>
-            </a:r>
-            <a:r>
-              <a:rPr lang="he-IL" sz="2800" dirty="0" smtClean="0"/>
-              <a:t> (לפעמים פעמיים ברצף...)</a:t>
-            </a:r>
-            <a:endParaRPr lang="he-IL" sz="2800" b="1" dirty="0" smtClean="0">
-              <a:solidFill>
-                <a:srgbClr val="FF0000"/>
-              </a:solidFill>
-              <a:latin typeface="David" pitchFamily="34" charset="-79"/>
-              <a:cs typeface="David" pitchFamily="34" charset="-79"/>
-            </a:endParaRPr>
+                <a:latin typeface="David" pitchFamily="34" charset="-79"/>
+                <a:cs typeface="David" pitchFamily="34" charset="-79"/>
+              </a:rPr>
+              <a:t>באר שבע</a:t>
+            </a:r>
           </a:p>
           <a:p>
             <a:pPr algn="ctr">
@@ -5880,15 +6098,28 @@
                 <a:latin typeface="David" pitchFamily="34" charset="-79"/>
                 <a:cs typeface="David" pitchFamily="34" charset="-79"/>
               </a:rPr>
-              <a:t>א ד ר</a:t>
-            </a:r>
-            <a:endParaRPr lang="he-IL" sz="2800" b="1" dirty="0">
-              <a:solidFill>
-                <a:srgbClr val="FF0000"/>
-              </a:solidFill>
-              <a:latin typeface="David" pitchFamily="34" charset="-79"/>
-              <a:cs typeface="David" pitchFamily="34" charset="-79"/>
-            </a:endParaRPr>
+              <a:t>ב </a:t>
+            </a:r>
+            <a:r>
+              <a:rPr lang="he-IL" sz="2800" b="1" dirty="0" smtClean="0">
+                <a:solidFill>
+                  <a:srgbClr val="0070C0"/>
+                </a:solidFill>
+                <a:latin typeface="David" pitchFamily="34" charset="-79"/>
+                <a:cs typeface="David" pitchFamily="34" charset="-79"/>
+              </a:rPr>
+              <a:t>ר ו</a:t>
+            </a:r>
+            <a:r>
+              <a:rPr lang="he-IL" sz="2800" b="1" dirty="0" smtClean="0">
+                <a:solidFill>
+                  <a:srgbClr val="FF0000"/>
+                </a:solidFill>
+                <a:latin typeface="David" pitchFamily="34" charset="-79"/>
+                <a:cs typeface="David" pitchFamily="34" charset="-79"/>
+              </a:rPr>
+              <a:t> ש</a:t>
+            </a:r>
           </a:p>
         </p:txBody>
       </p:sp>
@@ -5900,7 +6131,7 @@
 </p:sld>
 </file>
 
-<file path=ppt/slides/slide6.xml><?xml version="1.0" encoding="utf-8"?>
+<file path=ppt/slides/slide5.xml><?xml version="1.0" encoding="utf-8"?>
 <p:sld xmlns:a="http://schemas.openxmlformats.org/drawingml/2006/main" xmlns:r="http://schemas.openxmlformats.org/officeDocument/2006/relationships" xmlns:p="http://schemas.openxmlformats.org/presentationml/2006/main">
   <p:cSld>
     <p:spTree>
@@ -5940,7 +6171,7 @@
                 <a:latin typeface="David" pitchFamily="34" charset="-79"/>
                 <a:cs typeface="David" pitchFamily="34" charset="-79"/>
               </a:rPr>
-              <a:t>תחנה 5</a:t>
+              <a:t>תחנה 4</a:t>
             </a:r>
           </a:p>
         </p:txBody>
@@ -5963,7 +6194,7 @@
         </p:spPr>
         <p:txBody>
           <a:bodyPr>
-            <a:normAutofit fontScale="85000" lnSpcReduction="20000"/>
+            <a:normAutofit/>
           </a:bodyPr>
           <a:lstStyle/>
           <a:p>
@@ -5972,9 +6203,8 @@
             </a:pPr>
             <a:r>
               <a:rPr lang="he-IL" sz="6600" dirty="0" smtClean="0"/>
-              <a:t>הזוהר שלהן נפוץ ביערות קק"ל</a:t>
-            </a:r>
-            <a:endParaRPr lang="he-IL" sz="6600" dirty="0" smtClean="0"/>
+              <a:t>בחור מבולבל ומתוק</a:t>
+            </a:r>
           </a:p>
           <a:p>
             <a:pPr algn="ctr">
@@ -5990,43 +6220,7 @@
                 <a:latin typeface="David" pitchFamily="34" charset="-79"/>
                 <a:cs typeface="David" pitchFamily="34" charset="-79"/>
               </a:rPr>
-              <a:t>( </a:t>
-            </a:r>
-            <a:r>
-              <a:rPr lang="he-IL" sz="8000" dirty="0" smtClean="0">
-                <a:solidFill>
-                  <a:schemeClr val="accent6">
-                    <a:lumMod val="75000"/>
-                  </a:schemeClr>
-                </a:solidFill>
-                <a:latin typeface="David" pitchFamily="34" charset="-79"/>
-                <a:cs typeface="David" pitchFamily="34" charset="-79"/>
-              </a:rPr>
-              <a:t>_ </a:t>
-            </a:r>
-            <a:r>
-              <a:rPr lang="he-IL" sz="8000" dirty="0">
-                <a:solidFill>
-                  <a:schemeClr val="accent6">
-                    <a:lumMod val="75000"/>
-                  </a:schemeClr>
-                </a:solidFill>
-                <a:latin typeface="David" pitchFamily="34" charset="-79"/>
-                <a:cs typeface="David" pitchFamily="34" charset="-79"/>
-              </a:rPr>
-              <a:t>_ </a:t>
-            </a:r>
-            <a:r>
-              <a:rPr lang="he-IL" sz="8000" dirty="0" smtClean="0">
-                <a:solidFill>
-                  <a:schemeClr val="accent6">
-                    <a:lumMod val="75000"/>
-                  </a:schemeClr>
-                </a:solidFill>
-                <a:latin typeface="David" pitchFamily="34" charset="-79"/>
-                <a:cs typeface="David" pitchFamily="34" charset="-79"/>
-              </a:rPr>
-              <a:t>_ _ </a:t>
+              <a:t>( _ _ _ _ </a:t>
             </a:r>
             <a:r>
               <a:rPr lang="he-IL" sz="8000" dirty="0">
@@ -6216,8 +6410,8 @@
         </p:nvSpPr>
         <p:spPr>
           <a:xfrm>
-            <a:off x="152400" y="4495800"/>
-            <a:ext cx="4572000" cy="1692771"/>
+            <a:off x="457200" y="4495800"/>
+            <a:ext cx="3657600" cy="2123658"/>
           </a:xfrm>
           <a:prstGeom prst="rect">
             <a:avLst/>
@@ -6244,7 +6438,7 @@
                   <a:srgbClr val="0070C0"/>
                 </a:solidFill>
               </a:rPr>
-              <a:t>4</a:t>
+              <a:t>3</a:t>
             </a:r>
             <a:endParaRPr lang="he-IL" sz="2400" dirty="0">
               <a:solidFill>
@@ -6265,59 +6459,28 @@
               <a:buNone/>
             </a:pPr>
             <a:r>
-              <a:rPr lang="he-IL" sz="2800" b="1" dirty="0" smtClean="0">
+              <a:rPr lang="he-IL" sz="2800" dirty="0" smtClean="0"/>
+              <a:t>עץ </a:t>
+            </a:r>
+            <a:r>
+              <a:rPr lang="he-IL" sz="2800" dirty="0" smtClean="0">
                 <a:solidFill>
                   <a:srgbClr val="FF0000"/>
                 </a:solidFill>
-                <a:latin typeface="David" pitchFamily="34" charset="-79"/>
-                <a:cs typeface="David" pitchFamily="34" charset="-79"/>
-              </a:rPr>
-              <a:t>ב</a:t>
-            </a:r>
-            <a:r>
-              <a:rPr lang="he-IL" sz="2800" b="1" dirty="0" smtClean="0">
-                <a:solidFill>
-                  <a:srgbClr val="00B050"/>
-                </a:solidFill>
-                <a:latin typeface="David" pitchFamily="34" charset="-79"/>
-                <a:cs typeface="David" pitchFamily="34" charset="-79"/>
-              </a:rPr>
-              <a:t>ח</a:t>
-            </a:r>
-            <a:r>
-              <a:rPr lang="he-IL" sz="2800" b="1" dirty="0" smtClean="0">
-                <a:solidFill>
-                  <a:srgbClr val="0070C0"/>
-                </a:solidFill>
-                <a:latin typeface="David" pitchFamily="34" charset="-79"/>
-                <a:cs typeface="David" pitchFamily="34" charset="-79"/>
-              </a:rPr>
-              <a:t>ו</a:t>
-            </a:r>
-            <a:r>
-              <a:rPr lang="he-IL" sz="2800" b="1" dirty="0" smtClean="0">
-                <a:solidFill>
-                  <a:srgbClr val="FFC000"/>
-                </a:solidFill>
-                <a:latin typeface="David" pitchFamily="34" charset="-79"/>
-                <a:cs typeface="David" pitchFamily="34" charset="-79"/>
-              </a:rPr>
-              <a:t>ר</a:t>
-            </a:r>
-            <a:r>
-              <a:rPr lang="he-IL" sz="2800" b="1" dirty="0" smtClean="0">
-                <a:latin typeface="David" pitchFamily="34" charset="-79"/>
-                <a:cs typeface="David" pitchFamily="34" charset="-79"/>
-              </a:rPr>
-              <a:t> מבולבל </a:t>
-            </a:r>
-            <a:r>
-              <a:rPr lang="he-IL" sz="2800" b="1" dirty="0" smtClean="0">
-                <a:latin typeface="David" pitchFamily="34" charset="-79"/>
-                <a:cs typeface="David" pitchFamily="34" charset="-79"/>
-              </a:rPr>
-              <a:t>ומתוק</a:t>
-            </a:r>
+              </a:rPr>
+              <a:t>החודש</a:t>
+            </a:r>
+            <a:r>
+              <a:rPr lang="he-IL" sz="2800" dirty="0" smtClean="0"/>
+              <a:t> (לפעמים פעמיים ברצף...)</a:t>
+            </a:r>
+            <a:endParaRPr lang="he-IL" sz="2800" b="1" dirty="0" smtClean="0">
+              <a:solidFill>
+                <a:srgbClr val="FF0000"/>
+              </a:solidFill>
+              <a:latin typeface="David" pitchFamily="34" charset="-79"/>
+              <a:cs typeface="David" pitchFamily="34" charset="-79"/>
+            </a:endParaRPr>
           </a:p>
           <a:p>
             <a:pPr algn="ctr">
@@ -6326,64 +6489,14 @@
             <a:r>
               <a:rPr lang="he-IL" sz="2800" b="1" dirty="0" smtClean="0">
                 <a:solidFill>
-                  <a:srgbClr val="00B050"/>
-                </a:solidFill>
-                <a:latin typeface="David" pitchFamily="34" charset="-79"/>
-                <a:cs typeface="David" pitchFamily="34" charset="-79"/>
-              </a:rPr>
-              <a:t>ח</a:t>
-            </a:r>
-            <a:r>
-              <a:rPr lang="he-IL" sz="2800" b="1" dirty="0" smtClean="0">
-                <a:solidFill>
                   <a:srgbClr val="FF0000"/>
                 </a:solidFill>
                 <a:latin typeface="David" pitchFamily="34" charset="-79"/>
                 <a:cs typeface="David" pitchFamily="34" charset="-79"/>
               </a:rPr>
-              <a:t> </a:t>
-            </a:r>
-            <a:r>
-              <a:rPr lang="he-IL" sz="2800" b="1" dirty="0" smtClean="0">
-                <a:solidFill>
-                  <a:srgbClr val="FFC000"/>
-                </a:solidFill>
-                <a:latin typeface="David" pitchFamily="34" charset="-79"/>
-                <a:cs typeface="David" pitchFamily="34" charset="-79"/>
-              </a:rPr>
-              <a:t>ר</a:t>
-            </a:r>
-            <a:r>
-              <a:rPr lang="he-IL" sz="2800" b="1" dirty="0" smtClean="0">
-                <a:solidFill>
-                  <a:srgbClr val="FF0000"/>
-                </a:solidFill>
-                <a:latin typeface="David" pitchFamily="34" charset="-79"/>
-                <a:cs typeface="David" pitchFamily="34" charset="-79"/>
-              </a:rPr>
-              <a:t> </a:t>
-            </a:r>
-            <a:r>
-              <a:rPr lang="he-IL" sz="2800" b="1" dirty="0" smtClean="0">
-                <a:solidFill>
-                  <a:srgbClr val="0070C0"/>
-                </a:solidFill>
-                <a:latin typeface="David" pitchFamily="34" charset="-79"/>
-                <a:cs typeface="David" pitchFamily="34" charset="-79"/>
-              </a:rPr>
-              <a:t>ו</a:t>
-            </a:r>
-            <a:r>
-              <a:rPr lang="he-IL" sz="2800" b="1" dirty="0" smtClean="0">
-                <a:solidFill>
-                  <a:srgbClr val="FF0000"/>
-                </a:solidFill>
-                <a:latin typeface="David" pitchFamily="34" charset="-79"/>
-                <a:cs typeface="David" pitchFamily="34" charset="-79"/>
-              </a:rPr>
-              <a:t> ב</a:t>
-            </a:r>
-            <a:endParaRPr lang="he-IL" sz="2800" b="1" dirty="0" smtClean="0">
+              <a:t>א ד ר</a:t>
+            </a:r>
+            <a:endParaRPr lang="he-IL" sz="2800" b="1" dirty="0">
               <a:solidFill>
                 <a:srgbClr val="FF0000"/>
               </a:solidFill>
@@ -6401,7 +6514,7 @@
 </p:sld>
 </file>
 
-<file path=ppt/slides/slide7.xml><?xml version="1.0" encoding="utf-8"?>
+<file path=ppt/slides/slide6.xml><?xml version="1.0" encoding="utf-8"?>
 <p:sld xmlns:a="http://schemas.openxmlformats.org/drawingml/2006/main" xmlns:r="http://schemas.openxmlformats.org/officeDocument/2006/relationships" xmlns:p="http://schemas.openxmlformats.org/presentationml/2006/main">
   <p:cSld>
     <p:spTree>
@@ -6441,7 +6554,7 @@
                 <a:latin typeface="David" pitchFamily="34" charset="-79"/>
                 <a:cs typeface="David" pitchFamily="34" charset="-79"/>
               </a:rPr>
-              <a:t>תחנה 6</a:t>
+              <a:t>תחנה 5</a:t>
             </a:r>
           </a:p>
         </p:txBody>
@@ -6473,16 +6586,15 @@
             </a:pPr>
             <a:r>
               <a:rPr lang="he-IL" sz="6600" dirty="0" smtClean="0"/>
-              <a:t>העץ הוא לא פיסטוק ולא בסדר</a:t>
-            </a:r>
-            <a:endParaRPr lang="he-IL" sz="6600" dirty="0"/>
+              <a:t>הזוהר שלהן נפוץ ביערות קק"ל</a:t>
+            </a:r>
           </a:p>
           <a:p>
             <a:pPr algn="ctr">
               <a:buNone/>
             </a:pPr>
             <a:r>
-              <a:rPr lang="he-IL" sz="8000" dirty="0">
+              <a:rPr lang="he-IL" sz="8000" dirty="0" smtClean="0">
                 <a:solidFill>
                   <a:schemeClr val="accent6">
                     <a:lumMod val="75000"/>
@@ -6494,7 +6606,7 @@
               <a:t>( _ </a:t>
             </a:r>
             <a:r>
-              <a:rPr lang="he-IL" sz="8000" dirty="0" smtClean="0">
+              <a:rPr lang="he-IL" sz="8000" dirty="0">
                 <a:solidFill>
                   <a:schemeClr val="accent6">
                     <a:lumMod val="75000"/>
@@ -6503,7 +6615,7 @@
                 <a:latin typeface="David" pitchFamily="34" charset="-79"/>
                 <a:cs typeface="David" pitchFamily="34" charset="-79"/>
               </a:rPr>
-              <a:t>_ _ _ _ _ _ </a:t>
+              <a:t>_ </a:t>
             </a:r>
             <a:r>
               <a:rPr lang="he-IL" sz="8000" dirty="0" smtClean="0">
@@ -6515,7 +6627,7 @@
                 <a:latin typeface="David" pitchFamily="34" charset="-79"/>
                 <a:cs typeface="David" pitchFamily="34" charset="-79"/>
               </a:rPr>
-              <a:t>_ </a:t>
+              <a:t>_ _ </a:t>
             </a:r>
             <a:r>
               <a:rPr lang="he-IL" sz="8000" dirty="0">
@@ -6705,8 +6817,8 @@
         </p:nvSpPr>
         <p:spPr>
           <a:xfrm>
-            <a:off x="609600" y="4495800"/>
-            <a:ext cx="3352800" cy="2123658"/>
+            <a:off x="152400" y="4495800"/>
+            <a:ext cx="4572000" cy="1692771"/>
           </a:xfrm>
           <a:prstGeom prst="rect">
             <a:avLst/>
@@ -6733,7 +6845,7 @@
                   <a:srgbClr val="0070C0"/>
                 </a:solidFill>
               </a:rPr>
-              <a:t>5</a:t>
+              <a:t>4</a:t>
             </a:r>
             <a:endParaRPr lang="he-IL" sz="2400" dirty="0">
               <a:solidFill>
@@ -6761,19 +6873,45 @@
                 <a:latin typeface="David" pitchFamily="34" charset="-79"/>
                 <a:cs typeface="David" pitchFamily="34" charset="-79"/>
               </a:rPr>
-              <a:t>הזוהר שלהן </a:t>
-            </a:r>
-            <a:r>
-              <a:rPr lang="he-IL" sz="2800" b="1" dirty="0" smtClean="0">
-                <a:latin typeface="David" pitchFamily="34" charset="-79"/>
-                <a:cs typeface="David" pitchFamily="34" charset="-79"/>
-              </a:rPr>
-              <a:t>נפוץ ביערות קק"ל</a:t>
-            </a:r>
-            <a:endParaRPr lang="he-IL" sz="2800" b="1" dirty="0" smtClean="0">
-              <a:latin typeface="David" pitchFamily="34" charset="-79"/>
-              <a:cs typeface="David" pitchFamily="34" charset="-79"/>
-            </a:endParaRPr>
+              <a:t>ב</a:t>
+            </a:r>
+            <a:r>
+              <a:rPr lang="he-IL" sz="2800" b="1" dirty="0" smtClean="0">
+                <a:solidFill>
+                  <a:srgbClr val="00B050"/>
+                </a:solidFill>
+                <a:latin typeface="David" pitchFamily="34" charset="-79"/>
+                <a:cs typeface="David" pitchFamily="34" charset="-79"/>
+              </a:rPr>
+              <a:t>ח</a:t>
+            </a:r>
+            <a:r>
+              <a:rPr lang="he-IL" sz="2800" b="1" dirty="0" smtClean="0">
+                <a:solidFill>
+                  <a:srgbClr val="0070C0"/>
+                </a:solidFill>
+                <a:latin typeface="David" pitchFamily="34" charset="-79"/>
+                <a:cs typeface="David" pitchFamily="34" charset="-79"/>
+              </a:rPr>
+              <a:t>ו</a:t>
+            </a:r>
+            <a:r>
+              <a:rPr lang="he-IL" sz="2800" b="1" dirty="0" smtClean="0">
+                <a:solidFill>
+                  <a:srgbClr val="FFC000"/>
+                </a:solidFill>
+                <a:latin typeface="David" pitchFamily="34" charset="-79"/>
+                <a:cs typeface="David" pitchFamily="34" charset="-79"/>
+              </a:rPr>
+              <a:t>ר</a:t>
+            </a:r>
+            <a:r>
+              <a:rPr lang="he-IL" sz="2800" b="1" dirty="0" smtClean="0">
+                <a:latin typeface="David" pitchFamily="34" charset="-79"/>
+                <a:cs typeface="David" pitchFamily="34" charset="-79"/>
+              </a:rPr>
+              <a:t> מבולבל ומתוק</a:t>
+            </a:r>
           </a:p>
           <a:p>
             <a:pPr algn="ctr">
@@ -6782,16 +6920,63 @@
             <a:r>
               <a:rPr lang="he-IL" sz="2800" b="1" dirty="0" smtClean="0">
                 <a:solidFill>
+                  <a:srgbClr val="00B050"/>
+                </a:solidFill>
+                <a:latin typeface="David" pitchFamily="34" charset="-79"/>
+                <a:cs typeface="David" pitchFamily="34" charset="-79"/>
+              </a:rPr>
+              <a:t>ח</a:t>
+            </a:r>
+            <a:r>
+              <a:rPr lang="he-IL" sz="2800" b="1" dirty="0" smtClean="0">
+                <a:solidFill>
                   <a:srgbClr val="FF0000"/>
                 </a:solidFill>
-              </a:rPr>
-              <a:t>א ו ר ן</a:t>
-            </a:r>
-            <a:endParaRPr lang="he-IL" sz="2800" b="1" dirty="0">
-              <a:solidFill>
-                <a:srgbClr val="0070C0"/>
-              </a:solidFill>
-            </a:endParaRPr>
+                <a:latin typeface="David" pitchFamily="34" charset="-79"/>
+                <a:cs typeface="David" pitchFamily="34" charset="-79"/>
+              </a:rPr>
+              <a:t> </a:t>
+            </a:r>
+            <a:r>
+              <a:rPr lang="he-IL" sz="2800" b="1" dirty="0" smtClean="0">
+                <a:solidFill>
+                  <a:srgbClr val="FFC000"/>
+                </a:solidFill>
+                <a:latin typeface="David" pitchFamily="34" charset="-79"/>
+                <a:cs typeface="David" pitchFamily="34" charset="-79"/>
+              </a:rPr>
+              <a:t>ר</a:t>
+            </a:r>
+            <a:r>
+              <a:rPr lang="he-IL" sz="2800" b="1" dirty="0" smtClean="0">
+                <a:solidFill>
+                  <a:srgbClr val="FF0000"/>
+                </a:solidFill>
+                <a:latin typeface="David" pitchFamily="34" charset="-79"/>
+                <a:cs typeface="David" pitchFamily="34" charset="-79"/>
+              </a:rPr>
+              <a:t> </a:t>
+            </a:r>
+            <a:r>
+              <a:rPr lang="he-IL" sz="2800" b="1" dirty="0" smtClean="0">
+                <a:solidFill>
+                  <a:srgbClr val="0070C0"/>
+                </a:solidFill>
+                <a:latin typeface="David" pitchFamily="34" charset="-79"/>
+                <a:cs typeface="David" pitchFamily="34" charset="-79"/>
+              </a:rPr>
+              <a:t>ו</a:t>
+            </a:r>
+            <a:r>
+              <a:rPr lang="he-IL" sz="2800" b="1" dirty="0" smtClean="0">
+                <a:solidFill>
+                  <a:srgbClr val="FF0000"/>
+                </a:solidFill>
+                <a:latin typeface="David" pitchFamily="34" charset="-79"/>
+                <a:cs typeface="David" pitchFamily="34" charset="-79"/>
+              </a:rPr>
+              <a:t> ב</a:t>
+            </a:r>
           </a:p>
         </p:txBody>
       </p:sp>
@@ -6803,7 +6988,7 @@
 </p:sld>
 </file>
 
-<file path=ppt/slides/slide8.xml><?xml version="1.0" encoding="utf-8"?>
+<file path=ppt/slides/slide7.xml><?xml version="1.0" encoding="utf-8"?>
 <p:sld xmlns:a="http://schemas.openxmlformats.org/drawingml/2006/main" xmlns:r="http://schemas.openxmlformats.org/officeDocument/2006/relationships" xmlns:p="http://schemas.openxmlformats.org/presentationml/2006/main">
   <p:cSld>
     <p:spTree>
@@ -6843,7 +7028,7 @@
                 <a:latin typeface="David" pitchFamily="34" charset="-79"/>
                 <a:cs typeface="David" pitchFamily="34" charset="-79"/>
               </a:rPr>
-              <a:t>תחנה 7</a:t>
+              <a:t>תחנה 6</a:t>
             </a:r>
           </a:p>
         </p:txBody>
@@ -6866,7 +7051,7 @@
         </p:spPr>
         <p:txBody>
           <a:bodyPr>
-            <a:normAutofit/>
+            <a:normAutofit fontScale="85000" lnSpcReduction="20000"/>
           </a:bodyPr>
           <a:lstStyle/>
           <a:p>
@@ -6875,7 +7060,7 @@
             </a:pPr>
             <a:r>
               <a:rPr lang="he-IL" sz="6600" dirty="0" smtClean="0"/>
-              <a:t>מארז מאלוהים</a:t>
+              <a:t>העץ הוא לא פיסטוק ולא בסדר</a:t>
             </a:r>
             <a:endParaRPr lang="he-IL" sz="6600" dirty="0"/>
           </a:p>
@@ -6893,7 +7078,7 @@
                 <a:latin typeface="David" pitchFamily="34" charset="-79"/>
                 <a:cs typeface="David" pitchFamily="34" charset="-79"/>
               </a:rPr>
-              <a:t>( </a:t>
+              <a:t>( _ </a:t>
             </a:r>
             <a:r>
               <a:rPr lang="he-IL" sz="8000" dirty="0" smtClean="0">
@@ -6905,10 +7090,10 @@
                 <a:latin typeface="David" pitchFamily="34" charset="-79"/>
                 <a:cs typeface="David" pitchFamily="34" charset="-79"/>
               </a:rPr>
-              <a:t>_ </a:t>
-            </a:r>
-            <a:r>
-              <a:rPr lang="he-IL" sz="8000" dirty="0" smtClean="0">
+              <a:t>_ _ _ _ _ _ _ </a:t>
+            </a:r>
+            <a:r>
+              <a:rPr lang="he-IL" sz="8000" dirty="0">
                 <a:solidFill>
                   <a:schemeClr val="accent6">
                     <a:lumMod val="75000"/>
@@ -6917,19 +7102,7 @@
                 <a:latin typeface="David" pitchFamily="34" charset="-79"/>
                 <a:cs typeface="David" pitchFamily="34" charset="-79"/>
               </a:rPr>
-              <a:t>_ _ </a:t>
-            </a:r>
-            <a:r>
-              <a:rPr lang="he-IL" sz="8000" dirty="0">
-                <a:solidFill>
-                  <a:schemeClr val="accent6">
-                    <a:lumMod val="75000"/>
-                  </a:schemeClr>
-                </a:solidFill>
-                <a:latin typeface="David" pitchFamily="34" charset="-79"/>
-                <a:cs typeface="David" pitchFamily="34" charset="-79"/>
-              </a:rPr>
-              <a:t>_ )</a:t>
+              <a:t>)</a:t>
             </a:r>
           </a:p>
           <a:p>
@@ -7107,6 +7280,392 @@
         </p:nvSpPr>
         <p:spPr>
           <a:xfrm>
+            <a:off x="609600" y="4495800"/>
+            <a:ext cx="3352800" cy="2123658"/>
+          </a:xfrm>
+          <a:prstGeom prst="rect">
+            <a:avLst/>
+          </a:prstGeom>
+        </p:spPr>
+        <p:txBody>
+          <a:bodyPr wrap="square">
+            <a:spAutoFit/>
+          </a:bodyPr>
+          <a:lstStyle/>
+          <a:p>
+            <a:pPr algn="ctr"/>
+            <a:r>
+              <a:rPr lang="he-IL" sz="2400" dirty="0">
+                <a:solidFill>
+                  <a:srgbClr val="0070C0"/>
+                </a:solidFill>
+              </a:rPr>
+              <a:t>פתרון חידה </a:t>
+            </a:r>
+            <a:r>
+              <a:rPr lang="he-IL" sz="2400" dirty="0" smtClean="0">
+                <a:solidFill>
+                  <a:srgbClr val="0070C0"/>
+                </a:solidFill>
+              </a:rPr>
+              <a:t>5</a:t>
+            </a:r>
+            <a:endParaRPr lang="he-IL" sz="2400" dirty="0">
+              <a:solidFill>
+                <a:srgbClr val="0070C0"/>
+              </a:solidFill>
+            </a:endParaRPr>
+          </a:p>
+          <a:p>
+            <a:pPr algn="ctr"/>
+            <a:endParaRPr lang="he-IL" sz="2400" dirty="0">
+              <a:solidFill>
+                <a:srgbClr val="0070C0"/>
+              </a:solidFill>
+            </a:endParaRPr>
+          </a:p>
+          <a:p>
+            <a:pPr algn="ctr">
+              <a:buNone/>
+            </a:pPr>
+            <a:r>
+              <a:rPr lang="he-IL" sz="2800" b="1" dirty="0" smtClean="0">
+                <a:solidFill>
+                  <a:srgbClr val="FF0000"/>
+                </a:solidFill>
+                <a:latin typeface="David" pitchFamily="34" charset="-79"/>
+                <a:cs typeface="David" pitchFamily="34" charset="-79"/>
+              </a:rPr>
+              <a:t>הזוהר שלהן </a:t>
+            </a:r>
+            <a:r>
+              <a:rPr lang="he-IL" sz="2800" b="1" dirty="0" smtClean="0">
+                <a:latin typeface="David" pitchFamily="34" charset="-79"/>
+                <a:cs typeface="David" pitchFamily="34" charset="-79"/>
+              </a:rPr>
+              <a:t>נפוץ ביערות קק"ל</a:t>
+            </a:r>
+          </a:p>
+          <a:p>
+            <a:pPr algn="ctr">
+              <a:buNone/>
+            </a:pPr>
+            <a:r>
+              <a:rPr lang="he-IL" sz="2800" b="1" dirty="0" smtClean="0">
+                <a:solidFill>
+                  <a:srgbClr val="FF0000"/>
+                </a:solidFill>
+              </a:rPr>
+              <a:t>א ו ר ן</a:t>
+            </a:r>
+            <a:endParaRPr lang="he-IL" sz="2800" b="1" dirty="0">
+              <a:solidFill>
+                <a:srgbClr val="0070C0"/>
+              </a:solidFill>
+            </a:endParaRPr>
+          </a:p>
+        </p:txBody>
+      </p:sp>
+    </p:spTree>
+  </p:cSld>
+  <p:clrMapOvr>
+    <a:masterClrMapping/>
+  </p:clrMapOvr>
+</p:sld>
+</file>
+
+<file path=ppt/slides/slide8.xml><?xml version="1.0" encoding="utf-8"?>
+<p:sld xmlns:a="http://schemas.openxmlformats.org/drawingml/2006/main" xmlns:r="http://schemas.openxmlformats.org/officeDocument/2006/relationships" xmlns:p="http://schemas.openxmlformats.org/presentationml/2006/main">
+  <p:cSld>
+    <p:spTree>
+      <p:nvGrpSpPr>
+        <p:cNvPr id="1" name=""/>
+        <p:cNvGrpSpPr/>
+        <p:nvPr/>
+      </p:nvGrpSpPr>
+      <p:grpSpPr>
+        <a:xfrm>
+          <a:off x="0" y="0"/>
+          <a:ext cx="0" cy="0"/>
+          <a:chOff x="0" y="0"/>
+          <a:chExt cx="0" cy="0"/>
+        </a:xfrm>
+      </p:grpSpPr>
+      <p:sp>
+        <p:nvSpPr>
+          <p:cNvPr id="2" name="Title 1"/>
+          <p:cNvSpPr>
+            <a:spLocks noGrp="1"/>
+          </p:cNvSpPr>
+          <p:nvPr>
+            <p:ph type="title"/>
+          </p:nvPr>
+        </p:nvSpPr>
+        <p:spPr/>
+        <p:txBody>
+          <a:bodyPr/>
+          <a:lstStyle/>
+          <a:p>
+            <a:r>
+              <a:rPr lang="he-IL" dirty="0">
+                <a:solidFill>
+                  <a:srgbClr val="0070C0"/>
+                </a:solidFill>
+                <a:latin typeface="David" pitchFamily="34" charset="-79"/>
+                <a:cs typeface="David" pitchFamily="34" charset="-79"/>
+              </a:rPr>
+              <a:t>תחנה 7</a:t>
+            </a:r>
+          </a:p>
+        </p:txBody>
+      </p:sp>
+      <p:sp>
+        <p:nvSpPr>
+          <p:cNvPr id="3" name="Content Placeholder 2"/>
+          <p:cNvSpPr>
+            <a:spLocks noGrp="1"/>
+          </p:cNvSpPr>
+          <p:nvPr>
+            <p:ph idx="1"/>
+          </p:nvPr>
+        </p:nvSpPr>
+        <p:spPr>
+          <a:xfrm>
+            <a:off x="457200" y="1600201"/>
+            <a:ext cx="8229600" cy="2590799"/>
+          </a:xfrm>
+        </p:spPr>
+        <p:txBody>
+          <a:bodyPr>
+            <a:normAutofit/>
+          </a:bodyPr>
+          <a:lstStyle/>
+          <a:p>
+            <a:pPr algn="ctr">
+              <a:buNone/>
+            </a:pPr>
+            <a:r>
+              <a:rPr lang="he-IL" sz="6600" dirty="0" smtClean="0"/>
+              <a:t>מארז מאלוהים</a:t>
+            </a:r>
+            <a:endParaRPr lang="he-IL" sz="6600" dirty="0"/>
+          </a:p>
+          <a:p>
+            <a:pPr algn="ctr">
+              <a:buNone/>
+            </a:pPr>
+            <a:r>
+              <a:rPr lang="he-IL" sz="8000" dirty="0">
+                <a:solidFill>
+                  <a:schemeClr val="accent6">
+                    <a:lumMod val="75000"/>
+                  </a:schemeClr>
+                </a:solidFill>
+                <a:latin typeface="David" pitchFamily="34" charset="-79"/>
+                <a:cs typeface="David" pitchFamily="34" charset="-79"/>
+              </a:rPr>
+              <a:t>( </a:t>
+            </a:r>
+            <a:r>
+              <a:rPr lang="he-IL" sz="8000" dirty="0" smtClean="0">
+                <a:solidFill>
+                  <a:schemeClr val="accent6">
+                    <a:lumMod val="75000"/>
+                  </a:schemeClr>
+                </a:solidFill>
+                <a:latin typeface="David" pitchFamily="34" charset="-79"/>
+                <a:cs typeface="David" pitchFamily="34" charset="-79"/>
+              </a:rPr>
+              <a:t>_ _ _ </a:t>
+            </a:r>
+            <a:r>
+              <a:rPr lang="he-IL" sz="8000" dirty="0">
+                <a:solidFill>
+                  <a:schemeClr val="accent6">
+                    <a:lumMod val="75000"/>
+                  </a:schemeClr>
+                </a:solidFill>
+                <a:latin typeface="David" pitchFamily="34" charset="-79"/>
+                <a:cs typeface="David" pitchFamily="34" charset="-79"/>
+              </a:rPr>
+              <a:t>_ )</a:t>
+            </a:r>
+          </a:p>
+          <a:p>
+            <a:pPr>
+              <a:buNone/>
+            </a:pPr>
+            <a:endParaRPr lang="he-IL" dirty="0">
+              <a:latin typeface="David" pitchFamily="34" charset="-79"/>
+              <a:cs typeface="David" pitchFamily="34" charset="-79"/>
+            </a:endParaRPr>
+          </a:p>
+        </p:txBody>
+      </p:sp>
+      <p:sp>
+        <p:nvSpPr>
+          <p:cNvPr id="4" name="Content Placeholder 2"/>
+          <p:cNvSpPr txBox="1">
+            <a:spLocks/>
+          </p:cNvSpPr>
+          <p:nvPr/>
+        </p:nvSpPr>
+        <p:spPr>
+          <a:xfrm>
+            <a:off x="4038600" y="5486400"/>
+            <a:ext cx="4572000" cy="1066800"/>
+          </a:xfrm>
+          <a:prstGeom prst="rect">
+            <a:avLst/>
+          </a:prstGeom>
+        </p:spPr>
+        <p:txBody>
+          <a:bodyPr vert="horz" lIns="91440" tIns="45720" rIns="91440" bIns="45720" rtlCol="1">
+            <a:normAutofit fontScale="92500" lnSpcReduction="20000"/>
+          </a:bodyPr>
+          <a:lstStyle/>
+          <a:p>
+            <a:pPr marL="342900" lvl="0" indent="-342900">
+              <a:spcBef>
+                <a:spcPct val="20000"/>
+              </a:spcBef>
+              <a:defRPr/>
+            </a:pPr>
+            <a:r>
+              <a:rPr lang="he-IL" sz="2400" dirty="0">
+                <a:solidFill>
+                  <a:srgbClr val="0070C0"/>
+                </a:solidFill>
+              </a:rPr>
+              <a:t>חידות הגיון בנושא </a:t>
+            </a:r>
+            <a:r>
+              <a:rPr lang="he-IL" sz="2400" dirty="0" smtClean="0">
+                <a:solidFill>
+                  <a:srgbClr val="0070C0"/>
+                </a:solidFill>
+              </a:rPr>
+              <a:t>עצים</a:t>
+            </a:r>
+            <a:endParaRPr lang="he-IL" sz="2400" dirty="0">
+              <a:solidFill>
+                <a:srgbClr val="0070C0"/>
+              </a:solidFill>
+            </a:endParaRPr>
+          </a:p>
+          <a:p>
+            <a:pPr marL="342900" indent="-342900">
+              <a:spcBef>
+                <a:spcPct val="20000"/>
+              </a:spcBef>
+            </a:pPr>
+            <a:r>
+              <a:rPr lang="he-IL" sz="2400" dirty="0">
+                <a:solidFill>
+                  <a:srgbClr val="0070C0"/>
+                </a:solidFill>
+              </a:rPr>
+              <a:t>מועדון ניווט השרון</a:t>
+            </a:r>
+          </a:p>
+          <a:p>
+            <a:pPr marL="342900" indent="-342900">
+              <a:spcBef>
+                <a:spcPct val="20000"/>
+              </a:spcBef>
+            </a:pPr>
+            <a:r>
+              <a:rPr lang="en-US" sz="2400" dirty="0">
+                <a:solidFill>
+                  <a:srgbClr val="0070C0"/>
+                </a:solidFill>
+              </a:rPr>
+              <a:t>www.nivut.org.il </a:t>
+            </a:r>
+            <a:r>
+              <a:rPr lang="he-IL" sz="2400" dirty="0">
+                <a:solidFill>
+                  <a:srgbClr val="0070C0"/>
+                </a:solidFill>
+              </a:rPr>
+              <a:t> </a:t>
+            </a:r>
+          </a:p>
+          <a:p>
+            <a:pPr marL="342900" marR="0" lvl="0" indent="-342900" algn="r" defTabSz="914400" rtl="1" eaLnBrk="1" fontAlgn="auto" latinLnBrk="0" hangingPunct="1">
+              <a:lnSpc>
+                <a:spcPct val="100000"/>
+              </a:lnSpc>
+              <a:spcBef>
+                <a:spcPct val="20000"/>
+              </a:spcBef>
+              <a:spcAft>
+                <a:spcPts val="0"/>
+              </a:spcAft>
+              <a:buClrTx/>
+              <a:buSzTx/>
+              <a:buFont typeface="Arial" pitchFamily="34" charset="0"/>
+              <a:buNone/>
+              <a:tabLst/>
+              <a:defRPr/>
+            </a:pPr>
+            <a:endParaRPr kumimoji="0" lang="he-IL" sz="2100" b="0" i="0" u="none" strike="noStrike" kern="1200" cap="none" spc="0" normalizeH="0" baseline="0" noProof="0" dirty="0">
+              <a:ln>
+                <a:noFill/>
+              </a:ln>
+              <a:solidFill>
+                <a:srgbClr val="002060"/>
+              </a:solidFill>
+              <a:effectLst/>
+              <a:uLnTx/>
+              <a:uFillTx/>
+              <a:latin typeface="+mn-lt"/>
+              <a:ea typeface="+mn-ea"/>
+              <a:cs typeface="+mn-cs"/>
+            </a:endParaRPr>
+          </a:p>
+        </p:txBody>
+      </p:sp>
+      <p:pic>
+        <p:nvPicPr>
+          <p:cNvPr id="1026" name="Picture 2"/>
+          <p:cNvPicPr>
+            <a:picLocks noChangeAspect="1" noChangeArrowheads="1"/>
+          </p:cNvPicPr>
+          <p:nvPr/>
+        </p:nvPicPr>
+        <p:blipFill>
+          <a:blip r:embed="rId2" cstate="print"/>
+          <a:srcRect l="34553" t="17708" r="35579" b="28125"/>
+          <a:stretch>
+            <a:fillRect/>
+          </a:stretch>
+        </p:blipFill>
+        <p:spPr bwMode="auto">
+          <a:xfrm>
+            <a:off x="685800" y="304800"/>
+            <a:ext cx="1295400" cy="1320800"/>
+          </a:xfrm>
+          <a:prstGeom prst="rect">
+            <a:avLst/>
+          </a:prstGeom>
+          <a:noFill/>
+          <a:ln w="9525">
+            <a:noFill/>
+            <a:miter lim="800000"/>
+            <a:headEnd/>
+            <a:tailEnd/>
+          </a:ln>
+        </p:spPr>
+      </p:pic>
+      <p:sp>
+        <p:nvSpPr>
+          <p:cNvPr id="6" name="Rectangle 5"/>
+          <p:cNvSpPr/>
+          <p:nvPr/>
+        </p:nvSpPr>
+        <p:spPr>
+          <a:xfrm>
             <a:off x="381000" y="4267200"/>
             <a:ext cx="4191000" cy="2431435"/>
           </a:xfrm>
@@ -7127,21 +7686,8 @@
                   <a:srgbClr val="0070C0"/>
                 </a:solidFill>
               </a:rPr>
-              <a:t>פתרון חידה </a:t>
-            </a:r>
-            <a:r>
-              <a:rPr lang="he-IL" sz="2400" dirty="0" smtClean="0">
-                <a:solidFill>
-                  <a:srgbClr val="0070C0"/>
-                </a:solidFill>
-              </a:rPr>
-              <a:t>6</a:t>
-            </a:r>
-            <a:endParaRPr lang="he-IL" sz="2400" dirty="0" smtClean="0">
-              <a:solidFill>
-                <a:srgbClr val="0070C0"/>
-              </a:solidFill>
-            </a:endParaRPr>
+              <a:t>פתרון חידה 6</a:t>
+            </a:r>
           </a:p>
           <a:p>
             <a:pPr algn="ctr"/>
@@ -7244,14 +7790,7 @@
                 <a:latin typeface="David" pitchFamily="34" charset="-79"/>
                 <a:cs typeface="David" pitchFamily="34" charset="-79"/>
               </a:rPr>
-              <a:t> ולא </a:t>
-            </a:r>
-            <a:r>
-              <a:rPr lang="he-IL" sz="2800" b="1" dirty="0" smtClean="0">
-                <a:latin typeface="David" pitchFamily="34" charset="-79"/>
-                <a:cs typeface="David" pitchFamily="34" charset="-79"/>
-              </a:rPr>
-              <a:t>בסדר</a:t>
+              <a:t> ולא בסדר</a:t>
             </a:r>
           </a:p>
           <a:p>
@@ -7432,13 +7971,6 @@
               </a:rPr>
               <a:t>קליפטוס, אבל הוא לא כל כך בשימוש...</a:t>
             </a:r>
-            <a:endParaRPr lang="he-IL" sz="1600" b="1" dirty="0" smtClean="0">
-              <a:solidFill>
-                <a:srgbClr val="0070C0"/>
-              </a:solidFill>
-              <a:latin typeface="David" pitchFamily="34" charset="-79"/>
-              <a:cs typeface="David" pitchFamily="34" charset="-79"/>
-            </a:endParaRPr>
           </a:p>
         </p:txBody>
       </p:sp>
@@ -7552,19 +8084,7 @@
                 <a:latin typeface="David" pitchFamily="34" charset="-79"/>
                 <a:cs typeface="David" pitchFamily="34" charset="-79"/>
               </a:rPr>
-              <a:t>_ </a:t>
-            </a:r>
-            <a:r>
-              <a:rPr lang="he-IL" sz="8000" dirty="0" smtClean="0">
-                <a:solidFill>
-                  <a:schemeClr val="accent6">
-                    <a:lumMod val="75000"/>
-                  </a:schemeClr>
-                </a:solidFill>
-                <a:latin typeface="David" pitchFamily="34" charset="-79"/>
-                <a:cs typeface="David" pitchFamily="34" charset="-79"/>
-              </a:rPr>
-              <a:t>_ </a:t>
+              <a:t>_ _ </a:t>
             </a:r>
             <a:r>
               <a:rPr lang="he-IL" sz="8000" dirty="0">
@@ -8187,6 +8707,21 @@
 </file>
 
 <file path=customXml/item1.xml><?xml version="1.0" encoding="utf-8"?>
+<p:properties xmlns:p="http://schemas.microsoft.com/office/2006/metadata/properties" xmlns:xsi="http://www.w3.org/2001/XMLSchema-instance" xmlns:pc="http://schemas.microsoft.com/office/infopath/2007/PartnerControls">
+  <documentManagement/>
+</p:properties>
+</file>
+
+<file path=customXml/item2.xml><?xml version="1.0" encoding="utf-8"?>
+<?mso-contentType ?>
+<FormTemplates xmlns="http://schemas.microsoft.com/sharepoint/v3/contenttype/forms">
+  <Display>DocumentLibraryForm</Display>
+  <Edit>DocumentLibraryForm</Edit>
+  <New>DocumentLibraryForm</New>
+</FormTemplates>
+</file>
+
+<file path=customXml/item3.xml><?xml version="1.0" encoding="utf-8"?>
 <ct:contentTypeSchema xmlns:ct="http://schemas.microsoft.com/office/2006/metadata/contentType" xmlns:ma="http://schemas.microsoft.com/office/2006/metadata/properties/metaAttributes" ct:_="" ma:_="" ma:contentTypeName="Document" ma:contentTypeID="0x01010034C1E1491D9C694585E4D484013EA9D2" ma:contentTypeVersion="10" ma:contentTypeDescription="Create a new document." ma:contentTypeScope="" ma:versionID="91507b520f1bef10d7c938e8a3341699">
   <xsd:schema xmlns:xsd="http://www.w3.org/2001/XMLSchema" xmlns:xs="http://www.w3.org/2001/XMLSchema" xmlns:p="http://schemas.microsoft.com/office/2006/metadata/properties" xmlns:ns3="2d9e374d-705b-4978-9811-6b77dc0a0432" targetNamespace="http://schemas.microsoft.com/office/2006/metadata/properties" ma:root="true" ma:fieldsID="eba830c2d9bd07e7086f2609d364ba7a" ns3:_="">
     <xsd:import namespace="2d9e374d-705b-4978-9811-6b77dc0a0432"/>
@@ -8370,22 +8905,24 @@
 </ct:contentTypeSchema>
 </file>
 
-<file path=customXml/item2.xml><?xml version="1.0" encoding="utf-8"?>
-<?mso-contentType ?>
-<FormTemplates xmlns="http://schemas.microsoft.com/sharepoint/v3/contenttype/forms">
-  <Display>DocumentLibraryForm</Display>
-  <Edit>DocumentLibraryForm</Edit>
-  <New>DocumentLibraryForm</New>
-</FormTemplates>
+<file path=customXml/itemProps1.xml><?xml version="1.0" encoding="utf-8"?>
+<ds:datastoreItem xmlns:ds="http://schemas.openxmlformats.org/officeDocument/2006/customXml" ds:itemID="{473DE2F7-3404-40A0-A977-D87EA61FD0EF}">
+  <ds:schemaRefs>
+    <ds:schemaRef ds:uri="http://schemas.microsoft.com/office/2006/metadata/properties"/>
+    <ds:schemaRef ds:uri="http://schemas.microsoft.com/office/infopath/2007/PartnerControls"/>
+  </ds:schemaRefs>
+</ds:datastoreItem>
 </file>
 
-<file path=customXml/item3.xml><?xml version="1.0" encoding="utf-8"?>
-<p:properties xmlns:p="http://schemas.microsoft.com/office/2006/metadata/properties" xmlns:xsi="http://www.w3.org/2001/XMLSchema-instance" xmlns:pc="http://schemas.microsoft.com/office/infopath/2007/PartnerControls">
-  <documentManagement/>
-</p:properties>
+<file path=customXml/itemProps2.xml><?xml version="1.0" encoding="utf-8"?>
+<ds:datastoreItem xmlns:ds="http://schemas.openxmlformats.org/officeDocument/2006/customXml" ds:itemID="{C920FAB9-5C07-4863-ACC0-94F0CB535FAC}">
+  <ds:schemaRefs>
+    <ds:schemaRef ds:uri="http://schemas.microsoft.com/sharepoint/v3/contenttype/forms"/>
+  </ds:schemaRefs>
+</ds:datastoreItem>
 </file>
 
-<file path=customXml/itemProps1.xml><?xml version="1.0" encoding="utf-8"?>
+<file path=customXml/itemProps3.xml><?xml version="1.0" encoding="utf-8"?>
 <ds:datastoreItem xmlns:ds="http://schemas.openxmlformats.org/officeDocument/2006/customXml" ds:itemID="{2C42031F-DCFE-40C9-A63E-5D39E04D4562}">
   <ds:schemaRefs>
     <ds:schemaRef ds:uri="http://schemas.microsoft.com/office/2006/metadata/contentType"/>
@@ -8401,21 +8938,4 @@
     <ds:schemaRef ds:uri="http://schemas.microsoft.com/internal/obd"/>
   </ds:schemaRefs>
 </ds:datastoreItem>
-</file>
-
-<file path=customXml/itemProps2.xml><?xml version="1.0" encoding="utf-8"?>
-<ds:datastoreItem xmlns:ds="http://schemas.openxmlformats.org/officeDocument/2006/customXml" ds:itemID="{C920FAB9-5C07-4863-ACC0-94F0CB535FAC}">
-  <ds:schemaRefs>
-    <ds:schemaRef ds:uri="http://schemas.microsoft.com/sharepoint/v3/contenttype/forms"/>
-  </ds:schemaRefs>
-</ds:datastoreItem>
-</file>
-
-<file path=customXml/itemProps3.xml><?xml version="1.0" encoding="utf-8"?>
-<ds:datastoreItem xmlns:ds="http://schemas.openxmlformats.org/officeDocument/2006/customXml" ds:itemID="{473DE2F7-3404-40A0-A977-D87EA61FD0EF}">
-  <ds:schemaRefs>
-    <ds:schemaRef ds:uri="http://schemas.microsoft.com/office/2006/metadata/properties"/>
-    <ds:schemaRef ds:uri="http://schemas.microsoft.com/office/infopath/2007/PartnerControls"/>
-  </ds:schemaRefs>
-</ds:datastoreItem>
 </file>
</xml_diff>

<commit_message>
Update 4 to index.html Taoz 2023 according to Aitan PC
</commit_message>
<xml_diff>
--- a/events/Taoz_2023/חידות_הגיון_לניווט_תעוז_2023_עצים.pptx
+++ b/events/Taoz_2023/חידות_הגיון_לניווט_תעוז_2023_עצים.pptx
@@ -117,7 +117,7 @@
   </p:defaultTextStyle>
   <p:extLst>
     <p:ext uri="{EFAFB233-063F-42B5-8137-9DF3F51BA10A}">
-      <p15:sldGuideLst xmlns:p15="http://schemas.microsoft.com/office/powerpoint/2012/main" xmlns="">
+      <p15:sldGuideLst xmlns="" xmlns:p15="http://schemas.microsoft.com/office/powerpoint/2012/main">
         <p15:guide id="1" orient="horz" pos="2160">
           <p15:clr>
             <a:srgbClr val="A4A3A4"/>
@@ -316,7 +316,7 @@
             <a:fld id="{61A847B1-4CD3-4D69-9083-8E4347483770}" type="datetimeFigureOut">
               <a:rPr lang="he-IL" smtClean="0"/>
               <a:pPr/>
-              <a:t>כ"ג/טבת/תשפ"ג</a:t>
+              <a:t>כ"ד/טבת/תשפ"ג</a:t>
             </a:fld>
             <a:endParaRPr lang="he-IL"/>
           </a:p>
@@ -483,7 +483,7 @@
             <a:fld id="{61A847B1-4CD3-4D69-9083-8E4347483770}" type="datetimeFigureOut">
               <a:rPr lang="he-IL" smtClean="0"/>
               <a:pPr/>
-              <a:t>כ"ג/טבת/תשפ"ג</a:t>
+              <a:t>כ"ד/טבת/תשפ"ג</a:t>
             </a:fld>
             <a:endParaRPr lang="he-IL"/>
           </a:p>
@@ -660,7 +660,7 @@
             <a:fld id="{61A847B1-4CD3-4D69-9083-8E4347483770}" type="datetimeFigureOut">
               <a:rPr lang="he-IL" smtClean="0"/>
               <a:pPr/>
-              <a:t>כ"ג/טבת/תשפ"ג</a:t>
+              <a:t>כ"ד/טבת/תשפ"ג</a:t>
             </a:fld>
             <a:endParaRPr lang="he-IL"/>
           </a:p>
@@ -827,7 +827,7 @@
             <a:fld id="{61A847B1-4CD3-4D69-9083-8E4347483770}" type="datetimeFigureOut">
               <a:rPr lang="he-IL" smtClean="0"/>
               <a:pPr/>
-              <a:t>כ"ג/טבת/תשפ"ג</a:t>
+              <a:t>כ"ד/טבת/תשפ"ג</a:t>
             </a:fld>
             <a:endParaRPr lang="he-IL"/>
           </a:p>
@@ -1070,7 +1070,7 @@
             <a:fld id="{61A847B1-4CD3-4D69-9083-8E4347483770}" type="datetimeFigureOut">
               <a:rPr lang="he-IL" smtClean="0"/>
               <a:pPr/>
-              <a:t>כ"ג/טבת/תשפ"ג</a:t>
+              <a:t>כ"ד/טבת/תשפ"ג</a:t>
             </a:fld>
             <a:endParaRPr lang="he-IL"/>
           </a:p>
@@ -1355,7 +1355,7 @@
             <a:fld id="{61A847B1-4CD3-4D69-9083-8E4347483770}" type="datetimeFigureOut">
               <a:rPr lang="he-IL" smtClean="0"/>
               <a:pPr/>
-              <a:t>כ"ג/טבת/תשפ"ג</a:t>
+              <a:t>כ"ד/טבת/תשפ"ג</a:t>
             </a:fld>
             <a:endParaRPr lang="he-IL"/>
           </a:p>
@@ -1774,7 +1774,7 @@
             <a:fld id="{61A847B1-4CD3-4D69-9083-8E4347483770}" type="datetimeFigureOut">
               <a:rPr lang="he-IL" smtClean="0"/>
               <a:pPr/>
-              <a:t>כ"ג/טבת/תשפ"ג</a:t>
+              <a:t>כ"ד/טבת/תשפ"ג</a:t>
             </a:fld>
             <a:endParaRPr lang="he-IL"/>
           </a:p>
@@ -1889,7 +1889,7 @@
             <a:fld id="{61A847B1-4CD3-4D69-9083-8E4347483770}" type="datetimeFigureOut">
               <a:rPr lang="he-IL" smtClean="0"/>
               <a:pPr/>
-              <a:t>כ"ג/טבת/תשפ"ג</a:t>
+              <a:t>כ"ד/טבת/תשפ"ג</a:t>
             </a:fld>
             <a:endParaRPr lang="he-IL"/>
           </a:p>
@@ -1981,7 +1981,7 @@
             <a:fld id="{61A847B1-4CD3-4D69-9083-8E4347483770}" type="datetimeFigureOut">
               <a:rPr lang="he-IL" smtClean="0"/>
               <a:pPr/>
-              <a:t>כ"ג/טבת/תשפ"ג</a:t>
+              <a:t>כ"ד/טבת/תשפ"ג</a:t>
             </a:fld>
             <a:endParaRPr lang="he-IL"/>
           </a:p>
@@ -2255,7 +2255,7 @@
             <a:fld id="{61A847B1-4CD3-4D69-9083-8E4347483770}" type="datetimeFigureOut">
               <a:rPr lang="he-IL" smtClean="0"/>
               <a:pPr/>
-              <a:t>כ"ג/טבת/תשפ"ג</a:t>
+              <a:t>כ"ד/טבת/תשפ"ג</a:t>
             </a:fld>
             <a:endParaRPr lang="he-IL"/>
           </a:p>
@@ -2505,7 +2505,7 @@
             <a:fld id="{61A847B1-4CD3-4D69-9083-8E4347483770}" type="datetimeFigureOut">
               <a:rPr lang="he-IL" smtClean="0"/>
               <a:pPr/>
-              <a:t>כ"ג/טבת/תשפ"ג</a:t>
+              <a:t>כ"ד/טבת/תשפ"ג</a:t>
             </a:fld>
             <a:endParaRPr lang="he-IL"/>
           </a:p>
@@ -2715,7 +2715,7 @@
             <a:fld id="{61A847B1-4CD3-4D69-9083-8E4347483770}" type="datetimeFigureOut">
               <a:rPr lang="he-IL" smtClean="0"/>
               <a:pPr/>
-              <a:t>כ"ג/טבת/תשפ"ג</a:t>
+              <a:t>כ"ד/טבת/תשפ"ג</a:t>
             </a:fld>
             <a:endParaRPr lang="he-IL"/>
           </a:p>
@@ -3141,8 +3141,17 @@
             </a:pPr>
             <a:r>
               <a:rPr lang="he-IL" sz="5600" dirty="0" smtClean="0"/>
-              <a:t>אוכל, שתייה ולינה בדרום</a:t>
-            </a:r>
+              <a:t>אוכל, שתייה ולינה </a:t>
+            </a:r>
+            <a:r>
+              <a:rPr lang="he-IL" sz="5600" dirty="0" smtClean="0"/>
+              <a:t>גדל </a:t>
+            </a:r>
+            <a:r>
+              <a:rPr lang="he-IL" sz="5600" dirty="0" smtClean="0"/>
+              <a:t>בדרום</a:t>
+            </a:r>
+            <a:endParaRPr lang="he-IL" sz="5600" dirty="0" smtClean="0"/>
           </a:p>
           <a:p>
             <a:pPr algn="ctr">
@@ -3393,7 +3402,7 @@
         <p:spPr>
           <a:xfrm>
             <a:off x="457200" y="4495800"/>
-            <a:ext cx="3657600" cy="1692771"/>
+            <a:ext cx="3657600" cy="2123658"/>
           </a:xfrm>
           <a:prstGeom prst="rect">
             <a:avLst/>
@@ -3510,8 +3519,29 @@
                 <a:latin typeface="David" pitchFamily="34" charset="-79"/>
                 <a:cs typeface="David" pitchFamily="34" charset="-79"/>
               </a:rPr>
+              <a:t>גדל</a:t>
+            </a:r>
+            <a:r>
+              <a:rPr lang="he-IL" sz="2800" b="1" dirty="0" smtClean="0">
+                <a:solidFill>
+                  <a:srgbClr val="FF0000"/>
+                </a:solidFill>
+                <a:latin typeface="David" pitchFamily="34" charset="-79"/>
+                <a:cs typeface="David" pitchFamily="34" charset="-79"/>
+              </a:rPr>
+              <a:t> </a:t>
+            </a:r>
+            <a:r>
+              <a:rPr lang="he-IL" sz="2800" b="1" dirty="0" smtClean="0">
+                <a:latin typeface="David" pitchFamily="34" charset="-79"/>
+                <a:cs typeface="David" pitchFamily="34" charset="-79"/>
+              </a:rPr>
               <a:t>בדרום</a:t>
             </a:r>
+            <a:endParaRPr lang="he-IL" sz="2800" b="1" dirty="0" smtClean="0">
+              <a:latin typeface="David" pitchFamily="34" charset="-79"/>
+              <a:cs typeface="David" pitchFamily="34" charset="-79"/>
+            </a:endParaRPr>
           </a:p>
           <a:p>
             <a:pPr algn="ctr"/>
@@ -3611,13 +3641,8 @@
             </a:pPr>
             <a:r>
               <a:rPr lang="he-IL" sz="6600" dirty="0" smtClean="0"/>
-              <a:t>הלילך </a:t>
-            </a:r>
-            <a:r>
-              <a:rPr lang="he-IL" sz="6600" dirty="0" smtClean="0"/>
-              <a:t>שחור? לפי הסדר, העץ דווקא ורוד...</a:t>
-            </a:r>
-            <a:endParaRPr lang="he-IL" sz="6600" dirty="0" smtClean="0"/>
+              <a:t>הלילך שחור? לפי הסדר, העץ דווקא ורוד...</a:t>
+            </a:r>
           </a:p>
           <a:p>
             <a:pPr algn="ctr">
@@ -3657,7 +3682,7 @@
                 <a:latin typeface="David" pitchFamily="34" charset="-79"/>
                 <a:cs typeface="David" pitchFamily="34" charset="-79"/>
               </a:rPr>
-              <a:t>_ </a:t>
+              <a:t>_ _ _ </a:t>
             </a:r>
             <a:r>
               <a:rPr lang="he-IL" sz="8000" dirty="0" smtClean="0">
@@ -3669,10 +3694,10 @@
                 <a:latin typeface="David" pitchFamily="34" charset="-79"/>
                 <a:cs typeface="David" pitchFamily="34" charset="-79"/>
               </a:rPr>
-              <a:t>_ _ </a:t>
-            </a:r>
-            <a:r>
-              <a:rPr lang="he-IL" sz="8000" dirty="0" smtClean="0">
+              <a:t>_ </a:t>
+            </a:r>
+            <a:r>
+              <a:rPr lang="en-US" sz="8000" dirty="0" smtClean="0">
                 <a:solidFill>
                   <a:schemeClr val="accent6">
                     <a:lumMod val="75000"/>
@@ -3681,10 +3706,10 @@
                 <a:latin typeface="David" pitchFamily="34" charset="-79"/>
                 <a:cs typeface="David" pitchFamily="34" charset="-79"/>
               </a:rPr>
-              <a:t>_</a:t>
-            </a:r>
-            <a:r>
-              <a:rPr lang="en-US" sz="8000" dirty="0" smtClean="0">
+              <a:t> </a:t>
+            </a:r>
+            <a:r>
+              <a:rPr lang="he-IL" sz="8000" dirty="0" smtClean="0">
                 <a:solidFill>
                   <a:schemeClr val="accent6">
                     <a:lumMod val="75000"/>
@@ -3705,65 +3730,8 @@
                 <a:latin typeface="David" pitchFamily="34" charset="-79"/>
                 <a:cs typeface="David" pitchFamily="34" charset="-79"/>
               </a:rPr>
-              <a:t> </a:t>
-            </a:r>
-            <a:r>
-              <a:rPr lang="he-IL" sz="8000" dirty="0" smtClean="0">
-                <a:solidFill>
-                  <a:schemeClr val="accent6">
-                    <a:lumMod val="75000"/>
-                  </a:schemeClr>
-                </a:solidFill>
-                <a:latin typeface="David" pitchFamily="34" charset="-79"/>
-                <a:cs typeface="David" pitchFamily="34" charset="-79"/>
-              </a:rPr>
-              <a:t>_ _ </a:t>
-            </a:r>
-            <a:r>
-              <a:rPr lang="he-IL" sz="8000" dirty="0" smtClean="0">
-                <a:solidFill>
-                  <a:schemeClr val="accent6">
-                    <a:lumMod val="75000"/>
-                  </a:schemeClr>
-                </a:solidFill>
-                <a:latin typeface="David" pitchFamily="34" charset="-79"/>
-                <a:cs typeface="David" pitchFamily="34" charset="-79"/>
-              </a:rPr>
-              <a:t>_ </a:t>
-            </a:r>
-            <a:r>
-              <a:rPr lang="he-IL" sz="8000" dirty="0" smtClean="0">
-                <a:solidFill>
-                  <a:schemeClr val="accent6">
-                    <a:lumMod val="75000"/>
-                  </a:schemeClr>
-                </a:solidFill>
-                <a:latin typeface="David" pitchFamily="34" charset="-79"/>
-                <a:cs typeface="David" pitchFamily="34" charset="-79"/>
-              </a:rPr>
-              <a:t>_ _ </a:t>
-            </a:r>
-            <a:r>
-              <a:rPr lang="he-IL" sz="8000" dirty="0" smtClean="0">
-                <a:solidFill>
-                  <a:schemeClr val="accent6">
-                    <a:lumMod val="75000"/>
-                  </a:schemeClr>
-                </a:solidFill>
-                <a:latin typeface="David" pitchFamily="34" charset="-79"/>
-                <a:cs typeface="David" pitchFamily="34" charset="-79"/>
-              </a:rPr>
-              <a:t>)</a:t>
-            </a:r>
-            <a:endParaRPr lang="he-IL" sz="8000" dirty="0" smtClean="0">
-              <a:solidFill>
-                <a:schemeClr val="accent6">
-                  <a:lumMod val="75000"/>
-                </a:schemeClr>
-              </a:solidFill>
-              <a:latin typeface="David" pitchFamily="34" charset="-79"/>
-              <a:cs typeface="David" pitchFamily="34" charset="-79"/>
-            </a:endParaRPr>
+              <a:t>_ _ _ _ _ )</a:t>
+            </a:r>
           </a:p>
           <a:p>
             <a:pPr>
@@ -3941,7 +3909,7 @@
         <p:spPr>
           <a:xfrm>
             <a:off x="609600" y="4495800"/>
-            <a:ext cx="3581400" cy="1692771"/>
+            <a:ext cx="3581400" cy="2123658"/>
           </a:xfrm>
           <a:prstGeom prst="rect">
             <a:avLst/>
@@ -4000,8 +3968,36 @@
                 <a:latin typeface="David" pitchFamily="34" charset="-79"/>
                 <a:cs typeface="David" pitchFamily="34" charset="-79"/>
               </a:rPr>
-              <a:t>יגרום לסטייה</a:t>
-            </a:r>
+              <a:t>יגרום </a:t>
+            </a:r>
+            <a:r>
+              <a:rPr lang="he-IL" sz="2800" b="1" dirty="0" smtClean="0">
+                <a:solidFill>
+                  <a:srgbClr val="FF0000"/>
+                </a:solidFill>
+                <a:latin typeface="David" pitchFamily="34" charset="-79"/>
+                <a:cs typeface="David" pitchFamily="34" charset="-79"/>
+              </a:rPr>
+              <a:t>לסטייה </a:t>
+            </a:r>
+            <a:r>
+              <a:rPr lang="he-IL" sz="2800" b="1" dirty="0" smtClean="0">
+                <a:latin typeface="David" pitchFamily="34" charset="-79"/>
+                <a:cs typeface="David" pitchFamily="34" charset="-79"/>
+              </a:rPr>
+              <a:t>בפריחה </a:t>
+            </a:r>
+            <a:r>
+              <a:rPr lang="he-IL" sz="2800" b="1" dirty="0" smtClean="0">
+                <a:latin typeface="David" pitchFamily="34" charset="-79"/>
+                <a:cs typeface="David" pitchFamily="34" charset="-79"/>
+              </a:rPr>
+              <a:t>צהובה או לבנה</a:t>
+            </a:r>
+            <a:endParaRPr lang="he-IL" sz="2800" b="1" dirty="0" smtClean="0">
+              <a:latin typeface="David" pitchFamily="34" charset="-79"/>
+              <a:cs typeface="David" pitchFamily="34" charset="-79"/>
+            </a:endParaRPr>
           </a:p>
           <a:p>
             <a:pPr algn="ctr">
@@ -4132,7 +4128,11 @@
             </a:pPr>
             <a:r>
               <a:rPr lang="he-IL" sz="6600" dirty="0" smtClean="0"/>
-              <a:t>לומד בכוח</a:t>
+              <a:t>העץ החסון לומד </a:t>
+            </a:r>
+            <a:r>
+              <a:rPr lang="he-IL" sz="6600" dirty="0" smtClean="0"/>
+              <a:t>בכוח</a:t>
             </a:r>
           </a:p>
           <a:p>
@@ -4473,14 +4473,7 @@
                 <a:latin typeface="David" pitchFamily="34" charset="-79"/>
                 <a:cs typeface="David" pitchFamily="34" charset="-79"/>
               </a:rPr>
-              <a:t>? לפי הסדר, העץ דווקא ורוד</a:t>
-            </a:r>
-            <a:r>
-              <a:rPr lang="he-IL" sz="2800" b="1" dirty="0" smtClean="0">
-                <a:latin typeface="David" pitchFamily="34" charset="-79"/>
-                <a:cs typeface="David" pitchFamily="34" charset="-79"/>
-              </a:rPr>
-              <a:t>...</a:t>
+              <a:t>? לפי הסדר, העץ דווקא ורוד...</a:t>
             </a:r>
             <a:endParaRPr lang="en-US" sz="2800" b="1" dirty="0" smtClean="0">
               <a:latin typeface="David" pitchFamily="34" charset="-79"/>
@@ -4730,8 +4723,13 @@
             </a:pPr>
             <a:r>
               <a:rPr lang="he-IL" dirty="0" smtClean="0"/>
-              <a:t>דוגמה: אשל - אוכל, שתייה ולינה בדרום</a:t>
-            </a:r>
+              <a:t>דוגמה: אשל - אוכל, שתייה ולינה </a:t>
+            </a:r>
+            <a:r>
+              <a:rPr lang="he-IL" dirty="0" smtClean="0"/>
+              <a:t>גדל בדרום</a:t>
+            </a:r>
+            <a:endParaRPr lang="he-IL" dirty="0" smtClean="0"/>
           </a:p>
           <a:p>
             <a:pPr marL="514350" indent="-514350">
@@ -4740,8 +4738,13 @@
             </a:pPr>
             <a:r>
               <a:rPr lang="he-IL" dirty="0" smtClean="0"/>
-              <a:t>שקד - העץ שמשתחווה</a:t>
-            </a:r>
+              <a:t>שקד - העץ </a:t>
+            </a:r>
+            <a:r>
+              <a:rPr lang="he-IL" dirty="0" smtClean="0"/>
+              <a:t>שמשתחווה ופורח בט"ו בשבט</a:t>
+            </a:r>
+            <a:endParaRPr lang="he-IL" dirty="0" smtClean="0"/>
           </a:p>
           <a:p>
             <a:pPr marL="514350" indent="-514350">
@@ -4750,8 +4753,13 @@
             </a:pPr>
             <a:r>
               <a:rPr lang="he-IL" dirty="0" smtClean="0"/>
-              <a:t>ברוש - קנגורו ספרותי בבאר שבע</a:t>
-            </a:r>
+              <a:t>ברוש - קנגורו ספרותי בבאר </a:t>
+            </a:r>
+            <a:r>
+              <a:rPr lang="he-IL" dirty="0" smtClean="0"/>
+              <a:t>שבע דק וגבוה</a:t>
+            </a:r>
+            <a:endParaRPr lang="he-IL" dirty="0" smtClean="0"/>
           </a:p>
           <a:p>
             <a:pPr marL="514350" indent="-514350">
@@ -4759,8 +4767,13 @@
             </a:pPr>
             <a:r>
               <a:rPr lang="he-IL" dirty="0" smtClean="0"/>
-              <a:t>אדר - עץ החודש (לפעמים פעמיים ברצף...)</a:t>
-            </a:r>
+              <a:t>אדר - עץ החודש (לפעמים פעמיים ברצף</a:t>
+            </a:r>
+            <a:r>
+              <a:rPr lang="he-IL" dirty="0" smtClean="0"/>
+              <a:t>...)</a:t>
+            </a:r>
+            <a:endParaRPr lang="he-IL" dirty="0" smtClean="0"/>
           </a:p>
           <a:p>
             <a:pPr marL="514350" indent="-514350">
@@ -4768,8 +4781,13 @@
             </a:pPr>
             <a:r>
               <a:rPr lang="he-IL" dirty="0" smtClean="0"/>
-              <a:t>חרוב - בחור מבולבל ומתוק</a:t>
-            </a:r>
+              <a:t>חרוב - בחור מבולבל </a:t>
+            </a:r>
+            <a:r>
+              <a:rPr lang="he-IL" dirty="0" smtClean="0"/>
+              <a:t>ופריו מתוק</a:t>
+            </a:r>
+            <a:endParaRPr lang="he-IL" dirty="0" smtClean="0"/>
           </a:p>
           <a:p>
             <a:pPr marL="514350" indent="-514350">
@@ -4799,8 +4817,13 @@
             </a:pPr>
             <a:r>
               <a:rPr lang="he-IL" dirty="0" smtClean="0"/>
-              <a:t>שקמה - מארז מאלוהים</a:t>
-            </a:r>
+              <a:t>שקמה - מארז </a:t>
+            </a:r>
+            <a:r>
+              <a:rPr lang="he-IL" dirty="0" smtClean="0"/>
+              <a:t>מאלוהים מאריך ימים ומזין עטלפים</a:t>
+            </a:r>
+            <a:endParaRPr lang="he-IL" dirty="0" smtClean="0"/>
           </a:p>
           <a:p>
             <a:pPr marL="514350" indent="-514350">
@@ -4812,7 +4835,7 @@
             </a:r>
             <a:r>
               <a:rPr lang="he-IL" dirty="0" smtClean="0"/>
-              <a:t>לסטייה</a:t>
+              <a:t>לסטייה בפריחה צהובה או לבנה</a:t>
             </a:r>
             <a:endParaRPr lang="en-US" dirty="0" smtClean="0"/>
           </a:p>
@@ -4824,7 +4847,6 @@
               <a:rPr lang="he-IL" dirty="0" smtClean="0"/>
               <a:t>כליל החורש - הלילך שחור? לפי הסדר, העץ דווקא ורוד...</a:t>
             </a:r>
-            <a:endParaRPr lang="he-IL" dirty="0" smtClean="0"/>
           </a:p>
           <a:p>
             <a:pPr marL="514350" indent="-514350">
@@ -4856,7 +4878,11 @@
             </a:r>
             <a:r>
               <a:rPr lang="he-IL" dirty="0" smtClean="0"/>
-              <a:t> - </a:t>
+              <a:t> </a:t>
+            </a:r>
+            <a:r>
+              <a:rPr lang="he-IL" dirty="0" smtClean="0"/>
+              <a:t>– העץ החסון </a:t>
             </a:r>
             <a:r>
               <a:rPr lang="he-IL" dirty="0" smtClean="0">
@@ -4868,7 +4894,11 @@
             </a:r>
             <a:r>
               <a:rPr lang="he-IL" dirty="0" smtClean="0"/>
-              <a:t> ב</a:t>
+              <a:t> </a:t>
+            </a:r>
+            <a:r>
+              <a:rPr lang="he-IL" dirty="0" smtClean="0"/>
+              <a:t>ב</a:t>
             </a:r>
             <a:r>
               <a:rPr lang="he-IL" dirty="0" smtClean="0">
@@ -4957,7 +4987,7 @@
         </p:spPr>
         <p:txBody>
           <a:bodyPr>
-            <a:normAutofit/>
+            <a:normAutofit fontScale="85000" lnSpcReduction="20000"/>
           </a:bodyPr>
           <a:lstStyle/>
           <a:p>
@@ -4966,7 +4996,11 @@
             </a:pPr>
             <a:r>
               <a:rPr lang="he-IL" sz="6600" dirty="0" smtClean="0"/>
-              <a:t>העץ שמשתחווה</a:t>
+              <a:t>העץ </a:t>
+            </a:r>
+            <a:r>
+              <a:rPr lang="he-IL" sz="6600" dirty="0" smtClean="0"/>
+              <a:t>שמשתחווה ופורח בט"ו בשבט</a:t>
             </a:r>
             <a:endParaRPr lang="he-IL" sz="6600" dirty="0"/>
           </a:p>
@@ -5187,7 +5221,7 @@
         <p:spPr>
           <a:xfrm>
             <a:off x="533400" y="4572000"/>
-            <a:ext cx="3810000" cy="1692771"/>
+            <a:ext cx="3810000" cy="2123658"/>
           </a:xfrm>
           <a:prstGeom prst="rect">
             <a:avLst/>
@@ -5304,8 +5338,29 @@
                 <a:latin typeface="David" pitchFamily="34" charset="-79"/>
                 <a:cs typeface="David" pitchFamily="34" charset="-79"/>
               </a:rPr>
+              <a:t>גדל</a:t>
+            </a:r>
+            <a:r>
+              <a:rPr lang="he-IL" sz="2800" b="1" dirty="0" smtClean="0">
+                <a:solidFill>
+                  <a:srgbClr val="FF0000"/>
+                </a:solidFill>
+                <a:latin typeface="David" pitchFamily="34" charset="-79"/>
+                <a:cs typeface="David" pitchFamily="34" charset="-79"/>
+              </a:rPr>
+              <a:t> </a:t>
+            </a:r>
+            <a:r>
+              <a:rPr lang="he-IL" sz="2800" b="1" dirty="0" smtClean="0">
+                <a:latin typeface="David" pitchFamily="34" charset="-79"/>
+                <a:cs typeface="David" pitchFamily="34" charset="-79"/>
+              </a:rPr>
               <a:t>בדרום</a:t>
             </a:r>
+            <a:endParaRPr lang="he-IL" sz="2800" b="1" dirty="0" smtClean="0">
+              <a:latin typeface="David" pitchFamily="34" charset="-79"/>
+              <a:cs typeface="David" pitchFamily="34" charset="-79"/>
+            </a:endParaRPr>
           </a:p>
           <a:p>
             <a:pPr algn="ctr"/>
@@ -5396,7 +5451,7 @@
         </p:spPr>
         <p:txBody>
           <a:bodyPr>
-            <a:normAutofit fontScale="92500"/>
+            <a:normAutofit fontScale="85000" lnSpcReduction="20000"/>
           </a:bodyPr>
           <a:lstStyle/>
           <a:p>
@@ -5405,8 +5460,13 @@
             </a:pPr>
             <a:r>
               <a:rPr lang="he-IL" sz="6600" dirty="0" smtClean="0"/>
-              <a:t>קנגורו ספרותי בבאר שבע</a:t>
-            </a:r>
+              <a:t>קנגורו ספרותי בבאר </a:t>
+            </a:r>
+            <a:r>
+              <a:rPr lang="he-IL" sz="6600" dirty="0" smtClean="0"/>
+              <a:t>שבע דק וגבוה</a:t>
+            </a:r>
+            <a:endParaRPr lang="he-IL" sz="6600" dirty="0" smtClean="0"/>
           </a:p>
           <a:p>
             <a:pPr algn="ctr">
@@ -5613,7 +5673,7 @@
         <p:spPr>
           <a:xfrm>
             <a:off x="609600" y="4495800"/>
-            <a:ext cx="3352800" cy="1692771"/>
+            <a:ext cx="3352800" cy="2123658"/>
           </a:xfrm>
           <a:prstGeom prst="rect">
             <a:avLst/>
@@ -5670,8 +5730,19 @@
                 <a:latin typeface="David" pitchFamily="34" charset="-79"/>
                 <a:cs typeface="David" pitchFamily="34" charset="-79"/>
               </a:rPr>
-              <a:t>משתחווה</a:t>
-            </a:r>
+              <a:t>משתחווה </a:t>
+            </a:r>
+            <a:r>
+              <a:rPr lang="he-IL" sz="2800" b="1" dirty="0" smtClean="0">
+                <a:latin typeface="David" pitchFamily="34" charset="-79"/>
+                <a:cs typeface="David" pitchFamily="34" charset="-79"/>
+              </a:rPr>
+              <a:t>ופורח בט"ו בשבט</a:t>
+            </a:r>
+            <a:endParaRPr lang="he-IL" sz="2800" b="1" dirty="0" smtClean="0">
+              <a:latin typeface="David" pitchFamily="34" charset="-79"/>
+              <a:cs typeface="David" pitchFamily="34" charset="-79"/>
+            </a:endParaRPr>
           </a:p>
           <a:p>
             <a:pPr algn="ctr"/>
@@ -5779,7 +5850,11 @@
             </a:pPr>
             <a:r>
               <a:rPr lang="he-IL" sz="6600" dirty="0" smtClean="0"/>
-              <a:t>עץ החודש (לפעמים פעמיים ברצף...)</a:t>
+              <a:t>עץ החודש (לפעמים פעמיים ברצף</a:t>
+            </a:r>
+            <a:r>
+              <a:rPr lang="he-IL" sz="6600" dirty="0" smtClean="0"/>
+              <a:t>...)</a:t>
             </a:r>
             <a:endParaRPr lang="he-IL" sz="6600" dirty="0"/>
           </a:p>
@@ -6024,7 +6099,7 @@
         <p:spPr>
           <a:xfrm>
             <a:off x="381000" y="4495800"/>
-            <a:ext cx="3810000" cy="1692771"/>
+            <a:ext cx="3810000" cy="2123658"/>
           </a:xfrm>
           <a:prstGeom prst="rect">
             <a:avLst/>
@@ -6083,8 +6158,29 @@
                 <a:latin typeface="David" pitchFamily="34" charset="-79"/>
                 <a:cs typeface="David" pitchFamily="34" charset="-79"/>
               </a:rPr>
-              <a:t>באר שבע</a:t>
-            </a:r>
+              <a:t>באר </a:t>
+            </a:r>
+            <a:r>
+              <a:rPr lang="he-IL" sz="2800" b="1" dirty="0" smtClean="0">
+                <a:solidFill>
+                  <a:srgbClr val="FF0000"/>
+                </a:solidFill>
+                <a:latin typeface="David" pitchFamily="34" charset="-79"/>
+                <a:cs typeface="David" pitchFamily="34" charset="-79"/>
+              </a:rPr>
+              <a:t>שבע </a:t>
+            </a:r>
+            <a:r>
+              <a:rPr lang="he-IL" sz="2800" b="1" dirty="0" smtClean="0">
+                <a:latin typeface="David" pitchFamily="34" charset="-79"/>
+                <a:cs typeface="David" pitchFamily="34" charset="-79"/>
+              </a:rPr>
+              <a:t>דק וגבוה</a:t>
+            </a:r>
+            <a:endParaRPr lang="he-IL" sz="2800" b="1" dirty="0" smtClean="0">
+              <a:latin typeface="David" pitchFamily="34" charset="-79"/>
+              <a:cs typeface="David" pitchFamily="34" charset="-79"/>
+            </a:endParaRPr>
           </a:p>
           <a:p>
             <a:pPr algn="ctr">
@@ -6203,8 +6299,13 @@
             </a:pPr>
             <a:r>
               <a:rPr lang="he-IL" sz="6600" dirty="0" smtClean="0"/>
-              <a:t>בחור מבולבל ומתוק</a:t>
-            </a:r>
+              <a:t>בחור מבולבל </a:t>
+            </a:r>
+            <a:r>
+              <a:rPr lang="he-IL" sz="6600" dirty="0" smtClean="0"/>
+              <a:t>ופריו מתוק</a:t>
+            </a:r>
+            <a:endParaRPr lang="he-IL" sz="6600" dirty="0" smtClean="0"/>
           </a:p>
           <a:p>
             <a:pPr algn="ctr">
@@ -6472,7 +6573,11 @@
             </a:r>
             <a:r>
               <a:rPr lang="he-IL" sz="2800" dirty="0" smtClean="0"/>
-              <a:t> (לפעמים פעמיים ברצף...)</a:t>
+              <a:t> (לפעמים פעמיים ברצף</a:t>
+            </a:r>
+            <a:r>
+              <a:rPr lang="he-IL" sz="2800" dirty="0" smtClean="0"/>
+              <a:t>...)</a:t>
             </a:r>
             <a:endParaRPr lang="he-IL" sz="2800" b="1" dirty="0" smtClean="0">
               <a:solidFill>
@@ -6910,8 +7015,19 @@
                 <a:latin typeface="David" pitchFamily="34" charset="-79"/>
                 <a:cs typeface="David" pitchFamily="34" charset="-79"/>
               </a:rPr>
-              <a:t> מבולבל ומתוק</a:t>
-            </a:r>
+              <a:t> מבולבל </a:t>
+            </a:r>
+            <a:r>
+              <a:rPr lang="he-IL" sz="2800" b="1" dirty="0" smtClean="0">
+                <a:latin typeface="David" pitchFamily="34" charset="-79"/>
+                <a:cs typeface="David" pitchFamily="34" charset="-79"/>
+              </a:rPr>
+              <a:t>ופריו מתוק</a:t>
+            </a:r>
+            <a:endParaRPr lang="he-IL" sz="2800" b="1" dirty="0" smtClean="0">
+              <a:latin typeface="David" pitchFamily="34" charset="-79"/>
+              <a:cs typeface="David" pitchFamily="34" charset="-79"/>
+            </a:endParaRPr>
           </a:p>
           <a:p>
             <a:pPr algn="ctr">
@@ -7437,7 +7553,7 @@
         </p:spPr>
         <p:txBody>
           <a:bodyPr>
-            <a:normAutofit/>
+            <a:normAutofit fontScale="85000" lnSpcReduction="20000"/>
           </a:bodyPr>
           <a:lstStyle/>
           <a:p>
@@ -7446,7 +7562,11 @@
             </a:pPr>
             <a:r>
               <a:rPr lang="he-IL" sz="6600" dirty="0" smtClean="0"/>
-              <a:t>מארז מאלוהים</a:t>
+              <a:t>מארז </a:t>
+            </a:r>
+            <a:r>
+              <a:rPr lang="he-IL" sz="6600" dirty="0" smtClean="0"/>
+              <a:t>מאלוהים מאריך ימים ומזין עטלפים</a:t>
             </a:r>
             <a:endParaRPr lang="he-IL" sz="6600" dirty="0"/>
           </a:p>
@@ -8045,7 +8165,7 @@
         </p:spPr>
         <p:txBody>
           <a:bodyPr>
-            <a:normAutofit/>
+            <a:normAutofit fontScale="85000" lnSpcReduction="20000"/>
           </a:bodyPr>
           <a:lstStyle/>
           <a:p>
@@ -8054,7 +8174,11 @@
             </a:pPr>
             <a:r>
               <a:rPr lang="he-IL" sz="6600" dirty="0" smtClean="0"/>
-              <a:t>העץ שיגרום לסטייה</a:t>
+              <a:t>העץ שיגרום </a:t>
+            </a:r>
+            <a:r>
+              <a:rPr lang="he-IL" sz="6600" dirty="0" smtClean="0"/>
+              <a:t>לסטייה בפריחה צהובה או לבנה</a:t>
             </a:r>
             <a:endParaRPr lang="he-IL" sz="6600" dirty="0"/>
           </a:p>
@@ -8275,7 +8399,7 @@
         <p:spPr>
           <a:xfrm>
             <a:off x="609600" y="4495800"/>
-            <a:ext cx="3352800" cy="1692771"/>
+            <a:ext cx="3352800" cy="2123658"/>
           </a:xfrm>
           <a:prstGeom prst="rect">
             <a:avLst/>
@@ -8357,7 +8481,14 @@
                 <a:latin typeface="David" pitchFamily="34" charset="-79"/>
                 <a:cs typeface="David" pitchFamily="34" charset="-79"/>
               </a:rPr>
-              <a:t>אלוהים</a:t>
+              <a:t>אלוהים </a:t>
+            </a:r>
+            <a:r>
+              <a:rPr lang="he-IL" sz="2800" b="1" dirty="0" smtClean="0">
+                <a:latin typeface="David" pitchFamily="34" charset="-79"/>
+                <a:cs typeface="David" pitchFamily="34" charset="-79"/>
+              </a:rPr>
+              <a:t>מאריך ימים ומזין עטלפים</a:t>
             </a:r>
             <a:r>
               <a:rPr lang="he-IL" sz="2800" b="1" dirty="0" smtClean="0">
@@ -8707,21 +8838,6 @@
 </file>
 
 <file path=customXml/item1.xml><?xml version="1.0" encoding="utf-8"?>
-<p:properties xmlns:p="http://schemas.microsoft.com/office/2006/metadata/properties" xmlns:xsi="http://www.w3.org/2001/XMLSchema-instance" xmlns:pc="http://schemas.microsoft.com/office/infopath/2007/PartnerControls">
-  <documentManagement/>
-</p:properties>
-</file>
-
-<file path=customXml/item2.xml><?xml version="1.0" encoding="utf-8"?>
-<?mso-contentType ?>
-<FormTemplates xmlns="http://schemas.microsoft.com/sharepoint/v3/contenttype/forms">
-  <Display>DocumentLibraryForm</Display>
-  <Edit>DocumentLibraryForm</Edit>
-  <New>DocumentLibraryForm</New>
-</FormTemplates>
-</file>
-
-<file path=customXml/item3.xml><?xml version="1.0" encoding="utf-8"?>
 <ct:contentTypeSchema xmlns:ct="http://schemas.microsoft.com/office/2006/metadata/contentType" xmlns:ma="http://schemas.microsoft.com/office/2006/metadata/properties/metaAttributes" ct:_="" ma:_="" ma:contentTypeName="Document" ma:contentTypeID="0x01010034C1E1491D9C694585E4D484013EA9D2" ma:contentTypeVersion="10" ma:contentTypeDescription="Create a new document." ma:contentTypeScope="" ma:versionID="91507b520f1bef10d7c938e8a3341699">
   <xsd:schema xmlns:xsd="http://www.w3.org/2001/XMLSchema" xmlns:xs="http://www.w3.org/2001/XMLSchema" xmlns:p="http://schemas.microsoft.com/office/2006/metadata/properties" xmlns:ns3="2d9e374d-705b-4978-9811-6b77dc0a0432" targetNamespace="http://schemas.microsoft.com/office/2006/metadata/properties" ma:root="true" ma:fieldsID="eba830c2d9bd07e7086f2609d364ba7a" ns3:_="">
     <xsd:import namespace="2d9e374d-705b-4978-9811-6b77dc0a0432"/>
@@ -8905,24 +9021,22 @@
 </ct:contentTypeSchema>
 </file>
 
-<file path=customXml/itemProps1.xml><?xml version="1.0" encoding="utf-8"?>
-<ds:datastoreItem xmlns:ds="http://schemas.openxmlformats.org/officeDocument/2006/customXml" ds:itemID="{473DE2F7-3404-40A0-A977-D87EA61FD0EF}">
-  <ds:schemaRefs>
-    <ds:schemaRef ds:uri="http://schemas.microsoft.com/office/2006/metadata/properties"/>
-    <ds:schemaRef ds:uri="http://schemas.microsoft.com/office/infopath/2007/PartnerControls"/>
-  </ds:schemaRefs>
-</ds:datastoreItem>
+<file path=customXml/item2.xml><?xml version="1.0" encoding="utf-8"?>
+<?mso-contentType ?>
+<FormTemplates xmlns="http://schemas.microsoft.com/sharepoint/v3/contenttype/forms">
+  <Display>DocumentLibraryForm</Display>
+  <Edit>DocumentLibraryForm</Edit>
+  <New>DocumentLibraryForm</New>
+</FormTemplates>
 </file>
 
-<file path=customXml/itemProps2.xml><?xml version="1.0" encoding="utf-8"?>
-<ds:datastoreItem xmlns:ds="http://schemas.openxmlformats.org/officeDocument/2006/customXml" ds:itemID="{C920FAB9-5C07-4863-ACC0-94F0CB535FAC}">
-  <ds:schemaRefs>
-    <ds:schemaRef ds:uri="http://schemas.microsoft.com/sharepoint/v3/contenttype/forms"/>
-  </ds:schemaRefs>
-</ds:datastoreItem>
+<file path=customXml/item3.xml><?xml version="1.0" encoding="utf-8"?>
+<p:properties xmlns:p="http://schemas.microsoft.com/office/2006/metadata/properties" xmlns:xsi="http://www.w3.org/2001/XMLSchema-instance" xmlns:pc="http://schemas.microsoft.com/office/infopath/2007/PartnerControls">
+  <documentManagement/>
+</p:properties>
 </file>
 
-<file path=customXml/itemProps3.xml><?xml version="1.0" encoding="utf-8"?>
+<file path=customXml/itemProps1.xml><?xml version="1.0" encoding="utf-8"?>
 <ds:datastoreItem xmlns:ds="http://schemas.openxmlformats.org/officeDocument/2006/customXml" ds:itemID="{2C42031F-DCFE-40C9-A63E-5D39E04D4562}">
   <ds:schemaRefs>
     <ds:schemaRef ds:uri="http://schemas.microsoft.com/office/2006/metadata/contentType"/>
@@ -8938,4 +9052,21 @@
     <ds:schemaRef ds:uri="http://schemas.microsoft.com/internal/obd"/>
   </ds:schemaRefs>
 </ds:datastoreItem>
+</file>
+
+<file path=customXml/itemProps2.xml><?xml version="1.0" encoding="utf-8"?>
+<ds:datastoreItem xmlns:ds="http://schemas.openxmlformats.org/officeDocument/2006/customXml" ds:itemID="{C920FAB9-5C07-4863-ACC0-94F0CB535FAC}">
+  <ds:schemaRefs>
+    <ds:schemaRef ds:uri="http://schemas.microsoft.com/sharepoint/v3/contenttype/forms"/>
+  </ds:schemaRefs>
+</ds:datastoreItem>
+</file>
+
+<file path=customXml/itemProps3.xml><?xml version="1.0" encoding="utf-8"?>
+<ds:datastoreItem xmlns:ds="http://schemas.openxmlformats.org/officeDocument/2006/customXml" ds:itemID="{473DE2F7-3404-40A0-A977-D87EA61FD0EF}">
+  <ds:schemaRefs>
+    <ds:schemaRef ds:uri="http://schemas.microsoft.com/office/2006/metadata/properties"/>
+    <ds:schemaRef ds:uri="http://schemas.microsoft.com/office/infopath/2007/PartnerControls"/>
+  </ds:schemaRefs>
+</ds:datastoreItem>
 </file>
</xml_diff>

<commit_message>
Update 11 to index.html Taoz 2023 according to Aitan PC, start list for Mulka
</commit_message>
<xml_diff>
--- a/events/Taoz_2023/חידות_הגיון_לניווט_תעוז_2023_עצים.pptx
+++ b/events/Taoz_2023/חידות_הגיון_לניווט_תעוז_2023_עצים.pptx
@@ -19,7 +19,7 @@
     <p:sldId id="297" r:id="rId16"/>
   </p:sldIdLst>
   <p:sldSz cx="9144000" cy="6858000" type="screen4x3"/>
-  <p:notesSz cx="6858000" cy="9144000"/>
+  <p:notesSz cx="6864350" cy="9996488"/>
   <p:defaultTextStyle>
     <a:defPPr>
       <a:defRPr lang="he-IL"/>
@@ -117,7 +117,7 @@
   </p:defaultTextStyle>
   <p:extLst>
     <p:ext uri="{EFAFB233-063F-42B5-8137-9DF3F51BA10A}">
-      <p15:sldGuideLst xmlns="" xmlns:p15="http://schemas.microsoft.com/office/powerpoint/2012/main">
+      <p15:sldGuideLst xmlns:p15="http://schemas.microsoft.com/office/powerpoint/2012/main" xmlns="">
         <p15:guide id="1" orient="horz" pos="2160">
           <p15:clr>
             <a:srgbClr val="A4A3A4"/>
@@ -316,7 +316,7 @@
             <a:fld id="{61A847B1-4CD3-4D69-9083-8E4347483770}" type="datetimeFigureOut">
               <a:rPr lang="he-IL" smtClean="0"/>
               <a:pPr/>
-              <a:t>כ"ד/טבת/תשפ"ג</a:t>
+              <a:t>כ"ו/טבת/תשפ"ג</a:t>
             </a:fld>
             <a:endParaRPr lang="he-IL"/>
           </a:p>
@@ -483,7 +483,7 @@
             <a:fld id="{61A847B1-4CD3-4D69-9083-8E4347483770}" type="datetimeFigureOut">
               <a:rPr lang="he-IL" smtClean="0"/>
               <a:pPr/>
-              <a:t>כ"ד/טבת/תשפ"ג</a:t>
+              <a:t>כ"ו/טבת/תשפ"ג</a:t>
             </a:fld>
             <a:endParaRPr lang="he-IL"/>
           </a:p>
@@ -660,7 +660,7 @@
             <a:fld id="{61A847B1-4CD3-4D69-9083-8E4347483770}" type="datetimeFigureOut">
               <a:rPr lang="he-IL" smtClean="0"/>
               <a:pPr/>
-              <a:t>כ"ד/טבת/תשפ"ג</a:t>
+              <a:t>כ"ו/טבת/תשפ"ג</a:t>
             </a:fld>
             <a:endParaRPr lang="he-IL"/>
           </a:p>
@@ -827,7 +827,7 @@
             <a:fld id="{61A847B1-4CD3-4D69-9083-8E4347483770}" type="datetimeFigureOut">
               <a:rPr lang="he-IL" smtClean="0"/>
               <a:pPr/>
-              <a:t>כ"ד/טבת/תשפ"ג</a:t>
+              <a:t>כ"ו/טבת/תשפ"ג</a:t>
             </a:fld>
             <a:endParaRPr lang="he-IL"/>
           </a:p>
@@ -1070,7 +1070,7 @@
             <a:fld id="{61A847B1-4CD3-4D69-9083-8E4347483770}" type="datetimeFigureOut">
               <a:rPr lang="he-IL" smtClean="0"/>
               <a:pPr/>
-              <a:t>כ"ד/טבת/תשפ"ג</a:t>
+              <a:t>כ"ו/טבת/תשפ"ג</a:t>
             </a:fld>
             <a:endParaRPr lang="he-IL"/>
           </a:p>
@@ -1355,7 +1355,7 @@
             <a:fld id="{61A847B1-4CD3-4D69-9083-8E4347483770}" type="datetimeFigureOut">
               <a:rPr lang="he-IL" smtClean="0"/>
               <a:pPr/>
-              <a:t>כ"ד/טבת/תשפ"ג</a:t>
+              <a:t>כ"ו/טבת/תשפ"ג</a:t>
             </a:fld>
             <a:endParaRPr lang="he-IL"/>
           </a:p>
@@ -1774,7 +1774,7 @@
             <a:fld id="{61A847B1-4CD3-4D69-9083-8E4347483770}" type="datetimeFigureOut">
               <a:rPr lang="he-IL" smtClean="0"/>
               <a:pPr/>
-              <a:t>כ"ד/טבת/תשפ"ג</a:t>
+              <a:t>כ"ו/טבת/תשפ"ג</a:t>
             </a:fld>
             <a:endParaRPr lang="he-IL"/>
           </a:p>
@@ -1889,7 +1889,7 @@
             <a:fld id="{61A847B1-4CD3-4D69-9083-8E4347483770}" type="datetimeFigureOut">
               <a:rPr lang="he-IL" smtClean="0"/>
               <a:pPr/>
-              <a:t>כ"ד/טבת/תשפ"ג</a:t>
+              <a:t>כ"ו/טבת/תשפ"ג</a:t>
             </a:fld>
             <a:endParaRPr lang="he-IL"/>
           </a:p>
@@ -1981,7 +1981,7 @@
             <a:fld id="{61A847B1-4CD3-4D69-9083-8E4347483770}" type="datetimeFigureOut">
               <a:rPr lang="he-IL" smtClean="0"/>
               <a:pPr/>
-              <a:t>כ"ד/טבת/תשפ"ג</a:t>
+              <a:t>כ"ו/טבת/תשפ"ג</a:t>
             </a:fld>
             <a:endParaRPr lang="he-IL"/>
           </a:p>
@@ -2255,7 +2255,7 @@
             <a:fld id="{61A847B1-4CD3-4D69-9083-8E4347483770}" type="datetimeFigureOut">
               <a:rPr lang="he-IL" smtClean="0"/>
               <a:pPr/>
-              <a:t>כ"ד/טבת/תשפ"ג</a:t>
+              <a:t>כ"ו/טבת/תשפ"ג</a:t>
             </a:fld>
             <a:endParaRPr lang="he-IL"/>
           </a:p>
@@ -2505,7 +2505,7 @@
             <a:fld id="{61A847B1-4CD3-4D69-9083-8E4347483770}" type="datetimeFigureOut">
               <a:rPr lang="he-IL" smtClean="0"/>
               <a:pPr/>
-              <a:t>כ"ד/טבת/תשפ"ג</a:t>
+              <a:t>כ"ו/טבת/תשפ"ג</a:t>
             </a:fld>
             <a:endParaRPr lang="he-IL"/>
           </a:p>
@@ -2715,7 +2715,7 @@
             <a:fld id="{61A847B1-4CD3-4D69-9083-8E4347483770}" type="datetimeFigureOut">
               <a:rPr lang="he-IL" smtClean="0"/>
               <a:pPr/>
-              <a:t>כ"ד/טבת/תשפ"ג</a:t>
+              <a:t>כ"ו/טבת/תשפ"ג</a:t>
             </a:fld>
             <a:endParaRPr lang="he-IL"/>
           </a:p>
@@ -3141,17 +3141,8 @@
             </a:pPr>
             <a:r>
               <a:rPr lang="he-IL" sz="5600" dirty="0" smtClean="0"/>
-              <a:t>אוכל, שתייה ולינה </a:t>
-            </a:r>
-            <a:r>
-              <a:rPr lang="he-IL" sz="5600" dirty="0" smtClean="0"/>
-              <a:t>גדל </a:t>
-            </a:r>
-            <a:r>
-              <a:rPr lang="he-IL" sz="5600" dirty="0" smtClean="0"/>
-              <a:t>בדרום</a:t>
-            </a:r>
-            <a:endParaRPr lang="he-IL" sz="5600" dirty="0" smtClean="0"/>
+              <a:t>אוכל, שתייה ולינה גדל בדרום</a:t>
+            </a:r>
           </a:p>
           <a:p>
             <a:pPr algn="ctr">
@@ -3538,10 +3529,6 @@
               </a:rPr>
               <a:t>בדרום</a:t>
             </a:r>
-            <a:endParaRPr lang="he-IL" sz="2800" b="1" dirty="0" smtClean="0">
-              <a:latin typeface="David" pitchFamily="34" charset="-79"/>
-              <a:cs typeface="David" pitchFamily="34" charset="-79"/>
-            </a:endParaRPr>
           </a:p>
           <a:p>
             <a:pPr algn="ctr"/>
@@ -3682,10 +3669,10 @@
                 <a:latin typeface="David" pitchFamily="34" charset="-79"/>
                 <a:cs typeface="David" pitchFamily="34" charset="-79"/>
               </a:rPr>
-              <a:t>_ _ _ </a:t>
-            </a:r>
-            <a:r>
-              <a:rPr lang="he-IL" sz="8000" dirty="0" smtClean="0">
+              <a:t>_ _ _ _ </a:t>
+            </a:r>
+            <a:r>
+              <a:rPr lang="en-US" sz="8000" dirty="0" smtClean="0">
                 <a:solidFill>
                   <a:schemeClr val="accent6">
                     <a:lumMod val="75000"/>
@@ -3694,10 +3681,10 @@
                 <a:latin typeface="David" pitchFamily="34" charset="-79"/>
                 <a:cs typeface="David" pitchFamily="34" charset="-79"/>
               </a:rPr>
-              <a:t>_ </a:t>
-            </a:r>
-            <a:r>
-              <a:rPr lang="en-US" sz="8000" dirty="0" smtClean="0">
+              <a:t> </a:t>
+            </a:r>
+            <a:r>
+              <a:rPr lang="he-IL" sz="8000" dirty="0" smtClean="0">
                 <a:solidFill>
                   <a:schemeClr val="accent6">
                     <a:lumMod val="75000"/>
@@ -3706,31 +3693,7 @@
                 <a:latin typeface="David" pitchFamily="34" charset="-79"/>
                 <a:cs typeface="David" pitchFamily="34" charset="-79"/>
               </a:rPr>
-              <a:t> </a:t>
-            </a:r>
-            <a:r>
-              <a:rPr lang="he-IL" sz="8000" dirty="0" smtClean="0">
-                <a:solidFill>
-                  <a:schemeClr val="accent6">
-                    <a:lumMod val="75000"/>
-                  </a:schemeClr>
-                </a:solidFill>
-                <a:latin typeface="David" pitchFamily="34" charset="-79"/>
-                <a:cs typeface="David" pitchFamily="34" charset="-79"/>
-              </a:rPr>
-              <a:t> </a:t>
-            </a:r>
-            <a:r>
-              <a:rPr lang="he-IL" sz="8000" dirty="0" smtClean="0">
-                <a:solidFill>
-                  <a:schemeClr val="accent6">
-                    <a:lumMod val="75000"/>
-                  </a:schemeClr>
-                </a:solidFill>
-                <a:latin typeface="David" pitchFamily="34" charset="-79"/>
-                <a:cs typeface="David" pitchFamily="34" charset="-79"/>
-              </a:rPr>
-              <a:t>_ _ _ _ _ )</a:t>
+              <a:t> _ _ _ _ _ )</a:t>
             </a:r>
           </a:p>
           <a:p>
@@ -3968,36 +3931,15 @@
                 <a:latin typeface="David" pitchFamily="34" charset="-79"/>
                 <a:cs typeface="David" pitchFamily="34" charset="-79"/>
               </a:rPr>
-              <a:t>יגרום </a:t>
-            </a:r>
-            <a:r>
-              <a:rPr lang="he-IL" sz="2800" b="1" dirty="0" smtClean="0">
-                <a:solidFill>
-                  <a:srgbClr val="FF0000"/>
-                </a:solidFill>
-                <a:latin typeface="David" pitchFamily="34" charset="-79"/>
-                <a:cs typeface="David" pitchFamily="34" charset="-79"/>
-              </a:rPr>
-              <a:t>לסטייה </a:t>
-            </a:r>
-            <a:r>
-              <a:rPr lang="he-IL" sz="2800" b="1" dirty="0" smtClean="0">
-                <a:latin typeface="David" pitchFamily="34" charset="-79"/>
-                <a:cs typeface="David" pitchFamily="34" charset="-79"/>
-              </a:rPr>
-              <a:t>בפריחה </a:t>
-            </a:r>
-            <a:r>
-              <a:rPr lang="he-IL" sz="2800" b="1" dirty="0" smtClean="0">
-                <a:latin typeface="David" pitchFamily="34" charset="-79"/>
-                <a:cs typeface="David" pitchFamily="34" charset="-79"/>
-              </a:rPr>
-              <a:t>צהובה או לבנה</a:t>
-            </a:r>
-            <a:endParaRPr lang="he-IL" sz="2800" b="1" dirty="0" smtClean="0">
-              <a:latin typeface="David" pitchFamily="34" charset="-79"/>
-              <a:cs typeface="David" pitchFamily="34" charset="-79"/>
-            </a:endParaRPr>
+              <a:t>יגרום לסטייה </a:t>
+            </a:r>
+            <a:r>
+              <a:rPr lang="he-IL" sz="2800" b="1" dirty="0" smtClean="0">
+                <a:latin typeface="David" pitchFamily="34" charset="-79"/>
+                <a:cs typeface="David" pitchFamily="34" charset="-79"/>
+              </a:rPr>
+              <a:t>בפריחה צהובה או לבנה</a:t>
+            </a:r>
           </a:p>
           <a:p>
             <a:pPr algn="ctr">
@@ -4128,11 +4070,7 @@
             </a:pPr>
             <a:r>
               <a:rPr lang="he-IL" sz="6600" dirty="0" smtClean="0"/>
-              <a:t>העץ החסון לומד </a:t>
-            </a:r>
-            <a:r>
-              <a:rPr lang="he-IL" sz="6600" dirty="0" smtClean="0"/>
-              <a:t>בכוח</a:t>
+              <a:t>העץ החסון לומד בכוח</a:t>
             </a:r>
           </a:p>
           <a:p>
@@ -4723,13 +4661,8 @@
             </a:pPr>
             <a:r>
               <a:rPr lang="he-IL" dirty="0" smtClean="0"/>
-              <a:t>דוגמה: אשל - אוכל, שתייה ולינה </a:t>
-            </a:r>
-            <a:r>
-              <a:rPr lang="he-IL" dirty="0" smtClean="0"/>
-              <a:t>גדל בדרום</a:t>
-            </a:r>
-            <a:endParaRPr lang="he-IL" dirty="0" smtClean="0"/>
+              <a:t>דוגמה: אשל - אוכל, שתייה ולינה גדל בדרום</a:t>
+            </a:r>
           </a:p>
           <a:p>
             <a:pPr marL="514350" indent="-514350">
@@ -4738,13 +4671,8 @@
             </a:pPr>
             <a:r>
               <a:rPr lang="he-IL" dirty="0" smtClean="0"/>
-              <a:t>שקד - העץ </a:t>
-            </a:r>
-            <a:r>
-              <a:rPr lang="he-IL" dirty="0" smtClean="0"/>
-              <a:t>שמשתחווה ופורח בט"ו בשבט</a:t>
-            </a:r>
-            <a:endParaRPr lang="he-IL" dirty="0" smtClean="0"/>
+              <a:t>שקד - העץ שמשתחווה ופורח בט"ו בשבט</a:t>
+            </a:r>
           </a:p>
           <a:p>
             <a:pPr marL="514350" indent="-514350">
@@ -4753,13 +4681,8 @@
             </a:pPr>
             <a:r>
               <a:rPr lang="he-IL" dirty="0" smtClean="0"/>
-              <a:t>ברוש - קנגורו ספרותי בבאר </a:t>
-            </a:r>
-            <a:r>
-              <a:rPr lang="he-IL" dirty="0" smtClean="0"/>
-              <a:t>שבע דק וגבוה</a:t>
-            </a:r>
-            <a:endParaRPr lang="he-IL" dirty="0" smtClean="0"/>
+              <a:t>ברוש - קנגורו ספרותי בבאר שבע דק וגבוה</a:t>
+            </a:r>
           </a:p>
           <a:p>
             <a:pPr marL="514350" indent="-514350">
@@ -4767,13 +4690,8 @@
             </a:pPr>
             <a:r>
               <a:rPr lang="he-IL" dirty="0" smtClean="0"/>
-              <a:t>אדר - עץ החודש (לפעמים פעמיים ברצף</a:t>
-            </a:r>
-            <a:r>
-              <a:rPr lang="he-IL" dirty="0" smtClean="0"/>
-              <a:t>...)</a:t>
-            </a:r>
-            <a:endParaRPr lang="he-IL" dirty="0" smtClean="0"/>
+              <a:t>אדר - עץ החודש (לפעמים פעמיים ברצף...)</a:t>
+            </a:r>
           </a:p>
           <a:p>
             <a:pPr marL="514350" indent="-514350">
@@ -4781,13 +4699,8 @@
             </a:pPr>
             <a:r>
               <a:rPr lang="he-IL" dirty="0" smtClean="0"/>
-              <a:t>חרוב - בחור מבולבל </a:t>
-            </a:r>
-            <a:r>
-              <a:rPr lang="he-IL" dirty="0" smtClean="0"/>
-              <a:t>ופריו מתוק</a:t>
-            </a:r>
-            <a:endParaRPr lang="he-IL" dirty="0" smtClean="0"/>
+              <a:t>חרוב - בחור מבולבל ופריו מתוק</a:t>
+            </a:r>
           </a:p>
           <a:p>
             <a:pPr marL="514350" indent="-514350">
@@ -4817,13 +4730,8 @@
             </a:pPr>
             <a:r>
               <a:rPr lang="he-IL" dirty="0" smtClean="0"/>
-              <a:t>שקמה - מארז </a:t>
-            </a:r>
-            <a:r>
-              <a:rPr lang="he-IL" dirty="0" smtClean="0"/>
-              <a:t>מאלוהים מאריך ימים ומזין עטלפים</a:t>
-            </a:r>
-            <a:endParaRPr lang="he-IL" dirty="0" smtClean="0"/>
+              <a:t>שקמה - מארז מאלוהים מאריך ימים ומזין עטלפים</a:t>
+            </a:r>
           </a:p>
           <a:p>
             <a:pPr marL="514350" indent="-514350">
@@ -4831,11 +4739,7 @@
             </a:pPr>
             <a:r>
               <a:rPr lang="he-IL" dirty="0" smtClean="0"/>
-              <a:t>שיטה - העץ שיגרום </a:t>
-            </a:r>
-            <a:r>
-              <a:rPr lang="he-IL" dirty="0" smtClean="0"/>
-              <a:t>לסטייה בפריחה צהובה או לבנה</a:t>
+              <a:t>שיטה - העץ שיגרום לסטייה בפריחה צהובה או לבנה</a:t>
             </a:r>
             <a:endParaRPr lang="en-US" dirty="0" smtClean="0"/>
           </a:p>
@@ -4878,27 +4782,19 @@
             </a:r>
             <a:r>
               <a:rPr lang="he-IL" dirty="0" smtClean="0"/>
-              <a:t> </a:t>
+              <a:t> – העץ החסון </a:t>
+            </a:r>
+            <a:r>
+              <a:rPr lang="he-IL" dirty="0" smtClean="0">
+                <a:solidFill>
+                  <a:srgbClr val="FF0000"/>
+                </a:solidFill>
+              </a:rPr>
+              <a:t>לומד</a:t>
             </a:r>
             <a:r>
               <a:rPr lang="he-IL" dirty="0" smtClean="0"/>
-              <a:t>– העץ החסון </a:t>
-            </a:r>
-            <a:r>
-              <a:rPr lang="he-IL" dirty="0" smtClean="0">
-                <a:solidFill>
-                  <a:srgbClr val="FF0000"/>
-                </a:solidFill>
-              </a:rPr>
-              <a:t>לומד</a:t>
-            </a:r>
-            <a:r>
-              <a:rPr lang="he-IL" dirty="0" smtClean="0"/>
-              <a:t> </a:t>
-            </a:r>
-            <a:r>
-              <a:rPr lang="he-IL" dirty="0" smtClean="0"/>
-              <a:t>ב</a:t>
+              <a:t> ב</a:t>
             </a:r>
             <a:r>
               <a:rPr lang="he-IL" dirty="0" smtClean="0">
@@ -4996,11 +4892,7 @@
             </a:pPr>
             <a:r>
               <a:rPr lang="he-IL" sz="6600" dirty="0" smtClean="0"/>
-              <a:t>העץ </a:t>
-            </a:r>
-            <a:r>
-              <a:rPr lang="he-IL" sz="6600" dirty="0" smtClean="0"/>
-              <a:t>שמשתחווה ופורח בט"ו בשבט</a:t>
+              <a:t>העץ שמשתחווה ופורח בט"ו בשבט</a:t>
             </a:r>
             <a:endParaRPr lang="he-IL" sz="6600" dirty="0"/>
           </a:p>
@@ -5357,10 +5249,6 @@
               </a:rPr>
               <a:t>בדרום</a:t>
             </a:r>
-            <a:endParaRPr lang="he-IL" sz="2800" b="1" dirty="0" smtClean="0">
-              <a:latin typeface="David" pitchFamily="34" charset="-79"/>
-              <a:cs typeface="David" pitchFamily="34" charset="-79"/>
-            </a:endParaRPr>
           </a:p>
           <a:p>
             <a:pPr algn="ctr"/>
@@ -5460,13 +5348,8 @@
             </a:pPr>
             <a:r>
               <a:rPr lang="he-IL" sz="6600" dirty="0" smtClean="0"/>
-              <a:t>קנגורו ספרותי בבאר </a:t>
-            </a:r>
-            <a:r>
-              <a:rPr lang="he-IL" sz="6600" dirty="0" smtClean="0"/>
-              <a:t>שבע דק וגבוה</a:t>
-            </a:r>
-            <a:endParaRPr lang="he-IL" sz="6600" dirty="0" smtClean="0"/>
+              <a:t>קנגורו ספרותי בבאר שבע דק וגבוה</a:t>
+            </a:r>
           </a:p>
           <a:p>
             <a:pPr algn="ctr">
@@ -5739,10 +5622,6 @@
               </a:rPr>
               <a:t>ופורח בט"ו בשבט</a:t>
             </a:r>
-            <a:endParaRPr lang="he-IL" sz="2800" b="1" dirty="0" smtClean="0">
-              <a:latin typeface="David" pitchFamily="34" charset="-79"/>
-              <a:cs typeface="David" pitchFamily="34" charset="-79"/>
-            </a:endParaRPr>
           </a:p>
           <a:p>
             <a:pPr algn="ctr"/>
@@ -5850,11 +5729,7 @@
             </a:pPr>
             <a:r>
               <a:rPr lang="he-IL" sz="6600" dirty="0" smtClean="0"/>
-              <a:t>עץ החודש (לפעמים פעמיים ברצף</a:t>
-            </a:r>
-            <a:r>
-              <a:rPr lang="he-IL" sz="6600" dirty="0" smtClean="0"/>
-              <a:t>...)</a:t>
+              <a:t>עץ החודש (לפעמים פעמיים ברצף...)</a:t>
             </a:r>
             <a:endParaRPr lang="he-IL" sz="6600" dirty="0"/>
           </a:p>
@@ -6158,17 +6033,7 @@
                 <a:latin typeface="David" pitchFamily="34" charset="-79"/>
                 <a:cs typeface="David" pitchFamily="34" charset="-79"/>
               </a:rPr>
-              <a:t>באר </a:t>
-            </a:r>
-            <a:r>
-              <a:rPr lang="he-IL" sz="2800" b="1" dirty="0" smtClean="0">
-                <a:solidFill>
-                  <a:srgbClr val="FF0000"/>
-                </a:solidFill>
-                <a:latin typeface="David" pitchFamily="34" charset="-79"/>
-                <a:cs typeface="David" pitchFamily="34" charset="-79"/>
-              </a:rPr>
-              <a:t>שבע </a:t>
+              <a:t>באר שבע </a:t>
             </a:r>
             <a:r>
               <a:rPr lang="he-IL" sz="2800" b="1" dirty="0" smtClean="0">
@@ -6177,10 +6042,6 @@
               </a:rPr>
               <a:t>דק וגבוה</a:t>
             </a:r>
-            <a:endParaRPr lang="he-IL" sz="2800" b="1" dirty="0" smtClean="0">
-              <a:latin typeface="David" pitchFamily="34" charset="-79"/>
-              <a:cs typeface="David" pitchFamily="34" charset="-79"/>
-            </a:endParaRPr>
           </a:p>
           <a:p>
             <a:pPr algn="ctr">
@@ -6299,13 +6160,8 @@
             </a:pPr>
             <a:r>
               <a:rPr lang="he-IL" sz="6600" dirty="0" smtClean="0"/>
-              <a:t>בחור מבולבל </a:t>
-            </a:r>
-            <a:r>
-              <a:rPr lang="he-IL" sz="6600" dirty="0" smtClean="0"/>
-              <a:t>ופריו מתוק</a:t>
-            </a:r>
-            <a:endParaRPr lang="he-IL" sz="6600" dirty="0" smtClean="0"/>
+              <a:t>בחור מבולבל ופריו מתוק</a:t>
+            </a:r>
           </a:p>
           <a:p>
             <a:pPr algn="ctr">
@@ -6573,11 +6429,7 @@
             </a:r>
             <a:r>
               <a:rPr lang="he-IL" sz="2800" dirty="0" smtClean="0"/>
-              <a:t> (לפעמים פעמיים ברצף</a:t>
-            </a:r>
-            <a:r>
-              <a:rPr lang="he-IL" sz="2800" dirty="0" smtClean="0"/>
-              <a:t>...)</a:t>
+              <a:t> (לפעמים פעמיים ברצף...)</a:t>
             </a:r>
             <a:endParaRPr lang="he-IL" sz="2800" b="1" dirty="0" smtClean="0">
               <a:solidFill>
@@ -7015,19 +6867,8 @@
                 <a:latin typeface="David" pitchFamily="34" charset="-79"/>
                 <a:cs typeface="David" pitchFamily="34" charset="-79"/>
               </a:rPr>
-              <a:t> מבולבל </a:t>
-            </a:r>
-            <a:r>
-              <a:rPr lang="he-IL" sz="2800" b="1" dirty="0" smtClean="0">
-                <a:latin typeface="David" pitchFamily="34" charset="-79"/>
-                <a:cs typeface="David" pitchFamily="34" charset="-79"/>
-              </a:rPr>
-              <a:t>ופריו מתוק</a:t>
-            </a:r>
-            <a:endParaRPr lang="he-IL" sz="2800" b="1" dirty="0" smtClean="0">
-              <a:latin typeface="David" pitchFamily="34" charset="-79"/>
-              <a:cs typeface="David" pitchFamily="34" charset="-79"/>
-            </a:endParaRPr>
+              <a:t> מבולבל ופריו מתוק</a:t>
+            </a:r>
           </a:p>
           <a:p>
             <a:pPr algn="ctr">
@@ -7562,11 +7403,7 @@
             </a:pPr>
             <a:r>
               <a:rPr lang="he-IL" sz="6600" dirty="0" smtClean="0"/>
-              <a:t>מארז </a:t>
-            </a:r>
-            <a:r>
-              <a:rPr lang="he-IL" sz="6600" dirty="0" smtClean="0"/>
-              <a:t>מאלוהים מאריך ימים ומזין עטלפים</a:t>
+              <a:t>מארז מאלוהים מאריך ימים ומזין עטלפים</a:t>
             </a:r>
             <a:endParaRPr lang="he-IL" sz="6600" dirty="0"/>
           </a:p>
@@ -8174,11 +8011,7 @@
             </a:pPr>
             <a:r>
               <a:rPr lang="he-IL" sz="6600" dirty="0" smtClean="0"/>
-              <a:t>העץ שיגרום </a:t>
-            </a:r>
-            <a:r>
-              <a:rPr lang="he-IL" sz="6600" dirty="0" smtClean="0"/>
-              <a:t>לסטייה בפריחה צהובה או לבנה</a:t>
+              <a:t>העץ שיגרום לסטייה בפריחה צהובה או לבנה</a:t>
             </a:r>
             <a:endParaRPr lang="he-IL" sz="6600" dirty="0"/>
           </a:p>
@@ -8488,14 +8321,7 @@
                 <a:latin typeface="David" pitchFamily="34" charset="-79"/>
                 <a:cs typeface="David" pitchFamily="34" charset="-79"/>
               </a:rPr>
-              <a:t>מאריך ימים ומזין עטלפים</a:t>
-            </a:r>
-            <a:r>
-              <a:rPr lang="he-IL" sz="2800" b="1" dirty="0" smtClean="0">
-                <a:latin typeface="David" pitchFamily="34" charset="-79"/>
-                <a:cs typeface="David" pitchFamily="34" charset="-79"/>
-              </a:rPr>
-              <a:t> </a:t>
+              <a:t>מאריך ימים ומזין עטלפים </a:t>
             </a:r>
             <a:endParaRPr lang="he-IL" sz="2800" b="1" dirty="0">
               <a:latin typeface="David" pitchFamily="34" charset="-79"/>
@@ -8838,6 +8664,21 @@
 </file>
 
 <file path=customXml/item1.xml><?xml version="1.0" encoding="utf-8"?>
+<p:properties xmlns:p="http://schemas.microsoft.com/office/2006/metadata/properties" xmlns:xsi="http://www.w3.org/2001/XMLSchema-instance" xmlns:pc="http://schemas.microsoft.com/office/infopath/2007/PartnerControls">
+  <documentManagement/>
+</p:properties>
+</file>
+
+<file path=customXml/item2.xml><?xml version="1.0" encoding="utf-8"?>
+<?mso-contentType ?>
+<FormTemplates xmlns="http://schemas.microsoft.com/sharepoint/v3/contenttype/forms">
+  <Display>DocumentLibraryForm</Display>
+  <Edit>DocumentLibraryForm</Edit>
+  <New>DocumentLibraryForm</New>
+</FormTemplates>
+</file>
+
+<file path=customXml/item3.xml><?xml version="1.0" encoding="utf-8"?>
 <ct:contentTypeSchema xmlns:ct="http://schemas.microsoft.com/office/2006/metadata/contentType" xmlns:ma="http://schemas.microsoft.com/office/2006/metadata/properties/metaAttributes" ct:_="" ma:_="" ma:contentTypeName="Document" ma:contentTypeID="0x01010034C1E1491D9C694585E4D484013EA9D2" ma:contentTypeVersion="10" ma:contentTypeDescription="Create a new document." ma:contentTypeScope="" ma:versionID="91507b520f1bef10d7c938e8a3341699">
   <xsd:schema xmlns:xsd="http://www.w3.org/2001/XMLSchema" xmlns:xs="http://www.w3.org/2001/XMLSchema" xmlns:p="http://schemas.microsoft.com/office/2006/metadata/properties" xmlns:ns3="2d9e374d-705b-4978-9811-6b77dc0a0432" targetNamespace="http://schemas.microsoft.com/office/2006/metadata/properties" ma:root="true" ma:fieldsID="eba830c2d9bd07e7086f2609d364ba7a" ns3:_="">
     <xsd:import namespace="2d9e374d-705b-4978-9811-6b77dc0a0432"/>
@@ -9021,22 +8862,24 @@
 </ct:contentTypeSchema>
 </file>
 
-<file path=customXml/item2.xml><?xml version="1.0" encoding="utf-8"?>
-<?mso-contentType ?>
-<FormTemplates xmlns="http://schemas.microsoft.com/sharepoint/v3/contenttype/forms">
-  <Display>DocumentLibraryForm</Display>
-  <Edit>DocumentLibraryForm</Edit>
-  <New>DocumentLibraryForm</New>
-</FormTemplates>
+<file path=customXml/itemProps1.xml><?xml version="1.0" encoding="utf-8"?>
+<ds:datastoreItem xmlns:ds="http://schemas.openxmlformats.org/officeDocument/2006/customXml" ds:itemID="{473DE2F7-3404-40A0-A977-D87EA61FD0EF}">
+  <ds:schemaRefs>
+    <ds:schemaRef ds:uri="http://schemas.microsoft.com/office/2006/metadata/properties"/>
+    <ds:schemaRef ds:uri="http://schemas.microsoft.com/office/infopath/2007/PartnerControls"/>
+  </ds:schemaRefs>
+</ds:datastoreItem>
 </file>
 
-<file path=customXml/item3.xml><?xml version="1.0" encoding="utf-8"?>
-<p:properties xmlns:p="http://schemas.microsoft.com/office/2006/metadata/properties" xmlns:xsi="http://www.w3.org/2001/XMLSchema-instance" xmlns:pc="http://schemas.microsoft.com/office/infopath/2007/PartnerControls">
-  <documentManagement/>
-</p:properties>
+<file path=customXml/itemProps2.xml><?xml version="1.0" encoding="utf-8"?>
+<ds:datastoreItem xmlns:ds="http://schemas.openxmlformats.org/officeDocument/2006/customXml" ds:itemID="{C920FAB9-5C07-4863-ACC0-94F0CB535FAC}">
+  <ds:schemaRefs>
+    <ds:schemaRef ds:uri="http://schemas.microsoft.com/sharepoint/v3/contenttype/forms"/>
+  </ds:schemaRefs>
+</ds:datastoreItem>
 </file>
 
-<file path=customXml/itemProps1.xml><?xml version="1.0" encoding="utf-8"?>
+<file path=customXml/itemProps3.xml><?xml version="1.0" encoding="utf-8"?>
 <ds:datastoreItem xmlns:ds="http://schemas.openxmlformats.org/officeDocument/2006/customXml" ds:itemID="{2C42031F-DCFE-40C9-A63E-5D39E04D4562}">
   <ds:schemaRefs>
     <ds:schemaRef ds:uri="http://schemas.microsoft.com/office/2006/metadata/contentType"/>
@@ -9052,21 +8895,4 @@
     <ds:schemaRef ds:uri="http://schemas.microsoft.com/internal/obd"/>
   </ds:schemaRefs>
 </ds:datastoreItem>
-</file>
-
-<file path=customXml/itemProps2.xml><?xml version="1.0" encoding="utf-8"?>
-<ds:datastoreItem xmlns:ds="http://schemas.openxmlformats.org/officeDocument/2006/customXml" ds:itemID="{C920FAB9-5C07-4863-ACC0-94F0CB535FAC}">
-  <ds:schemaRefs>
-    <ds:schemaRef ds:uri="http://schemas.microsoft.com/sharepoint/v3/contenttype/forms"/>
-  </ds:schemaRefs>
-</ds:datastoreItem>
-</file>
-
-<file path=customXml/itemProps3.xml><?xml version="1.0" encoding="utf-8"?>
-<ds:datastoreItem xmlns:ds="http://schemas.openxmlformats.org/officeDocument/2006/customXml" ds:itemID="{473DE2F7-3404-40A0-A977-D87EA61FD0EF}">
-  <ds:schemaRefs>
-    <ds:schemaRef ds:uri="http://schemas.microsoft.com/office/2006/metadata/properties"/>
-    <ds:schemaRef ds:uri="http://schemas.microsoft.com/office/infopath/2007/PartnerControls"/>
-  </ds:schemaRefs>
-</ds:datastoreItem>
 </file>
</xml_diff>